<commit_message>
Added information about "exe" directory
</commit_message>
<xml_diff>
--- a/presentation.pptx
+++ b/presentation.pptx
@@ -1,17 +1,17 @@
 
 <file path=ppt/presentation.xml><?xml version="1.0" encoding="utf-8"?>
-<p:presentation xmlns:a="http://schemas.openxmlformats.org/drawingml/2006/main" xmlns:r="http://schemas.openxmlformats.org/officeDocument/2006/relationships" xmlns:p="http://schemas.openxmlformats.org/presentationml/2006/main" xmlns:m="http://schemas.openxmlformats.org/officeDocument/2006/math" xmlns:w="http://schemas.openxmlformats.org/wordprocessingml/2006/main" saveSubsetFonts="1">
+<p:presentation xmlns:a="http://schemas.openxmlformats.org/drawingml/2006/main" xmlns:r="http://schemas.openxmlformats.org/officeDocument/2006/relationships" xmlns:p="http://schemas.openxmlformats.org/presentationml/2006/main" saveSubsetFonts="1">
   <p:sldMasterIdLst>
     <p:sldMasterId id="2147483648" r:id="rId1"/>
   </p:sldMasterIdLst>
   <p:sldIdLst>
-    <p:sldId id="256" r:id="rId3"/>
-    <p:sldId id="257" r:id="rId4"/>
-    <p:sldId id="258" r:id="rId5"/>
-    <p:sldId id="259" r:id="rId6"/>
-    <p:sldId id="260" r:id="rId7"/>
-    <p:sldId id="261" r:id="rId8"/>
-    <p:sldId id="262" r:id="rId9"/>
+    <p:sldId id="256" r:id="rId2"/>
+    <p:sldId id="257" r:id="rId3"/>
+    <p:sldId id="258" r:id="rId4"/>
+    <p:sldId id="259" r:id="rId5"/>
+    <p:sldId id="260" r:id="rId6"/>
+    <p:sldId id="261" r:id="rId7"/>
+    <p:sldId id="262" r:id="rId8"/>
   </p:sldIdLst>
   <p:sldSz cx="12192000" cy="6858000"/>
   <p:notesSz cx="12192000" cy="6858000"/>
@@ -110,17 +110,33 @@
       </a:defRPr>
     </a:lvl9pPr>
   </p:defaultTextStyle>
+  <p:extLst>
+    <p:ext uri="{EFAFB233-063F-42B5-8137-9DF3F51BA10A}">
+      <p15:sldGuideLst xmlns:p15="http://schemas.microsoft.com/office/powerpoint/2012/main">
+        <p15:guide id="1" orient="horz" pos="2160">
+          <p15:clr>
+            <a:srgbClr val="A4A3A4"/>
+          </p15:clr>
+        </p15:guide>
+        <p15:guide id="2" pos="2880">
+          <p15:clr>
+            <a:srgbClr val="A4A3A4"/>
+          </p15:clr>
+        </p15:guide>
+      </p15:sldGuideLst>
+    </p:ext>
+  </p:extLst>
 </p:presentation>
 </file>
 
 <file path=ppt/slideLayouts/slideLayout1.xml><?xml version="1.0" encoding="utf-8"?>
-<p:sldLayout xmlns:a="http://schemas.openxmlformats.org/drawingml/2006/main" xmlns:r="http://schemas.openxmlformats.org/officeDocument/2006/relationships" xmlns:p="http://schemas.openxmlformats.org/presentationml/2006/main" xmlns:m="http://schemas.openxmlformats.org/officeDocument/2006/math" xmlns:w="http://schemas.openxmlformats.org/wordprocessingml/2006/main" matchingName="" preserve="1" showMasterPhAnim="0" type="title" userDrawn="1">
+<p:sldLayout xmlns:a="http://schemas.openxmlformats.org/drawingml/2006/main" xmlns:r="http://schemas.openxmlformats.org/officeDocument/2006/relationships" xmlns:p="http://schemas.openxmlformats.org/presentationml/2006/main" showMasterPhAnim="0" type="title" preserve="1" userDrawn="1">
   <p:cSld name="Титульный слайд">
     <p:spTree>
       <p:nvGrpSpPr>
-        <p:cNvPr id="1" name="" hidden="0"/>
+        <p:cNvPr id="1" name=""/>
         <p:cNvGrpSpPr/>
-        <p:nvPr isPhoto="0" userDrawn="0"/>
+        <p:nvPr/>
       </p:nvGrpSpPr>
       <p:grpSpPr bwMode="auto">
         <a:xfrm>
@@ -132,12 +148,12 @@
       </p:grpSpPr>
       <p:sp>
         <p:nvSpPr>
-          <p:cNvPr id="4" name="Заголовок 1" hidden="0"/>
-          <p:cNvSpPr>
-            <a:spLocks noGrp="1"/>
-          </p:cNvSpPr>
-          <p:nvPr isPhoto="0" userDrawn="0">
-            <p:ph type="ctrTitle" hasCustomPrompt="0"/>
+          <p:cNvPr id="4" name="Заголовок 1"/>
+          <p:cNvSpPr>
+            <a:spLocks noGrp="1"/>
+          </p:cNvSpPr>
+          <p:nvPr>
+            <p:ph type="ctrTitle"/>
           </p:nvPr>
         </p:nvSpPr>
         <p:spPr bwMode="auto">
@@ -167,12 +183,12 @@
       </p:sp>
       <p:sp>
         <p:nvSpPr>
-          <p:cNvPr id="5" name="Подзаголовок 2" hidden="0"/>
-          <p:cNvSpPr>
-            <a:spLocks noGrp="1"/>
-          </p:cNvSpPr>
-          <p:nvPr isPhoto="0" userDrawn="0">
-            <p:ph type="subTitle" idx="1" hasCustomPrompt="0"/>
+          <p:cNvPr id="5" name="Подзаголовок 2"/>
+          <p:cNvSpPr>
+            <a:spLocks noGrp="1"/>
+          </p:cNvSpPr>
+          <p:nvPr>
+            <p:ph type="subTitle" idx="1"/>
           </p:nvPr>
         </p:nvSpPr>
         <p:spPr bwMode="auto">
@@ -235,12 +251,12 @@
       </p:sp>
       <p:sp>
         <p:nvSpPr>
-          <p:cNvPr id="6" name="Дата 3" hidden="0"/>
-          <p:cNvSpPr>
-            <a:spLocks noGrp="1"/>
-          </p:cNvSpPr>
-          <p:nvPr isPhoto="0" userDrawn="0">
-            <p:ph type="dt" sz="half" idx="10" hasCustomPrompt="0"/>
+          <p:cNvPr id="6" name="Дата 3"/>
+          <p:cNvSpPr>
+            <a:spLocks noGrp="1"/>
+          </p:cNvSpPr>
+          <p:nvPr>
+            <p:ph type="dt" sz="half" idx="10"/>
           </p:nvPr>
         </p:nvSpPr>
         <p:spPr bwMode="auto"/>
@@ -253,7 +269,7 @@
             </a:pPr>
             <a:fld id="{BCC18F51-09EC-435C-A3BA-64A766E099C0}" type="datetimeFigureOut">
               <a:rPr lang="ru-RU"/>
-              <a:t/>
+              <a:t>26.11.2021</a:t>
             </a:fld>
             <a:endParaRPr lang="ru-RU"/>
           </a:p>
@@ -261,12 +277,12 @@
       </p:sp>
       <p:sp>
         <p:nvSpPr>
-          <p:cNvPr id="7" name="Нижний колонтитул 4" hidden="0"/>
-          <p:cNvSpPr>
-            <a:spLocks noGrp="1"/>
-          </p:cNvSpPr>
-          <p:nvPr isPhoto="0" userDrawn="0">
-            <p:ph type="ftr" sz="quarter" idx="11" hasCustomPrompt="0"/>
+          <p:cNvPr id="7" name="Нижний колонтитул 4"/>
+          <p:cNvSpPr>
+            <a:spLocks noGrp="1"/>
+          </p:cNvSpPr>
+          <p:nvPr>
+            <p:ph type="ftr" sz="quarter" idx="11"/>
           </p:nvPr>
         </p:nvSpPr>
         <p:spPr bwMode="auto"/>
@@ -283,12 +299,12 @@
       </p:sp>
       <p:sp>
         <p:nvSpPr>
-          <p:cNvPr id="8" name="Номер слайда 5" hidden="0"/>
-          <p:cNvSpPr>
-            <a:spLocks noGrp="1"/>
-          </p:cNvSpPr>
-          <p:nvPr isPhoto="0" userDrawn="0">
-            <p:ph type="sldNum" sz="quarter" idx="12" hasCustomPrompt="0"/>
+          <p:cNvPr id="8" name="Номер слайда 5"/>
+          <p:cNvSpPr>
+            <a:spLocks noGrp="1"/>
+          </p:cNvSpPr>
+          <p:nvPr>
+            <p:ph type="sldNum" sz="quarter" idx="12"/>
           </p:nvPr>
         </p:nvSpPr>
         <p:spPr bwMode="auto"/>
@@ -301,7 +317,7 @@
             </a:pPr>
             <a:fld id="{08395586-F03A-48D1-94DF-16B239DF4FB5}" type="slidenum">
               <a:rPr lang="ru-RU"/>
-              <a:t/>
+              <a:t>‹#›</a:t>
             </a:fld>
             <a:endParaRPr lang="ru-RU"/>
           </a:p>
@@ -316,13 +332,13 @@
 </file>
 
 <file path=ppt/slideLayouts/slideLayout10.xml><?xml version="1.0" encoding="utf-8"?>
-<p:sldLayout xmlns:a="http://schemas.openxmlformats.org/drawingml/2006/main" xmlns:r="http://schemas.openxmlformats.org/officeDocument/2006/relationships" xmlns:p="http://schemas.openxmlformats.org/presentationml/2006/main" xmlns:m="http://schemas.openxmlformats.org/officeDocument/2006/math" xmlns:w="http://schemas.openxmlformats.org/wordprocessingml/2006/main" matchingName="" preserve="1" showMasterPhAnim="0" type="vertTx" userDrawn="1">
+<p:sldLayout xmlns:a="http://schemas.openxmlformats.org/drawingml/2006/main" xmlns:r="http://schemas.openxmlformats.org/officeDocument/2006/relationships" xmlns:p="http://schemas.openxmlformats.org/presentationml/2006/main" showMasterPhAnim="0" type="vertTx" preserve="1" userDrawn="1">
   <p:cSld name="Заголовок и вертикальный текст">
     <p:spTree>
       <p:nvGrpSpPr>
-        <p:cNvPr id="1" name="" hidden="0"/>
+        <p:cNvPr id="1" name=""/>
         <p:cNvGrpSpPr/>
-        <p:nvPr isPhoto="0" userDrawn="0"/>
+        <p:nvPr/>
       </p:nvGrpSpPr>
       <p:grpSpPr bwMode="auto">
         <a:xfrm>
@@ -334,12 +350,12 @@
       </p:grpSpPr>
       <p:sp>
         <p:nvSpPr>
-          <p:cNvPr id="4" name="Заголовок 1" hidden="0"/>
-          <p:cNvSpPr>
-            <a:spLocks noGrp="1"/>
-          </p:cNvSpPr>
-          <p:nvPr isPhoto="0" userDrawn="0">
-            <p:ph type="title" hasCustomPrompt="0"/>
+          <p:cNvPr id="4" name="Заголовок 1"/>
+          <p:cNvSpPr>
+            <a:spLocks noGrp="1"/>
+          </p:cNvSpPr>
+          <p:nvPr>
+            <p:ph type="title"/>
           </p:nvPr>
         </p:nvSpPr>
         <p:spPr bwMode="auto"/>
@@ -360,12 +376,12 @@
       </p:sp>
       <p:sp>
         <p:nvSpPr>
-          <p:cNvPr id="5" name="Вертикальный текст 2" hidden="0"/>
-          <p:cNvSpPr>
-            <a:spLocks noGrp="1"/>
-          </p:cNvSpPr>
-          <p:nvPr isPhoto="0" userDrawn="0">
-            <p:ph type="body" orient="vert" idx="1" hasCustomPrompt="0"/>
+          <p:cNvPr id="5" name="Вертикальный текст 2"/>
+          <p:cNvSpPr>
+            <a:spLocks noGrp="1"/>
+          </p:cNvSpPr>
+          <p:nvPr>
+            <p:ph type="body" orient="vert" idx="1"/>
           </p:nvPr>
         </p:nvSpPr>
         <p:spPr bwMode="auto"/>
@@ -426,12 +442,12 @@
       </p:sp>
       <p:sp>
         <p:nvSpPr>
-          <p:cNvPr id="6" name="Дата 3" hidden="0"/>
-          <p:cNvSpPr>
-            <a:spLocks noGrp="1"/>
-          </p:cNvSpPr>
-          <p:nvPr isPhoto="0" userDrawn="0">
-            <p:ph type="dt" sz="half" idx="10" hasCustomPrompt="0"/>
+          <p:cNvPr id="6" name="Дата 3"/>
+          <p:cNvSpPr>
+            <a:spLocks noGrp="1"/>
+          </p:cNvSpPr>
+          <p:nvPr>
+            <p:ph type="dt" sz="half" idx="10"/>
           </p:nvPr>
         </p:nvSpPr>
         <p:spPr bwMode="auto"/>
@@ -444,7 +460,7 @@
             </a:pPr>
             <a:fld id="{BCC18F51-09EC-435C-A3BA-64A766E099C0}" type="datetimeFigureOut">
               <a:rPr lang="ru-RU"/>
-              <a:t/>
+              <a:t>26.11.2021</a:t>
             </a:fld>
             <a:endParaRPr lang="ru-RU"/>
           </a:p>
@@ -452,12 +468,12 @@
       </p:sp>
       <p:sp>
         <p:nvSpPr>
-          <p:cNvPr id="7" name="Нижний колонтитул 4" hidden="0"/>
-          <p:cNvSpPr>
-            <a:spLocks noGrp="1"/>
-          </p:cNvSpPr>
-          <p:nvPr isPhoto="0" userDrawn="0">
-            <p:ph type="ftr" sz="quarter" idx="11" hasCustomPrompt="0"/>
+          <p:cNvPr id="7" name="Нижний колонтитул 4"/>
+          <p:cNvSpPr>
+            <a:spLocks noGrp="1"/>
+          </p:cNvSpPr>
+          <p:nvPr>
+            <p:ph type="ftr" sz="quarter" idx="11"/>
           </p:nvPr>
         </p:nvSpPr>
         <p:spPr bwMode="auto"/>
@@ -474,12 +490,12 @@
       </p:sp>
       <p:sp>
         <p:nvSpPr>
-          <p:cNvPr id="8" name="Номер слайда 5" hidden="0"/>
-          <p:cNvSpPr>
-            <a:spLocks noGrp="1"/>
-          </p:cNvSpPr>
-          <p:nvPr isPhoto="0" userDrawn="0">
-            <p:ph type="sldNum" sz="quarter" idx="12" hasCustomPrompt="0"/>
+          <p:cNvPr id="8" name="Номер слайда 5"/>
+          <p:cNvSpPr>
+            <a:spLocks noGrp="1"/>
+          </p:cNvSpPr>
+          <p:nvPr>
+            <p:ph type="sldNum" sz="quarter" idx="12"/>
           </p:nvPr>
         </p:nvSpPr>
         <p:spPr bwMode="auto"/>
@@ -492,7 +508,7 @@
             </a:pPr>
             <a:fld id="{08395586-F03A-48D1-94DF-16B239DF4FB5}" type="slidenum">
               <a:rPr lang="ru-RU"/>
-              <a:t/>
+              <a:t>‹#›</a:t>
             </a:fld>
             <a:endParaRPr lang="ru-RU"/>
           </a:p>
@@ -507,13 +523,13 @@
 </file>
 
 <file path=ppt/slideLayouts/slideLayout11.xml><?xml version="1.0" encoding="utf-8"?>
-<p:sldLayout xmlns:a="http://schemas.openxmlformats.org/drawingml/2006/main" xmlns:r="http://schemas.openxmlformats.org/officeDocument/2006/relationships" xmlns:p="http://schemas.openxmlformats.org/presentationml/2006/main" xmlns:m="http://schemas.openxmlformats.org/officeDocument/2006/math" xmlns:w="http://schemas.openxmlformats.org/wordprocessingml/2006/main" matchingName="" preserve="1" showMasterPhAnim="0" type="vertTitleAndTx" userDrawn="1">
+<p:sldLayout xmlns:a="http://schemas.openxmlformats.org/drawingml/2006/main" xmlns:r="http://schemas.openxmlformats.org/officeDocument/2006/relationships" xmlns:p="http://schemas.openxmlformats.org/presentationml/2006/main" showMasterPhAnim="0" type="vertTitleAndTx" preserve="1" userDrawn="1">
   <p:cSld name="Вертикальный заголовок и текст">
     <p:spTree>
       <p:nvGrpSpPr>
-        <p:cNvPr id="1" name="" hidden="0"/>
+        <p:cNvPr id="1" name=""/>
         <p:cNvGrpSpPr/>
-        <p:nvPr isPhoto="0" userDrawn="0"/>
+        <p:nvPr/>
       </p:nvGrpSpPr>
       <p:grpSpPr bwMode="auto">
         <a:xfrm>
@@ -525,12 +541,12 @@
       </p:grpSpPr>
       <p:sp>
         <p:nvSpPr>
-          <p:cNvPr id="4" name="Вертикальный заголовок 1" hidden="0"/>
-          <p:cNvSpPr>
-            <a:spLocks noGrp="1"/>
-          </p:cNvSpPr>
-          <p:nvPr isPhoto="0" userDrawn="0">
-            <p:ph type="title" orient="vert" hasCustomPrompt="0"/>
+          <p:cNvPr id="4" name="Вертикальный заголовок 1"/>
+          <p:cNvSpPr>
+            <a:spLocks noGrp="1"/>
+          </p:cNvSpPr>
+          <p:nvPr>
+            <p:ph type="title" orient="vert"/>
           </p:nvPr>
         </p:nvSpPr>
         <p:spPr bwMode="auto">
@@ -556,12 +572,12 @@
       </p:sp>
       <p:sp>
         <p:nvSpPr>
-          <p:cNvPr id="5" name="Вертикальный текст 2" hidden="0"/>
-          <p:cNvSpPr>
-            <a:spLocks noGrp="1"/>
-          </p:cNvSpPr>
-          <p:nvPr isPhoto="0" userDrawn="0">
-            <p:ph type="body" orient="vert" idx="1" hasCustomPrompt="0"/>
+          <p:cNvPr id="5" name="Вертикальный текст 2"/>
+          <p:cNvSpPr>
+            <a:spLocks noGrp="1"/>
+          </p:cNvSpPr>
+          <p:nvPr>
+            <p:ph type="body" orient="vert" idx="1"/>
           </p:nvPr>
         </p:nvSpPr>
         <p:spPr bwMode="auto">
@@ -627,12 +643,12 @@
       </p:sp>
       <p:sp>
         <p:nvSpPr>
-          <p:cNvPr id="6" name="Дата 3" hidden="0"/>
-          <p:cNvSpPr>
-            <a:spLocks noGrp="1"/>
-          </p:cNvSpPr>
-          <p:nvPr isPhoto="0" userDrawn="0">
-            <p:ph type="dt" sz="half" idx="10" hasCustomPrompt="0"/>
+          <p:cNvPr id="6" name="Дата 3"/>
+          <p:cNvSpPr>
+            <a:spLocks noGrp="1"/>
+          </p:cNvSpPr>
+          <p:nvPr>
+            <p:ph type="dt" sz="half" idx="10"/>
           </p:nvPr>
         </p:nvSpPr>
         <p:spPr bwMode="auto"/>
@@ -645,7 +661,7 @@
             </a:pPr>
             <a:fld id="{BCC18F51-09EC-435C-A3BA-64A766E099C0}" type="datetimeFigureOut">
               <a:rPr lang="ru-RU"/>
-              <a:t/>
+              <a:t>26.11.2021</a:t>
             </a:fld>
             <a:endParaRPr lang="ru-RU"/>
           </a:p>
@@ -653,12 +669,12 @@
       </p:sp>
       <p:sp>
         <p:nvSpPr>
-          <p:cNvPr id="7" name="Нижний колонтитул 4" hidden="0"/>
-          <p:cNvSpPr>
-            <a:spLocks noGrp="1"/>
-          </p:cNvSpPr>
-          <p:nvPr isPhoto="0" userDrawn="0">
-            <p:ph type="ftr" sz="quarter" idx="11" hasCustomPrompt="0"/>
+          <p:cNvPr id="7" name="Нижний колонтитул 4"/>
+          <p:cNvSpPr>
+            <a:spLocks noGrp="1"/>
+          </p:cNvSpPr>
+          <p:nvPr>
+            <p:ph type="ftr" sz="quarter" idx="11"/>
           </p:nvPr>
         </p:nvSpPr>
         <p:spPr bwMode="auto"/>
@@ -675,12 +691,12 @@
       </p:sp>
       <p:sp>
         <p:nvSpPr>
-          <p:cNvPr id="8" name="Номер слайда 5" hidden="0"/>
-          <p:cNvSpPr>
-            <a:spLocks noGrp="1"/>
-          </p:cNvSpPr>
-          <p:nvPr isPhoto="0" userDrawn="0">
-            <p:ph type="sldNum" sz="quarter" idx="12" hasCustomPrompt="0"/>
+          <p:cNvPr id="8" name="Номер слайда 5"/>
+          <p:cNvSpPr>
+            <a:spLocks noGrp="1"/>
+          </p:cNvSpPr>
+          <p:nvPr>
+            <p:ph type="sldNum" sz="quarter" idx="12"/>
           </p:nvPr>
         </p:nvSpPr>
         <p:spPr bwMode="auto"/>
@@ -693,7 +709,7 @@
             </a:pPr>
             <a:fld id="{08395586-F03A-48D1-94DF-16B239DF4FB5}" type="slidenum">
               <a:rPr lang="ru-RU"/>
-              <a:t/>
+              <a:t>‹#›</a:t>
             </a:fld>
             <a:endParaRPr lang="ru-RU"/>
           </a:p>
@@ -708,13 +724,13 @@
 </file>
 
 <file path=ppt/slideLayouts/slideLayout2.xml><?xml version="1.0" encoding="utf-8"?>
-<p:sldLayout xmlns:a="http://schemas.openxmlformats.org/drawingml/2006/main" xmlns:r="http://schemas.openxmlformats.org/officeDocument/2006/relationships" xmlns:p="http://schemas.openxmlformats.org/presentationml/2006/main" xmlns:m="http://schemas.openxmlformats.org/officeDocument/2006/math" xmlns:w="http://schemas.openxmlformats.org/wordprocessingml/2006/main" matchingName="" preserve="1" showMasterPhAnim="0" type="obj" userDrawn="1">
+<p:sldLayout xmlns:a="http://schemas.openxmlformats.org/drawingml/2006/main" xmlns:r="http://schemas.openxmlformats.org/officeDocument/2006/relationships" xmlns:p="http://schemas.openxmlformats.org/presentationml/2006/main" showMasterPhAnim="0" type="obj" preserve="1" userDrawn="1">
   <p:cSld name="Заголовок и объект">
     <p:spTree>
       <p:nvGrpSpPr>
-        <p:cNvPr id="1" name="" hidden="0"/>
+        <p:cNvPr id="1" name=""/>
         <p:cNvGrpSpPr/>
-        <p:nvPr isPhoto="0" userDrawn="0"/>
+        <p:nvPr/>
       </p:nvGrpSpPr>
       <p:grpSpPr bwMode="auto">
         <a:xfrm>
@@ -726,12 +742,12 @@
       </p:grpSpPr>
       <p:sp>
         <p:nvSpPr>
-          <p:cNvPr id="4" name="Заголовок 1" hidden="0"/>
-          <p:cNvSpPr>
-            <a:spLocks noGrp="1"/>
-          </p:cNvSpPr>
-          <p:nvPr isPhoto="0" userDrawn="0">
-            <p:ph type="title" hasCustomPrompt="0"/>
+          <p:cNvPr id="4" name="Заголовок 1"/>
+          <p:cNvSpPr>
+            <a:spLocks noGrp="1"/>
+          </p:cNvSpPr>
+          <p:nvPr>
+            <p:ph type="title"/>
           </p:nvPr>
         </p:nvSpPr>
         <p:spPr bwMode="auto"/>
@@ -752,12 +768,12 @@
       </p:sp>
       <p:sp>
         <p:nvSpPr>
-          <p:cNvPr id="5" name="Объект 2" hidden="0"/>
-          <p:cNvSpPr>
-            <a:spLocks noGrp="1"/>
-          </p:cNvSpPr>
-          <p:nvPr isPhoto="0" userDrawn="0">
-            <p:ph idx="1" hasCustomPrompt="0"/>
+          <p:cNvPr id="5" name="Объект 2"/>
+          <p:cNvSpPr>
+            <a:spLocks noGrp="1"/>
+          </p:cNvSpPr>
+          <p:nvPr>
+            <p:ph idx="1"/>
           </p:nvPr>
         </p:nvSpPr>
         <p:spPr bwMode="auto"/>
@@ -818,12 +834,12 @@
       </p:sp>
       <p:sp>
         <p:nvSpPr>
-          <p:cNvPr id="6" name="Дата 3" hidden="0"/>
-          <p:cNvSpPr>
-            <a:spLocks noGrp="1"/>
-          </p:cNvSpPr>
-          <p:nvPr isPhoto="0" userDrawn="0">
-            <p:ph type="dt" sz="half" idx="10" hasCustomPrompt="0"/>
+          <p:cNvPr id="6" name="Дата 3"/>
+          <p:cNvSpPr>
+            <a:spLocks noGrp="1"/>
+          </p:cNvSpPr>
+          <p:nvPr>
+            <p:ph type="dt" sz="half" idx="10"/>
           </p:nvPr>
         </p:nvSpPr>
         <p:spPr bwMode="auto"/>
@@ -836,7 +852,7 @@
             </a:pPr>
             <a:fld id="{BCC18F51-09EC-435C-A3BA-64A766E099C0}" type="datetimeFigureOut">
               <a:rPr lang="ru-RU"/>
-              <a:t/>
+              <a:t>26.11.2021</a:t>
             </a:fld>
             <a:endParaRPr lang="ru-RU"/>
           </a:p>
@@ -844,12 +860,12 @@
       </p:sp>
       <p:sp>
         <p:nvSpPr>
-          <p:cNvPr id="7" name="Нижний колонтитул 4" hidden="0"/>
-          <p:cNvSpPr>
-            <a:spLocks noGrp="1"/>
-          </p:cNvSpPr>
-          <p:nvPr isPhoto="0" userDrawn="0">
-            <p:ph type="ftr" sz="quarter" idx="11" hasCustomPrompt="0"/>
+          <p:cNvPr id="7" name="Нижний колонтитул 4"/>
+          <p:cNvSpPr>
+            <a:spLocks noGrp="1"/>
+          </p:cNvSpPr>
+          <p:nvPr>
+            <p:ph type="ftr" sz="quarter" idx="11"/>
           </p:nvPr>
         </p:nvSpPr>
         <p:spPr bwMode="auto"/>
@@ -866,12 +882,12 @@
       </p:sp>
       <p:sp>
         <p:nvSpPr>
-          <p:cNvPr id="8" name="Номер слайда 5" hidden="0"/>
-          <p:cNvSpPr>
-            <a:spLocks noGrp="1"/>
-          </p:cNvSpPr>
-          <p:nvPr isPhoto="0" userDrawn="0">
-            <p:ph type="sldNum" sz="quarter" idx="12" hasCustomPrompt="0"/>
+          <p:cNvPr id="8" name="Номер слайда 5"/>
+          <p:cNvSpPr>
+            <a:spLocks noGrp="1"/>
+          </p:cNvSpPr>
+          <p:nvPr>
+            <p:ph type="sldNum" sz="quarter" idx="12"/>
           </p:nvPr>
         </p:nvSpPr>
         <p:spPr bwMode="auto"/>
@@ -884,7 +900,7 @@
             </a:pPr>
             <a:fld id="{08395586-F03A-48D1-94DF-16B239DF4FB5}" type="slidenum">
               <a:rPr lang="ru-RU"/>
-              <a:t/>
+              <a:t>‹#›</a:t>
             </a:fld>
             <a:endParaRPr lang="ru-RU"/>
           </a:p>
@@ -899,13 +915,13 @@
 </file>
 
 <file path=ppt/slideLayouts/slideLayout3.xml><?xml version="1.0" encoding="utf-8"?>
-<p:sldLayout xmlns:a="http://schemas.openxmlformats.org/drawingml/2006/main" xmlns:r="http://schemas.openxmlformats.org/officeDocument/2006/relationships" xmlns:p="http://schemas.openxmlformats.org/presentationml/2006/main" xmlns:m="http://schemas.openxmlformats.org/officeDocument/2006/math" xmlns:w="http://schemas.openxmlformats.org/wordprocessingml/2006/main" matchingName="" preserve="1" showMasterPhAnim="0" type="secHead" userDrawn="1">
+<p:sldLayout xmlns:a="http://schemas.openxmlformats.org/drawingml/2006/main" xmlns:r="http://schemas.openxmlformats.org/officeDocument/2006/relationships" xmlns:p="http://schemas.openxmlformats.org/presentationml/2006/main" showMasterPhAnim="0" type="secHead" preserve="1" userDrawn="1">
   <p:cSld name="Заголовок раздела">
     <p:spTree>
       <p:nvGrpSpPr>
-        <p:cNvPr id="1" name="" hidden="0"/>
+        <p:cNvPr id="1" name=""/>
         <p:cNvGrpSpPr/>
-        <p:nvPr isPhoto="0" userDrawn="0"/>
+        <p:nvPr/>
       </p:nvGrpSpPr>
       <p:grpSpPr bwMode="auto">
         <a:xfrm>
@@ -917,12 +933,12 @@
       </p:grpSpPr>
       <p:sp>
         <p:nvSpPr>
-          <p:cNvPr id="4" name="Заголовок 1" hidden="0"/>
-          <p:cNvSpPr>
-            <a:spLocks noGrp="1"/>
-          </p:cNvSpPr>
-          <p:nvPr isPhoto="0" userDrawn="0">
-            <p:ph type="title" hasCustomPrompt="0"/>
+          <p:cNvPr id="4" name="Заголовок 1"/>
+          <p:cNvSpPr>
+            <a:spLocks noGrp="1"/>
+          </p:cNvSpPr>
+          <p:nvPr>
+            <p:ph type="title"/>
           </p:nvPr>
         </p:nvSpPr>
         <p:spPr bwMode="auto">
@@ -952,12 +968,12 @@
       </p:sp>
       <p:sp>
         <p:nvSpPr>
-          <p:cNvPr id="5" name="Текст 2" hidden="0"/>
-          <p:cNvSpPr>
-            <a:spLocks noGrp="1"/>
-          </p:cNvSpPr>
-          <p:nvPr isPhoto="0" userDrawn="0">
-            <p:ph type="body" idx="1" hasCustomPrompt="0"/>
+          <p:cNvPr id="5" name="Текст 2"/>
+          <p:cNvSpPr>
+            <a:spLocks noGrp="1"/>
+          </p:cNvSpPr>
+          <p:nvPr>
+            <p:ph type="body" idx="1"/>
           </p:nvPr>
         </p:nvSpPr>
         <p:spPr bwMode="auto">
@@ -1074,12 +1090,12 @@
       </p:sp>
       <p:sp>
         <p:nvSpPr>
-          <p:cNvPr id="6" name="Дата 3" hidden="0"/>
-          <p:cNvSpPr>
-            <a:spLocks noGrp="1"/>
-          </p:cNvSpPr>
-          <p:nvPr isPhoto="0" userDrawn="0">
-            <p:ph type="dt" sz="half" idx="10" hasCustomPrompt="0"/>
+          <p:cNvPr id="6" name="Дата 3"/>
+          <p:cNvSpPr>
+            <a:spLocks noGrp="1"/>
+          </p:cNvSpPr>
+          <p:nvPr>
+            <p:ph type="dt" sz="half" idx="10"/>
           </p:nvPr>
         </p:nvSpPr>
         <p:spPr bwMode="auto"/>
@@ -1092,7 +1108,7 @@
             </a:pPr>
             <a:fld id="{BCC18F51-09EC-435C-A3BA-64A766E099C0}" type="datetimeFigureOut">
               <a:rPr lang="ru-RU"/>
-              <a:t/>
+              <a:t>26.11.2021</a:t>
             </a:fld>
             <a:endParaRPr lang="ru-RU"/>
           </a:p>
@@ -1100,12 +1116,12 @@
       </p:sp>
       <p:sp>
         <p:nvSpPr>
-          <p:cNvPr id="7" name="Нижний колонтитул 4" hidden="0"/>
-          <p:cNvSpPr>
-            <a:spLocks noGrp="1"/>
-          </p:cNvSpPr>
-          <p:nvPr isPhoto="0" userDrawn="0">
-            <p:ph type="ftr" sz="quarter" idx="11" hasCustomPrompt="0"/>
+          <p:cNvPr id="7" name="Нижний колонтитул 4"/>
+          <p:cNvSpPr>
+            <a:spLocks noGrp="1"/>
+          </p:cNvSpPr>
+          <p:nvPr>
+            <p:ph type="ftr" sz="quarter" idx="11"/>
           </p:nvPr>
         </p:nvSpPr>
         <p:spPr bwMode="auto"/>
@@ -1122,12 +1138,12 @@
       </p:sp>
       <p:sp>
         <p:nvSpPr>
-          <p:cNvPr id="8" name="Номер слайда 5" hidden="0"/>
-          <p:cNvSpPr>
-            <a:spLocks noGrp="1"/>
-          </p:cNvSpPr>
-          <p:nvPr isPhoto="0" userDrawn="0">
-            <p:ph type="sldNum" sz="quarter" idx="12" hasCustomPrompt="0"/>
+          <p:cNvPr id="8" name="Номер слайда 5"/>
+          <p:cNvSpPr>
+            <a:spLocks noGrp="1"/>
+          </p:cNvSpPr>
+          <p:nvPr>
+            <p:ph type="sldNum" sz="quarter" idx="12"/>
           </p:nvPr>
         </p:nvSpPr>
         <p:spPr bwMode="auto"/>
@@ -1140,7 +1156,7 @@
             </a:pPr>
             <a:fld id="{08395586-F03A-48D1-94DF-16B239DF4FB5}" type="slidenum">
               <a:rPr lang="ru-RU"/>
-              <a:t/>
+              <a:t>‹#›</a:t>
             </a:fld>
             <a:endParaRPr lang="ru-RU"/>
           </a:p>
@@ -1155,13 +1171,13 @@
 </file>
 
 <file path=ppt/slideLayouts/slideLayout4.xml><?xml version="1.0" encoding="utf-8"?>
-<p:sldLayout xmlns:a="http://schemas.openxmlformats.org/drawingml/2006/main" xmlns:r="http://schemas.openxmlformats.org/officeDocument/2006/relationships" xmlns:p="http://schemas.openxmlformats.org/presentationml/2006/main" xmlns:m="http://schemas.openxmlformats.org/officeDocument/2006/math" xmlns:w="http://schemas.openxmlformats.org/wordprocessingml/2006/main" matchingName="" preserve="1" showMasterPhAnim="0" type="twoObj" userDrawn="1">
+<p:sldLayout xmlns:a="http://schemas.openxmlformats.org/drawingml/2006/main" xmlns:r="http://schemas.openxmlformats.org/officeDocument/2006/relationships" xmlns:p="http://schemas.openxmlformats.org/presentationml/2006/main" showMasterPhAnim="0" type="twoObj" preserve="1" userDrawn="1">
   <p:cSld name="Два объекта">
     <p:spTree>
       <p:nvGrpSpPr>
-        <p:cNvPr id="1" name="" hidden="0"/>
+        <p:cNvPr id="1" name=""/>
         <p:cNvGrpSpPr/>
-        <p:nvPr isPhoto="0" userDrawn="0"/>
+        <p:nvPr/>
       </p:nvGrpSpPr>
       <p:grpSpPr bwMode="auto">
         <a:xfrm>
@@ -1173,12 +1189,12 @@
       </p:grpSpPr>
       <p:sp>
         <p:nvSpPr>
-          <p:cNvPr id="4" name="Заголовок 1" hidden="0"/>
-          <p:cNvSpPr>
-            <a:spLocks noGrp="1"/>
-          </p:cNvSpPr>
-          <p:nvPr isPhoto="0" userDrawn="0">
-            <p:ph type="title" hasCustomPrompt="0"/>
+          <p:cNvPr id="4" name="Заголовок 1"/>
+          <p:cNvSpPr>
+            <a:spLocks noGrp="1"/>
+          </p:cNvSpPr>
+          <p:nvPr>
+            <p:ph type="title"/>
           </p:nvPr>
         </p:nvSpPr>
         <p:spPr bwMode="auto"/>
@@ -1199,12 +1215,12 @@
       </p:sp>
       <p:sp>
         <p:nvSpPr>
-          <p:cNvPr id="5" name="Объект 2" hidden="0"/>
-          <p:cNvSpPr>
-            <a:spLocks noGrp="1"/>
-          </p:cNvSpPr>
-          <p:nvPr isPhoto="0" userDrawn="0">
-            <p:ph sz="half" idx="1" hasCustomPrompt="0"/>
+          <p:cNvPr id="5" name="Объект 2"/>
+          <p:cNvSpPr>
+            <a:spLocks noGrp="1"/>
+          </p:cNvSpPr>
+          <p:nvPr>
+            <p:ph sz="half" idx="1"/>
           </p:nvPr>
         </p:nvSpPr>
         <p:spPr bwMode="auto">
@@ -1270,12 +1286,12 @@
       </p:sp>
       <p:sp>
         <p:nvSpPr>
-          <p:cNvPr id="6" name="Объект 3" hidden="0"/>
-          <p:cNvSpPr>
-            <a:spLocks noGrp="1"/>
-          </p:cNvSpPr>
-          <p:nvPr isPhoto="0" userDrawn="0">
-            <p:ph sz="half" idx="2" hasCustomPrompt="0"/>
+          <p:cNvPr id="6" name="Объект 3"/>
+          <p:cNvSpPr>
+            <a:spLocks noGrp="1"/>
+          </p:cNvSpPr>
+          <p:nvPr>
+            <p:ph sz="half" idx="2"/>
           </p:nvPr>
         </p:nvSpPr>
         <p:spPr bwMode="auto">
@@ -1341,12 +1357,12 @@
       </p:sp>
       <p:sp>
         <p:nvSpPr>
-          <p:cNvPr id="7" name="Дата 4" hidden="0"/>
-          <p:cNvSpPr>
-            <a:spLocks noGrp="1"/>
-          </p:cNvSpPr>
-          <p:nvPr isPhoto="0" userDrawn="0">
-            <p:ph type="dt" sz="half" idx="10" hasCustomPrompt="0"/>
+          <p:cNvPr id="7" name="Дата 4"/>
+          <p:cNvSpPr>
+            <a:spLocks noGrp="1"/>
+          </p:cNvSpPr>
+          <p:nvPr>
+            <p:ph type="dt" sz="half" idx="10"/>
           </p:nvPr>
         </p:nvSpPr>
         <p:spPr bwMode="auto"/>
@@ -1359,7 +1375,7 @@
             </a:pPr>
             <a:fld id="{BCC18F51-09EC-435C-A3BA-64A766E099C0}" type="datetimeFigureOut">
               <a:rPr lang="ru-RU"/>
-              <a:t/>
+              <a:t>26.11.2021</a:t>
             </a:fld>
             <a:endParaRPr lang="ru-RU"/>
           </a:p>
@@ -1367,12 +1383,12 @@
       </p:sp>
       <p:sp>
         <p:nvSpPr>
-          <p:cNvPr id="8" name="Нижний колонтитул 5" hidden="0"/>
-          <p:cNvSpPr>
-            <a:spLocks noGrp="1"/>
-          </p:cNvSpPr>
-          <p:nvPr isPhoto="0" userDrawn="0">
-            <p:ph type="ftr" sz="quarter" idx="11" hasCustomPrompt="0"/>
+          <p:cNvPr id="8" name="Нижний колонтитул 5"/>
+          <p:cNvSpPr>
+            <a:spLocks noGrp="1"/>
+          </p:cNvSpPr>
+          <p:nvPr>
+            <p:ph type="ftr" sz="quarter" idx="11"/>
           </p:nvPr>
         </p:nvSpPr>
         <p:spPr bwMode="auto"/>
@@ -1389,12 +1405,12 @@
       </p:sp>
       <p:sp>
         <p:nvSpPr>
-          <p:cNvPr id="9" name="Номер слайда 6" hidden="0"/>
-          <p:cNvSpPr>
-            <a:spLocks noGrp="1"/>
-          </p:cNvSpPr>
-          <p:nvPr isPhoto="0" userDrawn="0">
-            <p:ph type="sldNum" sz="quarter" idx="12" hasCustomPrompt="0"/>
+          <p:cNvPr id="9" name="Номер слайда 6"/>
+          <p:cNvSpPr>
+            <a:spLocks noGrp="1"/>
+          </p:cNvSpPr>
+          <p:nvPr>
+            <p:ph type="sldNum" sz="quarter" idx="12"/>
           </p:nvPr>
         </p:nvSpPr>
         <p:spPr bwMode="auto"/>
@@ -1407,7 +1423,7 @@
             </a:pPr>
             <a:fld id="{08395586-F03A-48D1-94DF-16B239DF4FB5}" type="slidenum">
               <a:rPr lang="ru-RU"/>
-              <a:t/>
+              <a:t>‹#›</a:t>
             </a:fld>
             <a:endParaRPr lang="ru-RU"/>
           </a:p>
@@ -1422,13 +1438,13 @@
 </file>
 
 <file path=ppt/slideLayouts/slideLayout5.xml><?xml version="1.0" encoding="utf-8"?>
-<p:sldLayout xmlns:a="http://schemas.openxmlformats.org/drawingml/2006/main" xmlns:r="http://schemas.openxmlformats.org/officeDocument/2006/relationships" xmlns:p="http://schemas.openxmlformats.org/presentationml/2006/main" xmlns:m="http://schemas.openxmlformats.org/officeDocument/2006/math" xmlns:w="http://schemas.openxmlformats.org/wordprocessingml/2006/main" matchingName="" preserve="1" showMasterPhAnim="0" type="twoTxTwoObj" userDrawn="1">
+<p:sldLayout xmlns:a="http://schemas.openxmlformats.org/drawingml/2006/main" xmlns:r="http://schemas.openxmlformats.org/officeDocument/2006/relationships" xmlns:p="http://schemas.openxmlformats.org/presentationml/2006/main" showMasterPhAnim="0" type="twoTxTwoObj" preserve="1" userDrawn="1">
   <p:cSld name="Сравнение">
     <p:spTree>
       <p:nvGrpSpPr>
-        <p:cNvPr id="1" name="" hidden="0"/>
+        <p:cNvPr id="1" name=""/>
         <p:cNvGrpSpPr/>
-        <p:nvPr isPhoto="0" userDrawn="0"/>
+        <p:nvPr/>
       </p:nvGrpSpPr>
       <p:grpSpPr bwMode="auto">
         <a:xfrm>
@@ -1440,12 +1456,12 @@
       </p:grpSpPr>
       <p:sp>
         <p:nvSpPr>
-          <p:cNvPr id="4" name="Заголовок 1" hidden="0"/>
-          <p:cNvSpPr>
-            <a:spLocks noGrp="1"/>
-          </p:cNvSpPr>
-          <p:nvPr isPhoto="0" userDrawn="0">
-            <p:ph type="title" hasCustomPrompt="0"/>
+          <p:cNvPr id="4" name="Заголовок 1"/>
+          <p:cNvSpPr>
+            <a:spLocks noGrp="1"/>
+          </p:cNvSpPr>
+          <p:nvPr>
+            <p:ph type="title"/>
           </p:nvPr>
         </p:nvSpPr>
         <p:spPr bwMode="auto">
@@ -1471,12 +1487,12 @@
       </p:sp>
       <p:sp>
         <p:nvSpPr>
-          <p:cNvPr id="5" name="Текст 2" hidden="0"/>
-          <p:cNvSpPr>
-            <a:spLocks noGrp="1"/>
-          </p:cNvSpPr>
-          <p:nvPr isPhoto="0" userDrawn="0">
-            <p:ph type="body" idx="1" hasCustomPrompt="0"/>
+          <p:cNvPr id="5" name="Текст 2"/>
+          <p:cNvSpPr>
+            <a:spLocks noGrp="1"/>
+          </p:cNvSpPr>
+          <p:nvPr>
+            <p:ph type="body" idx="1"/>
           </p:nvPr>
         </p:nvSpPr>
         <p:spPr bwMode="auto">
@@ -1539,12 +1555,12 @@
       </p:sp>
       <p:sp>
         <p:nvSpPr>
-          <p:cNvPr id="6" name="Объект 3" hidden="0"/>
-          <p:cNvSpPr>
-            <a:spLocks noGrp="1"/>
-          </p:cNvSpPr>
-          <p:nvPr isPhoto="0" userDrawn="0">
-            <p:ph sz="half" idx="2" hasCustomPrompt="0"/>
+          <p:cNvPr id="6" name="Объект 3"/>
+          <p:cNvSpPr>
+            <a:spLocks noGrp="1"/>
+          </p:cNvSpPr>
+          <p:nvPr>
+            <p:ph sz="half" idx="2"/>
           </p:nvPr>
         </p:nvSpPr>
         <p:spPr bwMode="auto">
@@ -1610,12 +1626,12 @@
       </p:sp>
       <p:sp>
         <p:nvSpPr>
-          <p:cNvPr id="7" name="Текст 4" hidden="0"/>
-          <p:cNvSpPr>
-            <a:spLocks noGrp="1"/>
-          </p:cNvSpPr>
-          <p:nvPr isPhoto="0" userDrawn="0">
-            <p:ph type="body" sz="quarter" idx="3" hasCustomPrompt="0"/>
+          <p:cNvPr id="7" name="Текст 4"/>
+          <p:cNvSpPr>
+            <a:spLocks noGrp="1"/>
+          </p:cNvSpPr>
+          <p:nvPr>
+            <p:ph type="body" sz="quarter" idx="3"/>
           </p:nvPr>
         </p:nvSpPr>
         <p:spPr bwMode="auto">
@@ -1678,12 +1694,12 @@
       </p:sp>
       <p:sp>
         <p:nvSpPr>
-          <p:cNvPr id="8" name="Объект 5" hidden="0"/>
-          <p:cNvSpPr>
-            <a:spLocks noGrp="1"/>
-          </p:cNvSpPr>
-          <p:nvPr isPhoto="0" userDrawn="0">
-            <p:ph sz="quarter" idx="4" hasCustomPrompt="0"/>
+          <p:cNvPr id="8" name="Объект 5"/>
+          <p:cNvSpPr>
+            <a:spLocks noGrp="1"/>
+          </p:cNvSpPr>
+          <p:nvPr>
+            <p:ph sz="quarter" idx="4"/>
           </p:nvPr>
         </p:nvSpPr>
         <p:spPr bwMode="auto">
@@ -1749,12 +1765,12 @@
       </p:sp>
       <p:sp>
         <p:nvSpPr>
-          <p:cNvPr id="9" name="Дата 6" hidden="0"/>
-          <p:cNvSpPr>
-            <a:spLocks noGrp="1"/>
-          </p:cNvSpPr>
-          <p:nvPr isPhoto="0" userDrawn="0">
-            <p:ph type="dt" sz="half" idx="10" hasCustomPrompt="0"/>
+          <p:cNvPr id="9" name="Дата 6"/>
+          <p:cNvSpPr>
+            <a:spLocks noGrp="1"/>
+          </p:cNvSpPr>
+          <p:nvPr>
+            <p:ph type="dt" sz="half" idx="10"/>
           </p:nvPr>
         </p:nvSpPr>
         <p:spPr bwMode="auto"/>
@@ -1767,7 +1783,7 @@
             </a:pPr>
             <a:fld id="{BCC18F51-09EC-435C-A3BA-64A766E099C0}" type="datetimeFigureOut">
               <a:rPr lang="ru-RU"/>
-              <a:t/>
+              <a:t>26.11.2021</a:t>
             </a:fld>
             <a:endParaRPr lang="ru-RU"/>
           </a:p>
@@ -1775,12 +1791,12 @@
       </p:sp>
       <p:sp>
         <p:nvSpPr>
-          <p:cNvPr id="10" name="Нижний колонтитул 7" hidden="0"/>
-          <p:cNvSpPr>
-            <a:spLocks noGrp="1"/>
-          </p:cNvSpPr>
-          <p:nvPr isPhoto="0" userDrawn="0">
-            <p:ph type="ftr" sz="quarter" idx="11" hasCustomPrompt="0"/>
+          <p:cNvPr id="10" name="Нижний колонтитул 7"/>
+          <p:cNvSpPr>
+            <a:spLocks noGrp="1"/>
+          </p:cNvSpPr>
+          <p:nvPr>
+            <p:ph type="ftr" sz="quarter" idx="11"/>
           </p:nvPr>
         </p:nvSpPr>
         <p:spPr bwMode="auto"/>
@@ -1797,12 +1813,12 @@
       </p:sp>
       <p:sp>
         <p:nvSpPr>
-          <p:cNvPr id="11" name="Номер слайда 8" hidden="0"/>
-          <p:cNvSpPr>
-            <a:spLocks noGrp="1"/>
-          </p:cNvSpPr>
-          <p:nvPr isPhoto="0" userDrawn="0">
-            <p:ph type="sldNum" sz="quarter" idx="12" hasCustomPrompt="0"/>
+          <p:cNvPr id="11" name="Номер слайда 8"/>
+          <p:cNvSpPr>
+            <a:spLocks noGrp="1"/>
+          </p:cNvSpPr>
+          <p:nvPr>
+            <p:ph type="sldNum" sz="quarter" idx="12"/>
           </p:nvPr>
         </p:nvSpPr>
         <p:spPr bwMode="auto"/>
@@ -1815,7 +1831,7 @@
             </a:pPr>
             <a:fld id="{08395586-F03A-48D1-94DF-16B239DF4FB5}" type="slidenum">
               <a:rPr lang="ru-RU"/>
-              <a:t/>
+              <a:t>‹#›</a:t>
             </a:fld>
             <a:endParaRPr lang="ru-RU"/>
           </a:p>
@@ -1830,13 +1846,13 @@
 </file>
 
 <file path=ppt/slideLayouts/slideLayout6.xml><?xml version="1.0" encoding="utf-8"?>
-<p:sldLayout xmlns:a="http://schemas.openxmlformats.org/drawingml/2006/main" xmlns:r="http://schemas.openxmlformats.org/officeDocument/2006/relationships" xmlns:p="http://schemas.openxmlformats.org/presentationml/2006/main" xmlns:m="http://schemas.openxmlformats.org/officeDocument/2006/math" xmlns:w="http://schemas.openxmlformats.org/wordprocessingml/2006/main" matchingName="" preserve="1" showMasterPhAnim="0" type="titleOnly" userDrawn="1">
+<p:sldLayout xmlns:a="http://schemas.openxmlformats.org/drawingml/2006/main" xmlns:r="http://schemas.openxmlformats.org/officeDocument/2006/relationships" xmlns:p="http://schemas.openxmlformats.org/presentationml/2006/main" showMasterPhAnim="0" type="titleOnly" preserve="1" userDrawn="1">
   <p:cSld name="Только заголовок">
     <p:spTree>
       <p:nvGrpSpPr>
-        <p:cNvPr id="1" name="" hidden="0"/>
+        <p:cNvPr id="1" name=""/>
         <p:cNvGrpSpPr/>
-        <p:nvPr isPhoto="0" userDrawn="0"/>
+        <p:nvPr/>
       </p:nvGrpSpPr>
       <p:grpSpPr bwMode="auto">
         <a:xfrm>
@@ -1848,12 +1864,12 @@
       </p:grpSpPr>
       <p:sp>
         <p:nvSpPr>
-          <p:cNvPr id="4" name="Заголовок 1" hidden="0"/>
-          <p:cNvSpPr>
-            <a:spLocks noGrp="1"/>
-          </p:cNvSpPr>
-          <p:nvPr isPhoto="0" userDrawn="0">
-            <p:ph type="title" hasCustomPrompt="0"/>
+          <p:cNvPr id="4" name="Заголовок 1"/>
+          <p:cNvSpPr>
+            <a:spLocks noGrp="1"/>
+          </p:cNvSpPr>
+          <p:nvPr>
+            <p:ph type="title"/>
           </p:nvPr>
         </p:nvSpPr>
         <p:spPr bwMode="auto"/>
@@ -1874,12 +1890,12 @@
       </p:sp>
       <p:sp>
         <p:nvSpPr>
-          <p:cNvPr id="5" name="Дата 2" hidden="0"/>
-          <p:cNvSpPr>
-            <a:spLocks noGrp="1"/>
-          </p:cNvSpPr>
-          <p:nvPr isPhoto="0" userDrawn="0">
-            <p:ph type="dt" sz="half" idx="10" hasCustomPrompt="0"/>
+          <p:cNvPr id="5" name="Дата 2"/>
+          <p:cNvSpPr>
+            <a:spLocks noGrp="1"/>
+          </p:cNvSpPr>
+          <p:nvPr>
+            <p:ph type="dt" sz="half" idx="10"/>
           </p:nvPr>
         </p:nvSpPr>
         <p:spPr bwMode="auto"/>
@@ -1892,7 +1908,7 @@
             </a:pPr>
             <a:fld id="{BCC18F51-09EC-435C-A3BA-64A766E099C0}" type="datetimeFigureOut">
               <a:rPr lang="ru-RU"/>
-              <a:t/>
+              <a:t>26.11.2021</a:t>
             </a:fld>
             <a:endParaRPr lang="ru-RU"/>
           </a:p>
@@ -1900,12 +1916,12 @@
       </p:sp>
       <p:sp>
         <p:nvSpPr>
-          <p:cNvPr id="6" name="Нижний колонтитул 3" hidden="0"/>
-          <p:cNvSpPr>
-            <a:spLocks noGrp="1"/>
-          </p:cNvSpPr>
-          <p:nvPr isPhoto="0" userDrawn="0">
-            <p:ph type="ftr" sz="quarter" idx="11" hasCustomPrompt="0"/>
+          <p:cNvPr id="6" name="Нижний колонтитул 3"/>
+          <p:cNvSpPr>
+            <a:spLocks noGrp="1"/>
+          </p:cNvSpPr>
+          <p:nvPr>
+            <p:ph type="ftr" sz="quarter" idx="11"/>
           </p:nvPr>
         </p:nvSpPr>
         <p:spPr bwMode="auto"/>
@@ -1922,12 +1938,12 @@
       </p:sp>
       <p:sp>
         <p:nvSpPr>
-          <p:cNvPr id="7" name="Номер слайда 4" hidden="0"/>
-          <p:cNvSpPr>
-            <a:spLocks noGrp="1"/>
-          </p:cNvSpPr>
-          <p:nvPr isPhoto="0" userDrawn="0">
-            <p:ph type="sldNum" sz="quarter" idx="12" hasCustomPrompt="0"/>
+          <p:cNvPr id="7" name="Номер слайда 4"/>
+          <p:cNvSpPr>
+            <a:spLocks noGrp="1"/>
+          </p:cNvSpPr>
+          <p:nvPr>
+            <p:ph type="sldNum" sz="quarter" idx="12"/>
           </p:nvPr>
         </p:nvSpPr>
         <p:spPr bwMode="auto"/>
@@ -1940,7 +1956,7 @@
             </a:pPr>
             <a:fld id="{08395586-F03A-48D1-94DF-16B239DF4FB5}" type="slidenum">
               <a:rPr lang="ru-RU"/>
-              <a:t/>
+              <a:t>‹#›</a:t>
             </a:fld>
             <a:endParaRPr lang="ru-RU"/>
           </a:p>
@@ -1955,13 +1971,13 @@
 </file>
 
 <file path=ppt/slideLayouts/slideLayout7.xml><?xml version="1.0" encoding="utf-8"?>
-<p:sldLayout xmlns:a="http://schemas.openxmlformats.org/drawingml/2006/main" xmlns:r="http://schemas.openxmlformats.org/officeDocument/2006/relationships" xmlns:p="http://schemas.openxmlformats.org/presentationml/2006/main" xmlns:m="http://schemas.openxmlformats.org/officeDocument/2006/math" xmlns:w="http://schemas.openxmlformats.org/wordprocessingml/2006/main" matchingName="" preserve="1" showMasterPhAnim="0" type="blank" userDrawn="1">
+<p:sldLayout xmlns:a="http://schemas.openxmlformats.org/drawingml/2006/main" xmlns:r="http://schemas.openxmlformats.org/officeDocument/2006/relationships" xmlns:p="http://schemas.openxmlformats.org/presentationml/2006/main" showMasterPhAnim="0" type="blank" preserve="1" userDrawn="1">
   <p:cSld name="Пустой слайд">
     <p:spTree>
       <p:nvGrpSpPr>
-        <p:cNvPr id="1" name="" hidden="0"/>
+        <p:cNvPr id="1" name=""/>
         <p:cNvGrpSpPr/>
-        <p:nvPr isPhoto="0" userDrawn="0"/>
+        <p:nvPr/>
       </p:nvGrpSpPr>
       <p:grpSpPr bwMode="auto">
         <a:xfrm>
@@ -1973,12 +1989,12 @@
       </p:grpSpPr>
       <p:sp>
         <p:nvSpPr>
-          <p:cNvPr id="4" name="Дата 1" hidden="0"/>
-          <p:cNvSpPr>
-            <a:spLocks noGrp="1"/>
-          </p:cNvSpPr>
-          <p:nvPr isPhoto="0" userDrawn="0">
-            <p:ph type="dt" sz="half" idx="10" hasCustomPrompt="0"/>
+          <p:cNvPr id="4" name="Дата 1"/>
+          <p:cNvSpPr>
+            <a:spLocks noGrp="1"/>
+          </p:cNvSpPr>
+          <p:nvPr>
+            <p:ph type="dt" sz="half" idx="10"/>
           </p:nvPr>
         </p:nvSpPr>
         <p:spPr bwMode="auto"/>
@@ -1991,7 +2007,7 @@
             </a:pPr>
             <a:fld id="{BCC18F51-09EC-435C-A3BA-64A766E099C0}" type="datetimeFigureOut">
               <a:rPr lang="ru-RU"/>
-              <a:t/>
+              <a:t>26.11.2021</a:t>
             </a:fld>
             <a:endParaRPr lang="ru-RU"/>
           </a:p>
@@ -1999,12 +2015,12 @@
       </p:sp>
       <p:sp>
         <p:nvSpPr>
-          <p:cNvPr id="5" name="Нижний колонтитул 2" hidden="0"/>
-          <p:cNvSpPr>
-            <a:spLocks noGrp="1"/>
-          </p:cNvSpPr>
-          <p:nvPr isPhoto="0" userDrawn="0">
-            <p:ph type="ftr" sz="quarter" idx="11" hasCustomPrompt="0"/>
+          <p:cNvPr id="5" name="Нижний колонтитул 2"/>
+          <p:cNvSpPr>
+            <a:spLocks noGrp="1"/>
+          </p:cNvSpPr>
+          <p:nvPr>
+            <p:ph type="ftr" sz="quarter" idx="11"/>
           </p:nvPr>
         </p:nvSpPr>
         <p:spPr bwMode="auto"/>
@@ -2021,12 +2037,12 @@
       </p:sp>
       <p:sp>
         <p:nvSpPr>
-          <p:cNvPr id="6" name="Номер слайда 3" hidden="0"/>
-          <p:cNvSpPr>
-            <a:spLocks noGrp="1"/>
-          </p:cNvSpPr>
-          <p:nvPr isPhoto="0" userDrawn="0">
-            <p:ph type="sldNum" sz="quarter" idx="12" hasCustomPrompt="0"/>
+          <p:cNvPr id="6" name="Номер слайда 3"/>
+          <p:cNvSpPr>
+            <a:spLocks noGrp="1"/>
+          </p:cNvSpPr>
+          <p:nvPr>
+            <p:ph type="sldNum" sz="quarter" idx="12"/>
           </p:nvPr>
         </p:nvSpPr>
         <p:spPr bwMode="auto"/>
@@ -2039,7 +2055,7 @@
             </a:pPr>
             <a:fld id="{08395586-F03A-48D1-94DF-16B239DF4FB5}" type="slidenum">
               <a:rPr lang="ru-RU"/>
-              <a:t/>
+              <a:t>‹#›</a:t>
             </a:fld>
             <a:endParaRPr lang="ru-RU"/>
           </a:p>
@@ -2054,13 +2070,13 @@
 </file>
 
 <file path=ppt/slideLayouts/slideLayout8.xml><?xml version="1.0" encoding="utf-8"?>
-<p:sldLayout xmlns:a="http://schemas.openxmlformats.org/drawingml/2006/main" xmlns:r="http://schemas.openxmlformats.org/officeDocument/2006/relationships" xmlns:p="http://schemas.openxmlformats.org/presentationml/2006/main" xmlns:m="http://schemas.openxmlformats.org/officeDocument/2006/math" xmlns:w="http://schemas.openxmlformats.org/wordprocessingml/2006/main" matchingName="" preserve="1" showMasterPhAnim="0" type="objTx" userDrawn="1">
+<p:sldLayout xmlns:a="http://schemas.openxmlformats.org/drawingml/2006/main" xmlns:r="http://schemas.openxmlformats.org/officeDocument/2006/relationships" xmlns:p="http://schemas.openxmlformats.org/presentationml/2006/main" showMasterPhAnim="0" type="objTx" preserve="1" userDrawn="1">
   <p:cSld name="Объект с подписью">
     <p:spTree>
       <p:nvGrpSpPr>
-        <p:cNvPr id="1" name="" hidden="0"/>
+        <p:cNvPr id="1" name=""/>
         <p:cNvGrpSpPr/>
-        <p:nvPr isPhoto="0" userDrawn="0"/>
+        <p:nvPr/>
       </p:nvGrpSpPr>
       <p:grpSpPr bwMode="auto">
         <a:xfrm>
@@ -2072,12 +2088,12 @@
       </p:grpSpPr>
       <p:sp>
         <p:nvSpPr>
-          <p:cNvPr id="4" name="Заголовок 1" hidden="0"/>
-          <p:cNvSpPr>
-            <a:spLocks noGrp="1"/>
-          </p:cNvSpPr>
-          <p:nvPr isPhoto="0" userDrawn="0">
-            <p:ph type="title" hasCustomPrompt="0"/>
+          <p:cNvPr id="4" name="Заголовок 1"/>
+          <p:cNvSpPr>
+            <a:spLocks noGrp="1"/>
+          </p:cNvSpPr>
+          <p:nvPr>
+            <p:ph type="title"/>
           </p:nvPr>
         </p:nvSpPr>
         <p:spPr bwMode="auto">
@@ -2107,12 +2123,12 @@
       </p:sp>
       <p:sp>
         <p:nvSpPr>
-          <p:cNvPr id="5" name="Объект 2" hidden="0"/>
-          <p:cNvSpPr>
-            <a:spLocks noGrp="1"/>
-          </p:cNvSpPr>
-          <p:nvPr isPhoto="0" userDrawn="0">
-            <p:ph idx="1" hasCustomPrompt="0"/>
+          <p:cNvPr id="5" name="Объект 2"/>
+          <p:cNvSpPr>
+            <a:spLocks noGrp="1"/>
+          </p:cNvSpPr>
+          <p:nvPr>
+            <p:ph idx="1"/>
           </p:nvPr>
         </p:nvSpPr>
         <p:spPr bwMode="auto">
@@ -2206,12 +2222,12 @@
       </p:sp>
       <p:sp>
         <p:nvSpPr>
-          <p:cNvPr id="6" name="Текст 3" hidden="0"/>
-          <p:cNvSpPr>
-            <a:spLocks noGrp="1"/>
-          </p:cNvSpPr>
-          <p:nvPr isPhoto="0" userDrawn="0">
-            <p:ph type="body" sz="half" idx="2" hasCustomPrompt="0"/>
+          <p:cNvPr id="6" name="Текст 3"/>
+          <p:cNvSpPr>
+            <a:spLocks noGrp="1"/>
+          </p:cNvSpPr>
+          <p:nvPr>
+            <p:ph type="body" sz="half" idx="2"/>
           </p:nvPr>
         </p:nvSpPr>
         <p:spPr bwMode="auto">
@@ -2274,12 +2290,12 @@
       </p:sp>
       <p:sp>
         <p:nvSpPr>
-          <p:cNvPr id="7" name="Дата 4" hidden="0"/>
-          <p:cNvSpPr>
-            <a:spLocks noGrp="1"/>
-          </p:cNvSpPr>
-          <p:nvPr isPhoto="0" userDrawn="0">
-            <p:ph type="dt" sz="half" idx="10" hasCustomPrompt="0"/>
+          <p:cNvPr id="7" name="Дата 4"/>
+          <p:cNvSpPr>
+            <a:spLocks noGrp="1"/>
+          </p:cNvSpPr>
+          <p:nvPr>
+            <p:ph type="dt" sz="half" idx="10"/>
           </p:nvPr>
         </p:nvSpPr>
         <p:spPr bwMode="auto"/>
@@ -2292,7 +2308,7 @@
             </a:pPr>
             <a:fld id="{BCC18F51-09EC-435C-A3BA-64A766E099C0}" type="datetimeFigureOut">
               <a:rPr lang="ru-RU"/>
-              <a:t/>
+              <a:t>26.11.2021</a:t>
             </a:fld>
             <a:endParaRPr lang="ru-RU"/>
           </a:p>
@@ -2300,12 +2316,12 @@
       </p:sp>
       <p:sp>
         <p:nvSpPr>
-          <p:cNvPr id="8" name="Нижний колонтитул 5" hidden="0"/>
-          <p:cNvSpPr>
-            <a:spLocks noGrp="1"/>
-          </p:cNvSpPr>
-          <p:nvPr isPhoto="0" userDrawn="0">
-            <p:ph type="ftr" sz="quarter" idx="11" hasCustomPrompt="0"/>
+          <p:cNvPr id="8" name="Нижний колонтитул 5"/>
+          <p:cNvSpPr>
+            <a:spLocks noGrp="1"/>
+          </p:cNvSpPr>
+          <p:nvPr>
+            <p:ph type="ftr" sz="quarter" idx="11"/>
           </p:nvPr>
         </p:nvSpPr>
         <p:spPr bwMode="auto"/>
@@ -2322,12 +2338,12 @@
       </p:sp>
       <p:sp>
         <p:nvSpPr>
-          <p:cNvPr id="9" name="Номер слайда 6" hidden="0"/>
-          <p:cNvSpPr>
-            <a:spLocks noGrp="1"/>
-          </p:cNvSpPr>
-          <p:nvPr isPhoto="0" userDrawn="0">
-            <p:ph type="sldNum" sz="quarter" idx="12" hasCustomPrompt="0"/>
+          <p:cNvPr id="9" name="Номер слайда 6"/>
+          <p:cNvSpPr>
+            <a:spLocks noGrp="1"/>
+          </p:cNvSpPr>
+          <p:nvPr>
+            <p:ph type="sldNum" sz="quarter" idx="12"/>
           </p:nvPr>
         </p:nvSpPr>
         <p:spPr bwMode="auto"/>
@@ -2340,7 +2356,7 @@
             </a:pPr>
             <a:fld id="{08395586-F03A-48D1-94DF-16B239DF4FB5}" type="slidenum">
               <a:rPr lang="ru-RU"/>
-              <a:t/>
+              <a:t>‹#›</a:t>
             </a:fld>
             <a:endParaRPr lang="ru-RU"/>
           </a:p>
@@ -2355,13 +2371,13 @@
 </file>
 
 <file path=ppt/slideLayouts/slideLayout9.xml><?xml version="1.0" encoding="utf-8"?>
-<p:sldLayout xmlns:a="http://schemas.openxmlformats.org/drawingml/2006/main" xmlns:r="http://schemas.openxmlformats.org/officeDocument/2006/relationships" xmlns:p="http://schemas.openxmlformats.org/presentationml/2006/main" xmlns:m="http://schemas.openxmlformats.org/officeDocument/2006/math" xmlns:w="http://schemas.openxmlformats.org/wordprocessingml/2006/main" matchingName="" preserve="1" showMasterPhAnim="0" type="picTx" userDrawn="1">
+<p:sldLayout xmlns:a="http://schemas.openxmlformats.org/drawingml/2006/main" xmlns:r="http://schemas.openxmlformats.org/officeDocument/2006/relationships" xmlns:p="http://schemas.openxmlformats.org/presentationml/2006/main" showMasterPhAnim="0" type="picTx" preserve="1" userDrawn="1">
   <p:cSld name="Рисунок с подписью">
     <p:spTree>
       <p:nvGrpSpPr>
-        <p:cNvPr id="1" name="" hidden="0"/>
+        <p:cNvPr id="1" name=""/>
         <p:cNvGrpSpPr/>
-        <p:nvPr isPhoto="0" userDrawn="0"/>
+        <p:nvPr/>
       </p:nvGrpSpPr>
       <p:grpSpPr bwMode="auto">
         <a:xfrm>
@@ -2373,12 +2389,12 @@
       </p:grpSpPr>
       <p:sp>
         <p:nvSpPr>
-          <p:cNvPr id="4" name="Заголовок 1" hidden="0"/>
-          <p:cNvSpPr>
-            <a:spLocks noGrp="1"/>
-          </p:cNvSpPr>
-          <p:nvPr isPhoto="0" userDrawn="0">
-            <p:ph type="title" hasCustomPrompt="0"/>
+          <p:cNvPr id="4" name="Заголовок 1"/>
+          <p:cNvSpPr>
+            <a:spLocks noGrp="1"/>
+          </p:cNvSpPr>
+          <p:nvPr>
+            <p:ph type="title"/>
           </p:nvPr>
         </p:nvSpPr>
         <p:spPr bwMode="auto">
@@ -2408,12 +2424,12 @@
       </p:sp>
       <p:sp>
         <p:nvSpPr>
-          <p:cNvPr id="5" name="Рисунок 2" hidden="0"/>
-          <p:cNvSpPr>
-            <a:spLocks noChangeAspect="1" noGrp="1"/>
-          </p:cNvSpPr>
-          <p:nvPr isPhoto="0" userDrawn="0">
-            <p:ph type="pic" idx="1" hasCustomPrompt="0"/>
+          <p:cNvPr id="5" name="Рисунок 2"/>
+          <p:cNvSpPr>
+            <a:spLocks noGrp="1" noChangeAspect="1"/>
+          </p:cNvSpPr>
+          <p:nvPr>
+            <p:ph type="pic" idx="1"/>
           </p:nvPr>
         </p:nvSpPr>
         <p:spPr bwMode="auto">
@@ -2476,12 +2492,12 @@
       </p:sp>
       <p:sp>
         <p:nvSpPr>
-          <p:cNvPr id="6" name="Текст 3" hidden="0"/>
-          <p:cNvSpPr>
-            <a:spLocks noGrp="1"/>
-          </p:cNvSpPr>
-          <p:nvPr isPhoto="0" userDrawn="0">
-            <p:ph type="body" sz="half" idx="2" hasCustomPrompt="0"/>
+          <p:cNvPr id="6" name="Текст 3"/>
+          <p:cNvSpPr>
+            <a:spLocks noGrp="1"/>
+          </p:cNvSpPr>
+          <p:nvPr>
+            <p:ph type="body" sz="half" idx="2"/>
           </p:nvPr>
         </p:nvSpPr>
         <p:spPr bwMode="auto">
@@ -2544,12 +2560,12 @@
       </p:sp>
       <p:sp>
         <p:nvSpPr>
-          <p:cNvPr id="7" name="Дата 4" hidden="0"/>
-          <p:cNvSpPr>
-            <a:spLocks noGrp="1"/>
-          </p:cNvSpPr>
-          <p:nvPr isPhoto="0" userDrawn="0">
-            <p:ph type="dt" sz="half" idx="10" hasCustomPrompt="0"/>
+          <p:cNvPr id="7" name="Дата 4"/>
+          <p:cNvSpPr>
+            <a:spLocks noGrp="1"/>
+          </p:cNvSpPr>
+          <p:nvPr>
+            <p:ph type="dt" sz="half" idx="10"/>
           </p:nvPr>
         </p:nvSpPr>
         <p:spPr bwMode="auto"/>
@@ -2562,7 +2578,7 @@
             </a:pPr>
             <a:fld id="{BCC18F51-09EC-435C-A3BA-64A766E099C0}" type="datetimeFigureOut">
               <a:rPr lang="ru-RU"/>
-              <a:t/>
+              <a:t>26.11.2021</a:t>
             </a:fld>
             <a:endParaRPr lang="ru-RU"/>
           </a:p>
@@ -2570,12 +2586,12 @@
       </p:sp>
       <p:sp>
         <p:nvSpPr>
-          <p:cNvPr id="8" name="Нижний колонтитул 5" hidden="0"/>
-          <p:cNvSpPr>
-            <a:spLocks noGrp="1"/>
-          </p:cNvSpPr>
-          <p:nvPr isPhoto="0" userDrawn="0">
-            <p:ph type="ftr" sz="quarter" idx="11" hasCustomPrompt="0"/>
+          <p:cNvPr id="8" name="Нижний колонтитул 5"/>
+          <p:cNvSpPr>
+            <a:spLocks noGrp="1"/>
+          </p:cNvSpPr>
+          <p:nvPr>
+            <p:ph type="ftr" sz="quarter" idx="11"/>
           </p:nvPr>
         </p:nvSpPr>
         <p:spPr bwMode="auto"/>
@@ -2592,12 +2608,12 @@
       </p:sp>
       <p:sp>
         <p:nvSpPr>
-          <p:cNvPr id="9" name="Номер слайда 6" hidden="0"/>
-          <p:cNvSpPr>
-            <a:spLocks noGrp="1"/>
-          </p:cNvSpPr>
-          <p:nvPr isPhoto="0" userDrawn="0">
-            <p:ph type="sldNum" sz="quarter" idx="12" hasCustomPrompt="0"/>
+          <p:cNvPr id="9" name="Номер слайда 6"/>
+          <p:cNvSpPr>
+            <a:spLocks noGrp="1"/>
+          </p:cNvSpPr>
+          <p:nvPr>
+            <p:ph type="sldNum" sz="quarter" idx="12"/>
           </p:nvPr>
         </p:nvSpPr>
         <p:spPr bwMode="auto"/>
@@ -2610,7 +2626,7 @@
             </a:pPr>
             <a:fld id="{08395586-F03A-48D1-94DF-16B239DF4FB5}" type="slidenum">
               <a:rPr lang="ru-RU"/>
-              <a:t/>
+              <a:t>‹#›</a:t>
             </a:fld>
             <a:endParaRPr lang="ru-RU"/>
           </a:p>
@@ -2625,8 +2641,8 @@
 </file>
 
 <file path=ppt/slideMasters/slideMaster1.xml><?xml version="1.0" encoding="utf-8"?>
-<p:sldMaster xmlns:a="http://schemas.openxmlformats.org/drawingml/2006/main" xmlns:r="http://schemas.openxmlformats.org/officeDocument/2006/relationships" xmlns:p="http://schemas.openxmlformats.org/presentationml/2006/main" xmlns:m="http://schemas.openxmlformats.org/officeDocument/2006/math" xmlns:w="http://schemas.openxmlformats.org/wordprocessingml/2006/main" preserve="0">
-  <p:cSld name="">
+<p:sldMaster xmlns:a="http://schemas.openxmlformats.org/drawingml/2006/main" xmlns:r="http://schemas.openxmlformats.org/officeDocument/2006/relationships" xmlns:p="http://schemas.openxmlformats.org/presentationml/2006/main">
+  <p:cSld>
     <p:bg>
       <p:bgRef idx="1001">
         <a:schemeClr val="bg1"/>
@@ -2634,9 +2650,9 @@
     </p:bg>
     <p:spTree>
       <p:nvGrpSpPr>
-        <p:cNvPr id="1" name="" hidden="0"/>
+        <p:cNvPr id="1" name=""/>
         <p:cNvGrpSpPr/>
-        <p:nvPr isPhoto="0" userDrawn="0"/>
+        <p:nvPr/>
       </p:nvGrpSpPr>
       <p:grpSpPr bwMode="auto">
         <a:xfrm>
@@ -2648,12 +2664,12 @@
       </p:grpSpPr>
       <p:sp>
         <p:nvSpPr>
-          <p:cNvPr id="4" name="Title Placeholder 1" hidden="0"/>
-          <p:cNvSpPr>
-            <a:spLocks noGrp="1"/>
-          </p:cNvSpPr>
-          <p:nvPr isPhoto="0" userDrawn="0">
-            <p:ph type="title" hasCustomPrompt="0"/>
+          <p:cNvPr id="4" name="Title Placeholder 1"/>
+          <p:cNvSpPr>
+            <a:spLocks noGrp="1"/>
+          </p:cNvSpPr>
+          <p:nvPr>
+            <p:ph type="title"/>
           </p:nvPr>
         </p:nvSpPr>
         <p:spPr bwMode="auto">
@@ -2684,12 +2700,12 @@
       </p:sp>
       <p:sp>
         <p:nvSpPr>
-          <p:cNvPr id="5" name="Text Placeholder 2" hidden="0"/>
-          <p:cNvSpPr>
-            <a:spLocks noGrp="1"/>
-          </p:cNvSpPr>
-          <p:nvPr isPhoto="0" userDrawn="0">
-            <p:ph type="body" idx="1" hasCustomPrompt="0"/>
+          <p:cNvPr id="5" name="Text Placeholder 2"/>
+          <p:cNvSpPr>
+            <a:spLocks noGrp="1"/>
+          </p:cNvSpPr>
+          <p:nvPr>
+            <p:ph type="body" idx="1"/>
           </p:nvPr>
         </p:nvSpPr>
         <p:spPr bwMode="auto">
@@ -2760,12 +2776,12 @@
       </p:sp>
       <p:sp>
         <p:nvSpPr>
-          <p:cNvPr id="6" name="Date Placeholder 3" hidden="0"/>
-          <p:cNvSpPr>
-            <a:spLocks noGrp="1"/>
-          </p:cNvSpPr>
-          <p:nvPr isPhoto="0" userDrawn="0">
-            <p:ph type="dt" sz="half" idx="2" hasCustomPrompt="0"/>
+          <p:cNvPr id="6" name="Date Placeholder 3"/>
+          <p:cNvSpPr>
+            <a:spLocks noGrp="1"/>
+          </p:cNvSpPr>
+          <p:nvPr>
+            <p:ph type="dt" sz="half" idx="2"/>
           </p:nvPr>
         </p:nvSpPr>
         <p:spPr bwMode="auto">
@@ -2796,7 +2812,7 @@
             </a:pPr>
             <a:fld id="{BCC18F51-09EC-435C-A3BA-64A766E099C0}" type="datetimeFigureOut">
               <a:rPr lang="ru-RU"/>
-              <a:t/>
+              <a:t>26.11.2021</a:t>
             </a:fld>
             <a:endParaRPr lang="ru-RU"/>
           </a:p>
@@ -2804,12 +2820,12 @@
       </p:sp>
       <p:sp>
         <p:nvSpPr>
-          <p:cNvPr id="7" name="Footer Placeholder 4" hidden="0"/>
-          <p:cNvSpPr>
-            <a:spLocks noGrp="1"/>
-          </p:cNvSpPr>
-          <p:nvPr isPhoto="0" userDrawn="0">
-            <p:ph type="ftr" sz="quarter" idx="3" hasCustomPrompt="0"/>
+          <p:cNvPr id="7" name="Footer Placeholder 4"/>
+          <p:cNvSpPr>
+            <a:spLocks noGrp="1"/>
+          </p:cNvSpPr>
+          <p:nvPr>
+            <p:ph type="ftr" sz="quarter" idx="3"/>
           </p:nvPr>
         </p:nvSpPr>
         <p:spPr bwMode="auto">
@@ -2844,12 +2860,12 @@
       </p:sp>
       <p:sp>
         <p:nvSpPr>
-          <p:cNvPr id="8" name="Slide Number Placeholder 5" hidden="0"/>
-          <p:cNvSpPr>
-            <a:spLocks noGrp="1"/>
-          </p:cNvSpPr>
-          <p:nvPr isPhoto="0" userDrawn="0">
-            <p:ph type="sldNum" sz="quarter" idx="4" hasCustomPrompt="0"/>
+          <p:cNvPr id="8" name="Slide Number Placeholder 5"/>
+          <p:cNvSpPr>
+            <a:spLocks noGrp="1"/>
+          </p:cNvSpPr>
+          <p:nvPr>
+            <p:ph type="sldNum" sz="quarter" idx="4"/>
           </p:nvPr>
         </p:nvSpPr>
         <p:spPr bwMode="auto">
@@ -2880,7 +2896,7 @@
             </a:pPr>
             <a:fld id="{08395586-F03A-48D1-94DF-16B239DF4FB5}" type="slidenum">
               <a:rPr lang="ru-RU"/>
-              <a:t/>
+              <a:t>‹#›</a:t>
             </a:fld>
             <a:endParaRPr lang="ru-RU"/>
           </a:p>
@@ -2888,7 +2904,7 @@
       </p:sp>
     </p:spTree>
   </p:cSld>
-  <p:clrMap accent1="accent1" accent2="accent2" accent3="accent3" accent4="accent4" accent5="accent5" accent6="accent6" bg1="lt1" bg2="lt2" folHlink="folHlink" hlink="hlink" tx1="dk1" tx2="dk2"/>
+  <p:clrMap bg1="lt1" tx1="dk1" bg2="lt2" tx2="dk2" accent1="accent1" accent2="accent2" accent3="accent3" accent4="accent4" accent5="accent5" accent6="accent6" hlink="hlink" folHlink="folHlink"/>
   <p:sldLayoutIdLst>
     <p:sldLayoutId id="2147483649" r:id="rId1"/>
     <p:sldLayoutId id="2147483650" r:id="rId2"/>
@@ -3186,13 +3202,13 @@
 </file>
 
 <file path=ppt/slides/slide1.xml><?xml version="1.0" encoding="utf-8"?>
-<p:sld xmlns:a="http://schemas.openxmlformats.org/drawingml/2006/main" xmlns:r="http://schemas.openxmlformats.org/officeDocument/2006/relationships" xmlns:p="http://schemas.openxmlformats.org/presentationml/2006/main" xmlns:m="http://schemas.openxmlformats.org/officeDocument/2006/math" xmlns:w="http://schemas.openxmlformats.org/wordprocessingml/2006/main" showMasterPhAnim="0" show="1">
-  <p:cSld name="">
+<p:sld xmlns:a="http://schemas.openxmlformats.org/drawingml/2006/main" xmlns:r="http://schemas.openxmlformats.org/officeDocument/2006/relationships" xmlns:p="http://schemas.openxmlformats.org/presentationml/2006/main" showMasterPhAnim="0">
+  <p:cSld>
     <p:spTree>
       <p:nvGrpSpPr>
-        <p:cNvPr id="1" name="" hidden="0"/>
+        <p:cNvPr id="1" name=""/>
         <p:cNvGrpSpPr/>
-        <p:nvPr isPhoto="0" userDrawn="0"/>
+        <p:nvPr/>
       </p:nvGrpSpPr>
       <p:grpSpPr bwMode="auto">
         <a:xfrm>
@@ -3204,12 +3220,12 @@
       </p:grpSpPr>
       <p:sp>
         <p:nvSpPr>
-          <p:cNvPr id="4" name="Title 1" hidden="0"/>
-          <p:cNvSpPr>
-            <a:spLocks noGrp="1"/>
-          </p:cNvSpPr>
-          <p:nvPr isPhoto="0" userDrawn="0">
-            <p:ph type="ctrTitle" hasCustomPrompt="0"/>
+          <p:cNvPr id="4" name="Title 1"/>
+          <p:cNvSpPr>
+            <a:spLocks noGrp="1"/>
+          </p:cNvSpPr>
+          <p:nvPr>
+            <p:ph type="ctrTitle"/>
           </p:nvPr>
         </p:nvSpPr>
         <p:spPr bwMode="auto">
@@ -3237,12 +3253,12 @@
       </p:sp>
       <p:sp>
         <p:nvSpPr>
-          <p:cNvPr id="5" name="Subtitle 2" hidden="0"/>
-          <p:cNvSpPr>
-            <a:spLocks noGrp="1"/>
-          </p:cNvSpPr>
-          <p:nvPr isPhoto="0" userDrawn="0">
-            <p:ph type="subTitle" idx="1" hasCustomPrompt="0"/>
+          <p:cNvPr id="5" name="Subtitle 2"/>
+          <p:cNvSpPr>
+            <a:spLocks noGrp="1"/>
+          </p:cNvSpPr>
+          <p:nvPr>
+            <p:ph type="subTitle" idx="1"/>
           </p:nvPr>
         </p:nvSpPr>
         <p:spPr bwMode="auto">
@@ -3273,25 +3289,17 @@
   <p:clrMapOvr>
     <a:masterClrMapping/>
   </p:clrMapOvr>
-  <mc:AlternateContent xmlns:mc="http://schemas.openxmlformats.org/markup-compatibility/2006">
-    <mc:Choice xmlns:p14="http://schemas.microsoft.com/office/powerpoint/2010/main" Requires="p14">
-      <p:transition p14:dur="2000" advClick="1"/>
-    </mc:Choice>
-    <mc:Fallback>
-      <p:transition advClick="1"/>
-    </mc:Fallback>
-  </mc:AlternateContent>
 </p:sld>
 </file>
 
 <file path=ppt/slides/slide2.xml><?xml version="1.0" encoding="utf-8"?>
-<p:sld xmlns:a="http://schemas.openxmlformats.org/drawingml/2006/main" xmlns:r="http://schemas.openxmlformats.org/officeDocument/2006/relationships" xmlns:p="http://schemas.openxmlformats.org/presentationml/2006/main" xmlns:m="http://schemas.openxmlformats.org/officeDocument/2006/math" xmlns:w="http://schemas.openxmlformats.org/wordprocessingml/2006/main" showMasterPhAnim="0" show="1">
-  <p:cSld name="">
+<p:sld xmlns:a="http://schemas.openxmlformats.org/drawingml/2006/main" xmlns:r="http://schemas.openxmlformats.org/officeDocument/2006/relationships" xmlns:p="http://schemas.openxmlformats.org/presentationml/2006/main" showMasterPhAnim="0">
+  <p:cSld>
     <p:spTree>
       <p:nvGrpSpPr>
-        <p:cNvPr id="1" name="" hidden="0"/>
+        <p:cNvPr id="1" name=""/>
         <p:cNvGrpSpPr/>
-        <p:nvPr isPhoto="0" userDrawn="0"/>
+        <p:nvPr/>
       </p:nvGrpSpPr>
       <p:grpSpPr bwMode="auto">
         <a:xfrm>
@@ -3303,12 +3311,12 @@
       </p:grpSpPr>
       <p:sp>
         <p:nvSpPr>
-          <p:cNvPr id="4" name="Заголовок 1" hidden="0"/>
-          <p:cNvSpPr>
-            <a:spLocks noGrp="1"/>
-          </p:cNvSpPr>
-          <p:nvPr isPhoto="0" userDrawn="0">
-            <p:ph type="title" hasCustomPrompt="0"/>
+          <p:cNvPr id="4" name="Заголовок 1"/>
+          <p:cNvSpPr>
+            <a:spLocks noGrp="1"/>
+          </p:cNvSpPr>
+          <p:nvPr>
+            <p:ph type="title"/>
           </p:nvPr>
         </p:nvSpPr>
         <p:spPr bwMode="auto">
@@ -3334,12 +3342,12 @@
       </p:sp>
       <p:sp>
         <p:nvSpPr>
-          <p:cNvPr id="5" name="Объект 2" hidden="0"/>
-          <p:cNvSpPr>
-            <a:spLocks noGrp="1"/>
-          </p:cNvSpPr>
-          <p:nvPr isPhoto="0" userDrawn="0">
-            <p:ph idx="1" hasCustomPrompt="0"/>
+          <p:cNvPr id="5" name="Объект 2"/>
+          <p:cNvSpPr>
+            <a:spLocks noGrp="1"/>
+          </p:cNvSpPr>
+          <p:nvPr>
+            <p:ph idx="1"/>
           </p:nvPr>
         </p:nvSpPr>
         <p:spPr bwMode="auto">
@@ -3360,7 +3368,6 @@
               <a:defRPr/>
             </a:pPr>
             <a:r>
-              <a:rPr/>
               <a:t>Этот проект был создан с помощью библиотеки </a:t>
             </a:r>
             <a:r>
@@ -3377,11 +3384,11 @@
       </p:sp>
       <p:pic>
         <p:nvPicPr>
-          <p:cNvPr id="6" name="Рисунок 5" hidden="0"/>
+          <p:cNvPr id="6" name="Рисунок 5"/>
           <p:cNvPicPr>
             <a:picLocks noChangeAspect="1"/>
           </p:cNvPicPr>
-          <p:nvPr isPhoto="0" userDrawn="0"/>
+          <p:nvPr/>
         </p:nvPicPr>
         <p:blipFill>
           <a:blip r:embed="rId2"/>
@@ -3402,25 +3409,17 @@
   <p:clrMapOvr>
     <a:masterClrMapping/>
   </p:clrMapOvr>
-  <mc:AlternateContent xmlns:mc="http://schemas.openxmlformats.org/markup-compatibility/2006">
-    <mc:Choice xmlns:p14="http://schemas.microsoft.com/office/powerpoint/2010/main" Requires="p14">
-      <p:transition p14:dur="2000" advClick="1"/>
-    </mc:Choice>
-    <mc:Fallback>
-      <p:transition advClick="1"/>
-    </mc:Fallback>
-  </mc:AlternateContent>
 </p:sld>
 </file>
 
 <file path=ppt/slides/slide3.xml><?xml version="1.0" encoding="utf-8"?>
-<p:sld xmlns:a="http://schemas.openxmlformats.org/drawingml/2006/main" xmlns:r="http://schemas.openxmlformats.org/officeDocument/2006/relationships" xmlns:p="http://schemas.openxmlformats.org/presentationml/2006/main" xmlns:m="http://schemas.openxmlformats.org/officeDocument/2006/math" xmlns:w="http://schemas.openxmlformats.org/wordprocessingml/2006/main" showMasterPhAnim="0" show="1">
-  <p:cSld name="">
+<p:sld xmlns:a="http://schemas.openxmlformats.org/drawingml/2006/main" xmlns:r="http://schemas.openxmlformats.org/officeDocument/2006/relationships" xmlns:p="http://schemas.openxmlformats.org/presentationml/2006/main" showMasterPhAnim="0">
+  <p:cSld>
     <p:spTree>
       <p:nvGrpSpPr>
-        <p:cNvPr id="1" name="" hidden="0"/>
+        <p:cNvPr id="1" name=""/>
         <p:cNvGrpSpPr/>
-        <p:nvPr isPhoto="0" userDrawn="0"/>
+        <p:nvPr/>
       </p:nvGrpSpPr>
       <p:grpSpPr bwMode="auto">
         <a:xfrm>
@@ -3432,12 +3431,12 @@
       </p:grpSpPr>
       <p:sp>
         <p:nvSpPr>
-          <p:cNvPr id="4" name="Заголовок 1" hidden="0"/>
-          <p:cNvSpPr>
-            <a:spLocks noGrp="1"/>
-          </p:cNvSpPr>
-          <p:nvPr isPhoto="0" userDrawn="0">
-            <p:ph type="title" hasCustomPrompt="0"/>
+          <p:cNvPr id="4" name="Заголовок 1"/>
+          <p:cNvSpPr>
+            <a:spLocks noGrp="1"/>
+          </p:cNvSpPr>
+          <p:nvPr>
+            <p:ph type="title"/>
           </p:nvPr>
         </p:nvSpPr>
         <p:spPr bwMode="auto"/>
@@ -3458,12 +3457,12 @@
       </p:sp>
       <p:sp>
         <p:nvSpPr>
-          <p:cNvPr id="5" name="Объект 2" hidden="0"/>
-          <p:cNvSpPr>
-            <a:spLocks noGrp="1"/>
-          </p:cNvSpPr>
-          <p:nvPr isPhoto="0" userDrawn="0">
-            <p:ph idx="1" hasCustomPrompt="0"/>
+          <p:cNvPr id="5" name="Объект 2"/>
+          <p:cNvSpPr>
+            <a:spLocks noGrp="1"/>
+          </p:cNvSpPr>
+          <p:nvPr>
+            <p:ph idx="1"/>
           </p:nvPr>
         </p:nvSpPr>
         <p:spPr bwMode="auto"/>
@@ -3477,7 +3476,6 @@
               <a:defRPr/>
             </a:pPr>
             <a:r>
-              <a:rPr/>
               <a:t>В процессе создания проекта использовались такие технологии, как библиотека </a:t>
             </a:r>
             <a:r>
@@ -3490,23 +3488,7 @@
             </a:r>
             <a:r>
               <a:rPr lang="en-US"/>
-              <a:t>QPushButton</a:t>
-            </a:r>
-            <a:r>
-              <a:rPr lang="en-US"/>
-              <a:t>, </a:t>
-            </a:r>
-            <a:r>
-              <a:rPr lang="en-US"/>
-              <a:t>QLabel</a:t>
-            </a:r>
-            <a:r>
-              <a:rPr lang="en-US"/>
-              <a:t>, </a:t>
-            </a:r>
-            <a:r>
-              <a:rPr lang="en-US"/>
-              <a:t>QLineEdit</a:t>
+              <a:t>QPushButton, QLabel, QLineEdit</a:t>
             </a:r>
             <a:r>
               <a:rPr lang="ru-RU"/>
@@ -3553,25 +3535,17 @@
   <p:clrMapOvr>
     <a:masterClrMapping/>
   </p:clrMapOvr>
-  <mc:AlternateContent xmlns:mc="http://schemas.openxmlformats.org/markup-compatibility/2006">
-    <mc:Choice xmlns:p14="http://schemas.microsoft.com/office/powerpoint/2010/main" Requires="p14">
-      <p:transition p14:dur="2000" advClick="1"/>
-    </mc:Choice>
-    <mc:Fallback>
-      <p:transition advClick="1"/>
-    </mc:Fallback>
-  </mc:AlternateContent>
 </p:sld>
 </file>
 
 <file path=ppt/slides/slide4.xml><?xml version="1.0" encoding="utf-8"?>
-<p:sld xmlns:a="http://schemas.openxmlformats.org/drawingml/2006/main" xmlns:r="http://schemas.openxmlformats.org/officeDocument/2006/relationships" xmlns:p="http://schemas.openxmlformats.org/presentationml/2006/main" xmlns:m="http://schemas.openxmlformats.org/officeDocument/2006/math" xmlns:w="http://schemas.openxmlformats.org/wordprocessingml/2006/main" showMasterPhAnim="0" show="1">
-  <p:cSld name="">
+<p:sld xmlns:a="http://schemas.openxmlformats.org/drawingml/2006/main" xmlns:r="http://schemas.openxmlformats.org/officeDocument/2006/relationships" xmlns:p="http://schemas.openxmlformats.org/presentationml/2006/main" showMasterPhAnim="0">
+  <p:cSld>
     <p:spTree>
       <p:nvGrpSpPr>
-        <p:cNvPr id="1" name="" hidden="0"/>
+        <p:cNvPr id="1" name=""/>
         <p:cNvGrpSpPr/>
-        <p:nvPr isPhoto="0" userDrawn="0"/>
+        <p:nvPr/>
       </p:nvGrpSpPr>
       <p:grpSpPr bwMode="auto">
         <a:xfrm>
@@ -3583,12 +3557,12 @@
       </p:grpSpPr>
       <p:sp>
         <p:nvSpPr>
-          <p:cNvPr id="4" name="Заголовок 1" hidden="0"/>
-          <p:cNvSpPr>
-            <a:spLocks noGrp="1"/>
-          </p:cNvSpPr>
-          <p:nvPr isPhoto="0" userDrawn="0">
-            <p:ph type="title" hasCustomPrompt="0"/>
+          <p:cNvPr id="4" name="Заголовок 1"/>
+          <p:cNvSpPr>
+            <a:spLocks noGrp="1"/>
+          </p:cNvSpPr>
+          <p:nvPr>
+            <p:ph type="title"/>
           </p:nvPr>
         </p:nvSpPr>
         <p:spPr bwMode="auto"/>
@@ -3609,12 +3583,12 @@
       </p:sp>
       <p:sp>
         <p:nvSpPr>
-          <p:cNvPr id="5" name="Объект 2" hidden="0"/>
-          <p:cNvSpPr>
-            <a:spLocks noGrp="1"/>
-          </p:cNvSpPr>
-          <p:nvPr isPhoto="0" userDrawn="0">
-            <p:ph idx="1" hasCustomPrompt="0"/>
+          <p:cNvPr id="5" name="Объект 2"/>
+          <p:cNvSpPr>
+            <a:spLocks noGrp="1"/>
+          </p:cNvSpPr>
+          <p:nvPr>
+            <p:ph idx="1"/>
           </p:nvPr>
         </p:nvSpPr>
         <p:spPr bwMode="auto"/>
@@ -3647,25 +3621,17 @@
   <p:clrMapOvr>
     <a:masterClrMapping/>
   </p:clrMapOvr>
-  <mc:AlternateContent xmlns:mc="http://schemas.openxmlformats.org/markup-compatibility/2006">
-    <mc:Choice xmlns:p14="http://schemas.microsoft.com/office/powerpoint/2010/main" Requires="p14">
-      <p:transition p14:dur="2000" advClick="1"/>
-    </mc:Choice>
-    <mc:Fallback>
-      <p:transition advClick="1"/>
-    </mc:Fallback>
-  </mc:AlternateContent>
 </p:sld>
 </file>
 
 <file path=ppt/slides/slide5.xml><?xml version="1.0" encoding="utf-8"?>
-<p:sld xmlns:a="http://schemas.openxmlformats.org/drawingml/2006/main" xmlns:r="http://schemas.openxmlformats.org/officeDocument/2006/relationships" xmlns:p="http://schemas.openxmlformats.org/presentationml/2006/main" xmlns:m="http://schemas.openxmlformats.org/officeDocument/2006/math" xmlns:w="http://schemas.openxmlformats.org/wordprocessingml/2006/main" showMasterPhAnim="0" show="1">
-  <p:cSld name="">
+<p:sld xmlns:a="http://schemas.openxmlformats.org/drawingml/2006/main" xmlns:r="http://schemas.openxmlformats.org/officeDocument/2006/relationships" xmlns:p="http://schemas.openxmlformats.org/presentationml/2006/main" showMasterPhAnim="0">
+  <p:cSld>
     <p:spTree>
       <p:nvGrpSpPr>
-        <p:cNvPr id="1" name="" hidden="0"/>
+        <p:cNvPr id="1" name=""/>
         <p:cNvGrpSpPr/>
-        <p:nvPr isPhoto="0" userDrawn="0"/>
+        <p:nvPr/>
       </p:nvGrpSpPr>
       <p:grpSpPr bwMode="auto">
         <a:xfrm>
@@ -3677,12 +3643,12 @@
       </p:grpSpPr>
       <p:sp>
         <p:nvSpPr>
-          <p:cNvPr id="4" name="Заголовок 1" hidden="0"/>
-          <p:cNvSpPr>
-            <a:spLocks noGrp="1"/>
-          </p:cNvSpPr>
-          <p:nvPr isPhoto="0" userDrawn="0">
-            <p:ph type="title" hasCustomPrompt="0"/>
+          <p:cNvPr id="4" name="Заголовок 1"/>
+          <p:cNvSpPr>
+            <a:spLocks noGrp="1"/>
+          </p:cNvSpPr>
+          <p:nvPr>
+            <p:ph type="title"/>
           </p:nvPr>
         </p:nvSpPr>
         <p:spPr bwMode="auto"/>
@@ -3703,22 +3669,22 @@
       </p:sp>
       <p:sp>
         <p:nvSpPr>
-          <p:cNvPr id="5" name="Объект 2" hidden="0"/>
-          <p:cNvSpPr>
-            <a:spLocks noGrp="1"/>
-          </p:cNvSpPr>
-          <p:nvPr isPhoto="0" userDrawn="0">
-            <p:ph idx="1" hasCustomPrompt="0"/>
+          <p:cNvPr id="5" name="Объект 2"/>
+          <p:cNvSpPr>
+            <a:spLocks noGrp="1"/>
+          </p:cNvSpPr>
+          <p:nvPr>
+            <p:ph idx="1"/>
           </p:nvPr>
         </p:nvSpPr>
         <p:spPr bwMode="auto">
-          <a:xfrm rot="0" flipH="0" flipV="0">
-            <a:off x="838198" y="1825624"/>
-            <a:ext cx="10515600" cy="4351338"/>
+          <a:xfrm>
+            <a:off x="838200" y="1690688"/>
+            <a:ext cx="10515600" cy="4987752"/>
           </a:xfrm>
         </p:spPr>
         <p:txBody>
-          <a:bodyPr vertOverflow="overflow" horzOverflow="clip" vert="horz" wrap="square" lIns="91440" tIns="45720" rIns="91440" bIns="45720" numCol="4" spcCol="0" rtlCol="0" fromWordArt="0" anchor="t" anchorCtr="0" forceAA="0" upright="0" compatLnSpc="0">
+          <a:bodyPr vertOverflow="overflow" horzOverflow="clip" vert="horz" wrap="square" lIns="91440" tIns="45720" rIns="91440" bIns="45720" numCol="4" spcCol="0" rtlCol="0" fromWordArt="0" anchor="t" anchorCtr="0" forceAA="0" compatLnSpc="0">
             <a:noAutofit/>
           </a:bodyPr>
           <a:lstStyle/>
@@ -3729,10 +3695,33 @@
               <a:defRPr/>
             </a:pPr>
             <a:r>
-              <a:rPr sz="1600"/>
-              <a:t>Проект содержит следующие файлы:</a:t>
-            </a:r>
-            <a:endParaRPr sz="1600"/>
+              <a:rPr sz="1600" dirty="0"/>
+              <a:t>Проект </a:t>
+            </a:r>
+            <a:r>
+              <a:rPr sz="1600" dirty="0" err="1"/>
+              <a:t>содержит</a:t>
+            </a:r>
+            <a:r>
+              <a:rPr sz="1600" dirty="0"/>
+              <a:t> </a:t>
+            </a:r>
+            <a:r>
+              <a:rPr sz="1600" dirty="0" err="1"/>
+              <a:t>следующие</a:t>
+            </a:r>
+            <a:r>
+              <a:rPr sz="1600" dirty="0"/>
+              <a:t> </a:t>
+            </a:r>
+            <a:r>
+              <a:rPr sz="1600" dirty="0" err="1"/>
+              <a:t>файлы</a:t>
+            </a:r>
+            <a:r>
+              <a:rPr sz="1600" dirty="0"/>
+              <a:t>:</a:t>
+            </a:r>
           </a:p>
           <a:p>
             <a:pPr marL="239821" indent="-239821">
@@ -3741,17 +3730,105 @@
               <a:defRPr/>
             </a:pPr>
             <a:r>
-              <a:rPr lang="en-US" sz="1600" b="0" i="0" u="none" strike="noStrike" cap="none" spc="0">
-                <a:solidFill>
-                  <a:schemeClr val="tx1"/>
-                </a:solidFill>
-                <a:latin typeface="PT Sans"/>
-                <a:ea typeface="PT Sans"/>
-                <a:cs typeface="PT Sans"/>
-              </a:rPr>
-              <a:t>Main_window.py - основной файл проекта (основное окно);</a:t>
-            </a:r>
-            <a:endParaRPr sz="1600" b="0" i="0" u="none" strike="noStrike" cap="none" spc="0">
+              <a:rPr lang="en-US" sz="1600" b="0" i="0" u="none" strike="noStrike" cap="none" spc="0" dirty="0">
+                <a:solidFill>
+                  <a:schemeClr val="tx1"/>
+                </a:solidFill>
+                <a:latin typeface="PT Sans"/>
+                <a:ea typeface="PT Sans"/>
+                <a:cs typeface="PT Sans"/>
+              </a:rPr>
+              <a:t>Main_window.py - </a:t>
+            </a:r>
+            <a:r>
+              <a:rPr lang="en-US" sz="1600" b="0" i="0" u="none" strike="noStrike" cap="none" spc="0" dirty="0" err="1">
+                <a:solidFill>
+                  <a:schemeClr val="tx1"/>
+                </a:solidFill>
+                <a:latin typeface="PT Sans"/>
+                <a:ea typeface="PT Sans"/>
+                <a:cs typeface="PT Sans"/>
+              </a:rPr>
+              <a:t>основной</a:t>
+            </a:r>
+            <a:r>
+              <a:rPr lang="en-US" sz="1600" b="0" i="0" u="none" strike="noStrike" cap="none" spc="0" dirty="0">
+                <a:solidFill>
+                  <a:schemeClr val="tx1"/>
+                </a:solidFill>
+                <a:latin typeface="PT Sans"/>
+                <a:ea typeface="PT Sans"/>
+                <a:cs typeface="PT Sans"/>
+              </a:rPr>
+              <a:t> </a:t>
+            </a:r>
+            <a:r>
+              <a:rPr lang="en-US" sz="1600" b="0" i="0" u="none" strike="noStrike" cap="none" spc="0" dirty="0" err="1">
+                <a:solidFill>
+                  <a:schemeClr val="tx1"/>
+                </a:solidFill>
+                <a:latin typeface="PT Sans"/>
+                <a:ea typeface="PT Sans"/>
+                <a:cs typeface="PT Sans"/>
+              </a:rPr>
+              <a:t>файл</a:t>
+            </a:r>
+            <a:r>
+              <a:rPr lang="en-US" sz="1600" b="0" i="0" u="none" strike="noStrike" cap="none" spc="0" dirty="0">
+                <a:solidFill>
+                  <a:schemeClr val="tx1"/>
+                </a:solidFill>
+                <a:latin typeface="PT Sans"/>
+                <a:ea typeface="PT Sans"/>
+                <a:cs typeface="PT Sans"/>
+              </a:rPr>
+              <a:t> проекта (</a:t>
+            </a:r>
+            <a:r>
+              <a:rPr lang="en-US" sz="1600" b="0" i="0" u="none" strike="noStrike" cap="none" spc="0" dirty="0" err="1">
+                <a:solidFill>
+                  <a:schemeClr val="tx1"/>
+                </a:solidFill>
+                <a:latin typeface="PT Sans"/>
+                <a:ea typeface="PT Sans"/>
+                <a:cs typeface="PT Sans"/>
+              </a:rPr>
+              <a:t>основное</a:t>
+            </a:r>
+            <a:r>
+              <a:rPr lang="en-US" sz="1600" b="0" i="0" u="none" strike="noStrike" cap="none" spc="0" dirty="0">
+                <a:solidFill>
+                  <a:schemeClr val="tx1"/>
+                </a:solidFill>
+                <a:latin typeface="PT Sans"/>
+                <a:ea typeface="PT Sans"/>
+                <a:cs typeface="PT Sans"/>
+              </a:rPr>
+              <a:t> </a:t>
+            </a:r>
+            <a:r>
+              <a:rPr lang="en-US" sz="1600" b="0" i="0" u="none" strike="noStrike" cap="none" spc="0" dirty="0" err="1">
+                <a:solidFill>
+                  <a:schemeClr val="tx1"/>
+                </a:solidFill>
+                <a:latin typeface="PT Sans"/>
+                <a:ea typeface="PT Sans"/>
+                <a:cs typeface="PT Sans"/>
+              </a:rPr>
+              <a:t>окно</a:t>
+            </a:r>
+            <a:r>
+              <a:rPr lang="en-US" sz="1600" b="0" i="0" u="none" strike="noStrike" cap="none" spc="0" dirty="0">
+                <a:solidFill>
+                  <a:schemeClr val="tx1"/>
+                </a:solidFill>
+                <a:latin typeface="PT Sans"/>
+                <a:ea typeface="PT Sans"/>
+                <a:cs typeface="PT Sans"/>
+              </a:rPr>
+              <a:t>);</a:t>
+            </a:r>
+            <a:endParaRPr sz="1600" b="0" i="0" u="none" strike="noStrike" cap="none" spc="0" dirty="0">
               <a:solidFill>
                 <a:schemeClr val="tx1"/>
               </a:solidFill>
@@ -3767,17 +3844,61 @@
               <a:defRPr/>
             </a:pPr>
             <a:r>
-              <a:rPr lang="en-US" sz="1600" b="0" i="0" u="none" strike="noStrike" cap="none" spc="0">
-                <a:solidFill>
-                  <a:schemeClr val="tx1"/>
-                </a:solidFill>
-                <a:latin typeface="PT Sans"/>
-                <a:ea typeface="PT Sans"/>
-                <a:cs typeface="PT Sans"/>
-              </a:rPr>
-              <a:t>Start_window.py - стартовое окно;</a:t>
-            </a:r>
-            <a:endParaRPr sz="1600" b="0" i="0" u="none" strike="noStrike" cap="none" spc="0">
+              <a:rPr lang="en-US" sz="1600" b="0" i="0" u="none" strike="noStrike" cap="none" spc="0" dirty="0">
+                <a:solidFill>
+                  <a:schemeClr val="tx1"/>
+                </a:solidFill>
+                <a:latin typeface="PT Sans"/>
+                <a:ea typeface="PT Sans"/>
+                <a:cs typeface="PT Sans"/>
+              </a:rPr>
+              <a:t>Start_window.py - </a:t>
+            </a:r>
+            <a:r>
+              <a:rPr lang="en-US" sz="1600" b="0" i="0" u="none" strike="noStrike" cap="none" spc="0" dirty="0" err="1">
+                <a:solidFill>
+                  <a:schemeClr val="tx1"/>
+                </a:solidFill>
+                <a:latin typeface="PT Sans"/>
+                <a:ea typeface="PT Sans"/>
+                <a:cs typeface="PT Sans"/>
+              </a:rPr>
+              <a:t>стартовое</a:t>
+            </a:r>
+            <a:r>
+              <a:rPr lang="en-US" sz="1600" b="0" i="0" u="none" strike="noStrike" cap="none" spc="0" dirty="0">
+                <a:solidFill>
+                  <a:schemeClr val="tx1"/>
+                </a:solidFill>
+                <a:latin typeface="PT Sans"/>
+                <a:ea typeface="PT Sans"/>
+                <a:cs typeface="PT Sans"/>
+              </a:rPr>
+              <a:t> </a:t>
+            </a:r>
+            <a:r>
+              <a:rPr lang="en-US" sz="1600" b="0" i="0" u="none" strike="noStrike" cap="none" spc="0" dirty="0" err="1">
+                <a:solidFill>
+                  <a:schemeClr val="tx1"/>
+                </a:solidFill>
+                <a:latin typeface="PT Sans"/>
+                <a:ea typeface="PT Sans"/>
+                <a:cs typeface="PT Sans"/>
+              </a:rPr>
+              <a:t>окно</a:t>
+            </a:r>
+            <a:r>
+              <a:rPr lang="en-US" sz="1600" b="0" i="0" u="none" strike="noStrike" cap="none" spc="0" dirty="0">
+                <a:solidFill>
+                  <a:schemeClr val="tx1"/>
+                </a:solidFill>
+                <a:latin typeface="PT Sans"/>
+                <a:ea typeface="PT Sans"/>
+                <a:cs typeface="PT Sans"/>
+              </a:rPr>
+              <a:t>;</a:t>
+            </a:r>
+            <a:endParaRPr sz="1600" b="0" i="0" u="none" strike="noStrike" cap="none" spc="0" dirty="0">
               <a:solidFill>
                 <a:schemeClr val="tx1"/>
               </a:solidFill>
@@ -3793,17 +3914,83 @@
               <a:defRPr/>
             </a:pPr>
             <a:r>
-              <a:rPr lang="en-US" sz="1600" b="0" i="0" u="none" strike="noStrike" cap="none" spc="0">
-                <a:solidFill>
-                  <a:schemeClr val="tx1"/>
-                </a:solidFill>
-                <a:latin typeface="PT Sans"/>
-                <a:ea typeface="PT Sans"/>
-                <a:cs typeface="PT Sans"/>
-              </a:rPr>
-              <a:t>Logging_in.py - окно для входа;</a:t>
-            </a:r>
-            <a:endParaRPr sz="1600" b="0" i="0" u="none" strike="noStrike" cap="none" spc="0">
+              <a:rPr lang="en-US" sz="1600" b="0" i="0" u="none" strike="noStrike" cap="none" spc="0" dirty="0">
+                <a:solidFill>
+                  <a:schemeClr val="tx1"/>
+                </a:solidFill>
+                <a:latin typeface="PT Sans"/>
+                <a:ea typeface="PT Sans"/>
+                <a:cs typeface="PT Sans"/>
+              </a:rPr>
+              <a:t>Logging_in.py - </a:t>
+            </a:r>
+            <a:r>
+              <a:rPr lang="en-US" sz="1600" b="0" i="0" u="none" strike="noStrike" cap="none" spc="0" dirty="0" err="1">
+                <a:solidFill>
+                  <a:schemeClr val="tx1"/>
+                </a:solidFill>
+                <a:latin typeface="PT Sans"/>
+                <a:ea typeface="PT Sans"/>
+                <a:cs typeface="PT Sans"/>
+              </a:rPr>
+              <a:t>окно</a:t>
+            </a:r>
+            <a:r>
+              <a:rPr lang="en-US" sz="1600" b="0" i="0" u="none" strike="noStrike" cap="none" spc="0" dirty="0">
+                <a:solidFill>
+                  <a:schemeClr val="tx1"/>
+                </a:solidFill>
+                <a:latin typeface="PT Sans"/>
+                <a:ea typeface="PT Sans"/>
+                <a:cs typeface="PT Sans"/>
+              </a:rPr>
+              <a:t> </a:t>
+            </a:r>
+            <a:r>
+              <a:rPr lang="en-US" sz="1600" b="0" i="0" u="none" strike="noStrike" cap="none" spc="0" dirty="0" err="1">
+                <a:solidFill>
+                  <a:schemeClr val="tx1"/>
+                </a:solidFill>
+                <a:latin typeface="PT Sans"/>
+                <a:ea typeface="PT Sans"/>
+                <a:cs typeface="PT Sans"/>
+              </a:rPr>
+              <a:t>для</a:t>
+            </a:r>
+            <a:r>
+              <a:rPr lang="en-US" sz="1600" b="0" i="0" u="none" strike="noStrike" cap="none" spc="0" dirty="0">
+                <a:solidFill>
+                  <a:schemeClr val="tx1"/>
+                </a:solidFill>
+                <a:latin typeface="PT Sans"/>
+                <a:ea typeface="PT Sans"/>
+                <a:cs typeface="PT Sans"/>
+              </a:rPr>
+              <a:t> </a:t>
+            </a:r>
+            <a:r>
+              <a:rPr lang="en-US" sz="1600" b="0" i="0" u="none" strike="noStrike" cap="none" spc="0" dirty="0" err="1">
+                <a:solidFill>
+                  <a:schemeClr val="tx1"/>
+                </a:solidFill>
+                <a:latin typeface="PT Sans"/>
+                <a:ea typeface="PT Sans"/>
+                <a:cs typeface="PT Sans"/>
+              </a:rPr>
+              <a:t>входа</a:t>
+            </a:r>
+            <a:r>
+              <a:rPr lang="en-US" sz="1600" b="0" i="0" u="none" strike="noStrike" cap="none" spc="0" dirty="0">
+                <a:solidFill>
+                  <a:schemeClr val="tx1"/>
+                </a:solidFill>
+                <a:latin typeface="PT Sans"/>
+                <a:ea typeface="PT Sans"/>
+                <a:cs typeface="PT Sans"/>
+              </a:rPr>
+              <a:t>;</a:t>
+            </a:r>
+            <a:endParaRPr sz="1600" b="0" i="0" u="none" strike="noStrike" cap="none" spc="0" dirty="0">
               <a:solidFill>
                 <a:schemeClr val="tx1"/>
               </a:solidFill>
@@ -3819,17 +4006,112 @@
               <a:defRPr/>
             </a:pPr>
             <a:r>
-              <a:rPr lang="en-US" sz="1600" b="0" i="0" u="none" strike="noStrike" cap="none" spc="0">
-                <a:solidFill>
-                  <a:schemeClr val="tx1"/>
-                </a:solidFill>
-                <a:latin typeface="PT Sans"/>
-                <a:ea typeface="PT Sans"/>
-                <a:cs typeface="PT Sans"/>
-              </a:rPr>
-              <a:t>Registration.py - окно для регистрации;</a:t>
-            </a:r>
-            <a:endParaRPr lang="en-US" sz="1600" b="0" i="0" u="none" strike="noStrike" cap="none" spc="0">
+              <a:rPr lang="en-US" sz="1600" b="0" i="0" u="none" strike="noStrike" cap="none" spc="0" dirty="0">
+                <a:solidFill>
+                  <a:schemeClr val="tx1"/>
+                </a:solidFill>
+                <a:latin typeface="PT Sans"/>
+                <a:ea typeface="PT Sans"/>
+                <a:cs typeface="PT Sans"/>
+              </a:rPr>
+              <a:t>Registration.py - </a:t>
+            </a:r>
+            <a:r>
+              <a:rPr lang="en-US" sz="1600" b="0" i="0" u="none" strike="noStrike" cap="none" spc="0" dirty="0" err="1">
+                <a:solidFill>
+                  <a:schemeClr val="tx1"/>
+                </a:solidFill>
+                <a:latin typeface="PT Sans"/>
+                <a:ea typeface="PT Sans"/>
+                <a:cs typeface="PT Sans"/>
+              </a:rPr>
+              <a:t>окно</a:t>
+            </a:r>
+            <a:r>
+              <a:rPr lang="en-US" sz="1600" b="0" i="0" u="none" strike="noStrike" cap="none" spc="0" dirty="0">
+                <a:solidFill>
+                  <a:schemeClr val="tx1"/>
+                </a:solidFill>
+                <a:latin typeface="PT Sans"/>
+                <a:ea typeface="PT Sans"/>
+                <a:cs typeface="PT Sans"/>
+              </a:rPr>
+              <a:t> </a:t>
+            </a:r>
+            <a:r>
+              <a:rPr lang="en-US" sz="1600" b="0" i="0" u="none" strike="noStrike" cap="none" spc="0" dirty="0" err="1">
+                <a:solidFill>
+                  <a:schemeClr val="tx1"/>
+                </a:solidFill>
+                <a:latin typeface="PT Sans"/>
+                <a:ea typeface="PT Sans"/>
+                <a:cs typeface="PT Sans"/>
+              </a:rPr>
+              <a:t>для</a:t>
+            </a:r>
+            <a:r>
+              <a:rPr lang="en-US" sz="1600" b="0" i="0" u="none" strike="noStrike" cap="none" spc="0" dirty="0">
+                <a:solidFill>
+                  <a:schemeClr val="tx1"/>
+                </a:solidFill>
+                <a:latin typeface="PT Sans"/>
+                <a:ea typeface="PT Sans"/>
+                <a:cs typeface="PT Sans"/>
+              </a:rPr>
+              <a:t> </a:t>
+            </a:r>
+            <a:r>
+              <a:rPr lang="en-US" sz="1600" b="0" i="0" u="none" strike="noStrike" cap="none" spc="0" dirty="0" err="1">
+                <a:solidFill>
+                  <a:schemeClr val="tx1"/>
+                </a:solidFill>
+                <a:latin typeface="PT Sans"/>
+                <a:ea typeface="PT Sans"/>
+                <a:cs typeface="PT Sans"/>
+              </a:rPr>
+              <a:t>регистрации</a:t>
+            </a:r>
+            <a:r>
+              <a:rPr lang="en-US" sz="1600" b="0" i="0" u="none" strike="noStrike" cap="none" spc="0" dirty="0">
+                <a:solidFill>
+                  <a:schemeClr val="tx1"/>
+                </a:solidFill>
+                <a:latin typeface="PT Sans"/>
+                <a:ea typeface="PT Sans"/>
+                <a:cs typeface="PT Sans"/>
+              </a:rPr>
+              <a:t>;</a:t>
+            </a:r>
+          </a:p>
+          <a:p>
+            <a:pPr marL="239820" indent="-239820">
+              <a:buFont typeface="PT Sans"/>
+              <a:buAutoNum type="arabicPeriod"/>
+              <a:defRPr/>
+            </a:pPr>
+            <a:r>
+              <a:rPr lang="en-US" sz="1600" b="0" i="0" u="none" strike="noStrike" cap="none" spc="0" dirty="0">
+                <a:solidFill>
+                  <a:schemeClr val="tx1"/>
+                </a:solidFill>
+                <a:latin typeface="PT Sans"/>
+                <a:ea typeface="PT Sans"/>
+                <a:cs typeface="PT Sans"/>
+              </a:rPr>
+              <a:t>Change_password.py - </a:t>
+            </a:r>
+            <a:r>
+              <a:rPr lang="ru-RU" sz="1600" b="0" i="0" u="none" strike="noStrike" cap="none" spc="0" dirty="0">
+                <a:solidFill>
+                  <a:schemeClr val="tx1"/>
+                </a:solidFill>
+                <a:latin typeface="PT Sans"/>
+                <a:ea typeface="PT Sans"/>
+                <a:cs typeface="PT Sans"/>
+              </a:rPr>
+              <a:t>окно для изменения пароля;</a:t>
+            </a:r>
+            <a:endParaRPr sz="1600" b="0" i="0" u="none" strike="noStrike" cap="none" spc="0" dirty="0">
               <a:solidFill>
                 <a:schemeClr val="tx1"/>
               </a:solidFill>
@@ -3839,34 +4121,89 @@
             </a:endParaRPr>
           </a:p>
           <a:p>
-            <a:pPr marL="239820" indent="-239820">
+            <a:pPr marL="239821" indent="-239821">
               <a:buFont typeface="PT Sans"/>
               <a:buAutoNum type="arabicPeriod"/>
               <a:defRPr/>
             </a:pPr>
             <a:r>
-              <a:rPr lang="en-US" sz="1600" b="0" i="0" u="none" strike="noStrike" cap="none" spc="0">
-                <a:solidFill>
-                  <a:schemeClr val="tx1"/>
-                </a:solidFill>
-                <a:latin typeface="PT Sans"/>
-                <a:ea typeface="PT Sans"/>
-                <a:cs typeface="PT Sans"/>
-              </a:rPr>
-              <a:t>Change_password.py - </a:t>
-            </a:r>
-            <a:r>
-              <a:rPr lang="ru-RU" sz="1600" b="0" i="0" u="none" strike="noStrike" cap="none" spc="0">
-                <a:solidFill>
-                  <a:schemeClr val="tx1"/>
-                </a:solidFill>
-                <a:latin typeface="PT Sans"/>
-                <a:ea typeface="PT Sans"/>
-                <a:cs typeface="PT Sans"/>
-              </a:rPr>
-              <a:t>окно для изменения пароля;</a:t>
-            </a:r>
-            <a:endParaRPr sz="1600" b="0" i="0" u="none" strike="noStrike" cap="none" spc="0">
+              <a:rPr lang="en-US" sz="1600" b="0" i="0" u="none" strike="noStrike" cap="none" spc="0" dirty="0">
+                <a:solidFill>
+                  <a:schemeClr val="tx1"/>
+                </a:solidFill>
+                <a:latin typeface="PT Sans"/>
+                <a:ea typeface="PT Sans"/>
+                <a:cs typeface="PT Sans"/>
+              </a:rPr>
+              <a:t>New_game.py - </a:t>
+            </a:r>
+            <a:r>
+              <a:rPr lang="en-US" sz="1600" b="0" i="0" u="none" strike="noStrike" cap="none" spc="0" dirty="0" err="1">
+                <a:solidFill>
+                  <a:schemeClr val="tx1"/>
+                </a:solidFill>
+                <a:latin typeface="PT Sans"/>
+                <a:ea typeface="PT Sans"/>
+                <a:cs typeface="PT Sans"/>
+              </a:rPr>
+              <a:t>окно</a:t>
+            </a:r>
+            <a:r>
+              <a:rPr lang="en-US" sz="1600" b="0" i="0" u="none" strike="noStrike" cap="none" spc="0" dirty="0">
+                <a:solidFill>
+                  <a:schemeClr val="tx1"/>
+                </a:solidFill>
+                <a:latin typeface="PT Sans"/>
+                <a:ea typeface="PT Sans"/>
+                <a:cs typeface="PT Sans"/>
+              </a:rPr>
+              <a:t> с </a:t>
+            </a:r>
+            <a:r>
+              <a:rPr lang="en-US" sz="1600" b="0" i="0" u="none" strike="noStrike" cap="none" spc="0" dirty="0" err="1">
+                <a:solidFill>
+                  <a:schemeClr val="tx1"/>
+                </a:solidFill>
+                <a:latin typeface="PT Sans"/>
+                <a:ea typeface="PT Sans"/>
+                <a:cs typeface="PT Sans"/>
+              </a:rPr>
+              <a:t>выбором</a:t>
+            </a:r>
+            <a:r>
+              <a:rPr lang="en-US" sz="1600" b="0" i="0" u="none" strike="noStrike" cap="none" spc="0" dirty="0">
+                <a:solidFill>
+                  <a:schemeClr val="tx1"/>
+                </a:solidFill>
+                <a:latin typeface="PT Sans"/>
+                <a:ea typeface="PT Sans"/>
+                <a:cs typeface="PT Sans"/>
+              </a:rPr>
+              <a:t> </a:t>
+            </a:r>
+            <a:r>
+              <a:rPr lang="en-US" sz="1600" b="0" i="0" u="none" strike="noStrike" cap="none" spc="0" dirty="0" err="1">
+                <a:solidFill>
+                  <a:schemeClr val="tx1"/>
+                </a:solidFill>
+                <a:latin typeface="PT Sans"/>
+                <a:ea typeface="PT Sans"/>
+                <a:cs typeface="PT Sans"/>
+              </a:rPr>
+              <a:t>сложности</a:t>
+            </a:r>
+            <a:r>
+              <a:rPr lang="en-US" sz="1600" b="0" i="0" u="none" strike="noStrike" cap="none" spc="0" dirty="0">
+                <a:solidFill>
+                  <a:schemeClr val="tx1"/>
+                </a:solidFill>
+                <a:latin typeface="PT Sans"/>
+                <a:ea typeface="PT Sans"/>
+                <a:cs typeface="PT Sans"/>
+              </a:rPr>
+              <a:t>;</a:t>
+            </a:r>
+            <a:endParaRPr sz="1600" b="0" i="0" u="none" strike="noStrike" cap="none" spc="0" dirty="0">
               <a:solidFill>
                 <a:schemeClr val="tx1"/>
               </a:solidFill>
@@ -3882,17 +4219,83 @@
               <a:defRPr/>
             </a:pPr>
             <a:r>
-              <a:rPr lang="en-US" sz="1600" b="0" i="0" u="none" strike="noStrike" cap="none" spc="0">
-                <a:solidFill>
-                  <a:schemeClr val="tx1"/>
-                </a:solidFill>
-                <a:latin typeface="PT Sans"/>
-                <a:ea typeface="PT Sans"/>
-                <a:cs typeface="PT Sans"/>
-              </a:rPr>
-              <a:t>New_game.py - окно с выбором сложности;</a:t>
-            </a:r>
-            <a:endParaRPr sz="1600" b="0" i="0" u="none" strike="noStrike" cap="none" spc="0">
+              <a:rPr lang="en-US" sz="1600" b="0" i="0" u="none" strike="noStrike" cap="none" spc="0" dirty="0">
+                <a:solidFill>
+                  <a:schemeClr val="tx1"/>
+                </a:solidFill>
+                <a:latin typeface="PT Sans"/>
+                <a:ea typeface="PT Sans"/>
+                <a:cs typeface="PT Sans"/>
+              </a:rPr>
+              <a:t>Sudoku.py - </a:t>
+            </a:r>
+            <a:r>
+              <a:rPr lang="en-US" sz="1600" b="0" i="0" u="none" strike="noStrike" cap="none" spc="0" dirty="0" err="1">
+                <a:solidFill>
+                  <a:schemeClr val="tx1"/>
+                </a:solidFill>
+                <a:latin typeface="PT Sans"/>
+                <a:ea typeface="PT Sans"/>
+                <a:cs typeface="PT Sans"/>
+              </a:rPr>
+              <a:t>окно</a:t>
+            </a:r>
+            <a:r>
+              <a:rPr lang="en-US" sz="1600" b="0" i="0" u="none" strike="noStrike" cap="none" spc="0" dirty="0">
+                <a:solidFill>
+                  <a:schemeClr val="tx1"/>
+                </a:solidFill>
+                <a:latin typeface="PT Sans"/>
+                <a:ea typeface="PT Sans"/>
+                <a:cs typeface="PT Sans"/>
+              </a:rPr>
+              <a:t> </a:t>
+            </a:r>
+            <a:r>
+              <a:rPr lang="en-US" sz="1600" b="0" i="0" u="none" strike="noStrike" cap="none" spc="0" dirty="0" err="1">
+                <a:solidFill>
+                  <a:schemeClr val="tx1"/>
+                </a:solidFill>
+                <a:latin typeface="PT Sans"/>
+                <a:ea typeface="PT Sans"/>
+                <a:cs typeface="PT Sans"/>
+              </a:rPr>
+              <a:t>для</a:t>
+            </a:r>
+            <a:r>
+              <a:rPr lang="en-US" sz="1600" b="0" i="0" u="none" strike="noStrike" cap="none" spc="0" dirty="0">
+                <a:solidFill>
+                  <a:schemeClr val="tx1"/>
+                </a:solidFill>
+                <a:latin typeface="PT Sans"/>
+                <a:ea typeface="PT Sans"/>
+                <a:cs typeface="PT Sans"/>
+              </a:rPr>
+              <a:t> </a:t>
+            </a:r>
+            <a:r>
+              <a:rPr lang="en-US" sz="1600" b="0" i="0" u="none" strike="noStrike" cap="none" spc="0" dirty="0" err="1">
+                <a:solidFill>
+                  <a:schemeClr val="tx1"/>
+                </a:solidFill>
+                <a:latin typeface="PT Sans"/>
+                <a:ea typeface="PT Sans"/>
+                <a:cs typeface="PT Sans"/>
+              </a:rPr>
+              <a:t>решения</a:t>
+            </a:r>
+            <a:r>
+              <a:rPr lang="en-US" sz="1600" b="0" i="0" u="none" strike="noStrike" cap="none" spc="0" dirty="0">
+                <a:solidFill>
+                  <a:schemeClr val="tx1"/>
+                </a:solidFill>
+                <a:latin typeface="PT Sans"/>
+                <a:ea typeface="PT Sans"/>
+                <a:cs typeface="PT Sans"/>
+              </a:rPr>
+              <a:t> судоку;</a:t>
+            </a:r>
+            <a:endParaRPr sz="1600" b="0" i="0" u="none" strike="noStrike" cap="none" spc="0" dirty="0">
               <a:solidFill>
                 <a:schemeClr val="tx1"/>
               </a:solidFill>
@@ -3908,17 +4311,61 @@
               <a:defRPr/>
             </a:pPr>
             <a:r>
-              <a:rPr lang="en-US" sz="1600" b="0" i="0" u="none" strike="noStrike" cap="none" spc="0">
-                <a:solidFill>
-                  <a:schemeClr val="tx1"/>
-                </a:solidFill>
-                <a:latin typeface="PT Sans"/>
-                <a:ea typeface="PT Sans"/>
-                <a:cs typeface="PT Sans"/>
-              </a:rPr>
-              <a:t>Sudoku.py - окно для решения судоку;</a:t>
-            </a:r>
-            <a:endParaRPr sz="1600" b="0" i="0" u="none" strike="noStrike" cap="none" spc="0">
+              <a:rPr lang="en-US" sz="1600" b="0" i="0" u="none" strike="noStrike" cap="none" spc="0" dirty="0">
+                <a:solidFill>
+                  <a:schemeClr val="tx1"/>
+                </a:solidFill>
+                <a:latin typeface="PT Sans"/>
+                <a:ea typeface="PT Sans"/>
+                <a:cs typeface="PT Sans"/>
+              </a:rPr>
+              <a:t>Winner.py - </a:t>
+            </a:r>
+            <a:r>
+              <a:rPr lang="en-US" sz="1600" b="0" i="0" u="none" strike="noStrike" cap="none" spc="0" dirty="0" err="1">
+                <a:solidFill>
+                  <a:schemeClr val="tx1"/>
+                </a:solidFill>
+                <a:latin typeface="PT Sans"/>
+                <a:ea typeface="PT Sans"/>
+                <a:cs typeface="PT Sans"/>
+              </a:rPr>
+              <a:t>поздравительное</a:t>
+            </a:r>
+            <a:r>
+              <a:rPr lang="en-US" sz="1600" b="0" i="0" u="none" strike="noStrike" cap="none" spc="0" dirty="0">
+                <a:solidFill>
+                  <a:schemeClr val="tx1"/>
+                </a:solidFill>
+                <a:latin typeface="PT Sans"/>
+                <a:ea typeface="PT Sans"/>
+                <a:cs typeface="PT Sans"/>
+              </a:rPr>
+              <a:t> </a:t>
+            </a:r>
+            <a:r>
+              <a:rPr lang="en-US" sz="1600" b="0" i="0" u="none" strike="noStrike" cap="none" spc="0" dirty="0" err="1">
+                <a:solidFill>
+                  <a:schemeClr val="tx1"/>
+                </a:solidFill>
+                <a:latin typeface="PT Sans"/>
+                <a:ea typeface="PT Sans"/>
+                <a:cs typeface="PT Sans"/>
+              </a:rPr>
+              <a:t>окно</a:t>
+            </a:r>
+            <a:r>
+              <a:rPr lang="en-US" sz="1600" b="0" i="0" u="none" strike="noStrike" cap="none" spc="0" dirty="0">
+                <a:solidFill>
+                  <a:schemeClr val="tx1"/>
+                </a:solidFill>
+                <a:latin typeface="PT Sans"/>
+                <a:ea typeface="PT Sans"/>
+                <a:cs typeface="PT Sans"/>
+              </a:rPr>
+              <a:t>;</a:t>
+            </a:r>
+            <a:endParaRPr sz="1600" b="0" i="0" u="none" strike="noStrike" cap="none" spc="0" dirty="0">
               <a:solidFill>
                 <a:schemeClr val="tx1"/>
               </a:solidFill>
@@ -3934,17 +4381,83 @@
               <a:defRPr/>
             </a:pPr>
             <a:r>
-              <a:rPr lang="en-US" sz="1600" b="0" i="0" u="none" strike="noStrike" cap="none" spc="0">
-                <a:solidFill>
-                  <a:schemeClr val="tx1"/>
-                </a:solidFill>
-                <a:latin typeface="PT Sans"/>
-                <a:ea typeface="PT Sans"/>
-                <a:cs typeface="PT Sans"/>
-              </a:rPr>
-              <a:t>Winner.py - поздравительное окно;</a:t>
-            </a:r>
-            <a:endParaRPr sz="1600" b="0" i="0" u="none" strike="noStrike" cap="none" spc="0">
+              <a:rPr lang="en-US" sz="1600" b="0" i="0" u="none" strike="noStrike" cap="none" spc="0" dirty="0">
+                <a:solidFill>
+                  <a:schemeClr val="tx1"/>
+                </a:solidFill>
+                <a:latin typeface="PT Sans"/>
+                <a:ea typeface="PT Sans"/>
+                <a:cs typeface="PT Sans"/>
+              </a:rPr>
+              <a:t>Leaders.py - </a:t>
+            </a:r>
+            <a:r>
+              <a:rPr lang="en-US" sz="1600" b="0" i="0" u="none" strike="noStrike" cap="none" spc="0" dirty="0" err="1">
+                <a:solidFill>
+                  <a:schemeClr val="tx1"/>
+                </a:solidFill>
+                <a:latin typeface="PT Sans"/>
+                <a:ea typeface="PT Sans"/>
+                <a:cs typeface="PT Sans"/>
+              </a:rPr>
+              <a:t>окно</a:t>
+            </a:r>
+            <a:r>
+              <a:rPr lang="en-US" sz="1600" b="0" i="0" u="none" strike="noStrike" cap="none" spc="0" dirty="0">
+                <a:solidFill>
+                  <a:schemeClr val="tx1"/>
+                </a:solidFill>
+                <a:latin typeface="PT Sans"/>
+                <a:ea typeface="PT Sans"/>
+                <a:cs typeface="PT Sans"/>
+              </a:rPr>
+              <a:t> с </a:t>
+            </a:r>
+            <a:r>
+              <a:rPr lang="en-US" sz="1600" b="0" i="0" u="none" strike="noStrike" cap="none" spc="0" dirty="0" err="1">
+                <a:solidFill>
+                  <a:schemeClr val="tx1"/>
+                </a:solidFill>
+                <a:latin typeface="PT Sans"/>
+                <a:ea typeface="PT Sans"/>
+                <a:cs typeface="PT Sans"/>
+              </a:rPr>
+              <a:t>таблицей</a:t>
+            </a:r>
+            <a:r>
+              <a:rPr lang="en-US" sz="1600" b="0" i="0" u="none" strike="noStrike" cap="none" spc="0" dirty="0">
+                <a:solidFill>
+                  <a:schemeClr val="tx1"/>
+                </a:solidFill>
+                <a:latin typeface="PT Sans"/>
+                <a:ea typeface="PT Sans"/>
+                <a:cs typeface="PT Sans"/>
+              </a:rPr>
+              <a:t> </a:t>
+            </a:r>
+            <a:r>
+              <a:rPr lang="en-US" sz="1600" b="0" i="0" u="none" strike="noStrike" cap="none" spc="0" dirty="0" err="1">
+                <a:solidFill>
+                  <a:schemeClr val="tx1"/>
+                </a:solidFill>
+                <a:latin typeface="PT Sans"/>
+                <a:ea typeface="PT Sans"/>
+                <a:cs typeface="PT Sans"/>
+              </a:rPr>
+              <a:t>лидеров</a:t>
+            </a:r>
+            <a:r>
+              <a:rPr lang="en-US" sz="1600" b="0" i="0" u="none" strike="noStrike" cap="none" spc="0" dirty="0">
+                <a:solidFill>
+                  <a:schemeClr val="tx1"/>
+                </a:solidFill>
+                <a:latin typeface="PT Sans"/>
+                <a:ea typeface="PT Sans"/>
+                <a:cs typeface="PT Sans"/>
+              </a:rPr>
+              <a:t>;</a:t>
+            </a:r>
+            <a:endParaRPr sz="1600" b="0" i="0" u="none" strike="noStrike" cap="none" spc="0" dirty="0">
               <a:solidFill>
                 <a:schemeClr val="tx1"/>
               </a:solidFill>
@@ -3960,17 +4473,116 @@
               <a:defRPr/>
             </a:pPr>
             <a:r>
-              <a:rPr lang="en-US" sz="1600" b="0" i="0" u="none" strike="noStrike" cap="none" spc="0">
-                <a:solidFill>
-                  <a:schemeClr val="tx1"/>
-                </a:solidFill>
-                <a:latin typeface="PT Sans"/>
-                <a:ea typeface="PT Sans"/>
-                <a:cs typeface="PT Sans"/>
-              </a:rPr>
-              <a:t>Leaders.py - окно с таблицей лидеров;</a:t>
-            </a:r>
-            <a:endParaRPr sz="1600" b="0" i="0" u="none" strike="noStrike" cap="none" spc="0">
+              <a:rPr lang="en-US" sz="1600" b="0" i="0" u="none" strike="noStrike" cap="none" spc="0" dirty="0" err="1">
+                <a:solidFill>
+                  <a:schemeClr val="tx1"/>
+                </a:solidFill>
+                <a:latin typeface="PT Sans"/>
+                <a:ea typeface="PT Sans"/>
+                <a:cs typeface="PT Sans"/>
+              </a:rPr>
+              <a:t>Файлы</a:t>
+            </a:r>
+            <a:r>
+              <a:rPr lang="en-US" sz="1600" b="0" i="0" u="none" strike="noStrike" cap="none" spc="0" dirty="0">
+                <a:solidFill>
+                  <a:schemeClr val="tx1"/>
+                </a:solidFill>
+                <a:latin typeface="PT Sans"/>
+                <a:ea typeface="PT Sans"/>
+                <a:cs typeface="PT Sans"/>
+              </a:rPr>
+              <a:t> </a:t>
+            </a:r>
+            <a:r>
+              <a:rPr lang="en-US" sz="1600" b="0" i="0" u="none" strike="noStrike" cap="none" spc="0" dirty="0" err="1">
+                <a:solidFill>
+                  <a:schemeClr val="tx1"/>
+                </a:solidFill>
+                <a:latin typeface="PT Sans"/>
+                <a:ea typeface="PT Sans"/>
+                <a:cs typeface="PT Sans"/>
+              </a:rPr>
+              <a:t>типа</a:t>
+            </a:r>
+            <a:r>
+              <a:rPr lang="en-US" sz="1600" b="0" i="0" u="none" strike="noStrike" cap="none" spc="0" dirty="0">
+                <a:solidFill>
+                  <a:schemeClr val="tx1"/>
+                </a:solidFill>
+                <a:latin typeface="PT Sans"/>
+                <a:ea typeface="PT Sans"/>
+                <a:cs typeface="PT Sans"/>
+              </a:rPr>
+              <a:t> '*_</a:t>
+            </a:r>
+            <a:r>
+              <a:rPr lang="en-US" sz="1600" b="0" i="0" u="none" strike="noStrike" cap="none" spc="0" dirty="0" err="1">
+                <a:solidFill>
+                  <a:schemeClr val="tx1"/>
+                </a:solidFill>
+                <a:latin typeface="PT Sans"/>
+                <a:ea typeface="PT Sans"/>
+                <a:cs typeface="PT Sans"/>
+              </a:rPr>
+              <a:t>ui.ui</a:t>
+            </a:r>
+            <a:r>
+              <a:rPr lang="en-US" sz="1600" b="0" i="0" u="none" strike="noStrike" cap="none" spc="0" dirty="0">
+                <a:solidFill>
+                  <a:schemeClr val="tx1"/>
+                </a:solidFill>
+                <a:latin typeface="PT Sans"/>
+                <a:ea typeface="PT Sans"/>
+                <a:cs typeface="PT Sans"/>
+              </a:rPr>
+              <a:t>' - </a:t>
+            </a:r>
+            <a:r>
+              <a:rPr lang="en-US" sz="1600" b="0" i="0" u="none" strike="noStrike" cap="none" spc="0" dirty="0" err="1">
+                <a:solidFill>
+                  <a:schemeClr val="tx1"/>
+                </a:solidFill>
+                <a:latin typeface="PT Sans"/>
+                <a:ea typeface="PT Sans"/>
+                <a:cs typeface="PT Sans"/>
+              </a:rPr>
+              <a:t>дизайны</a:t>
+            </a:r>
+            <a:r>
+              <a:rPr lang="en-US" sz="1600" b="0" i="0" u="none" strike="noStrike" cap="none" spc="0" dirty="0">
+                <a:solidFill>
+                  <a:schemeClr val="tx1"/>
+                </a:solidFill>
+                <a:latin typeface="PT Sans"/>
+                <a:ea typeface="PT Sans"/>
+                <a:cs typeface="PT Sans"/>
+              </a:rPr>
+              <a:t> </a:t>
+            </a:r>
+            <a:r>
+              <a:rPr lang="en-US" sz="1600" b="0" i="0" u="none" strike="noStrike" cap="none" spc="0" dirty="0" err="1">
+                <a:solidFill>
+                  <a:schemeClr val="tx1"/>
+                </a:solidFill>
+                <a:latin typeface="PT Sans"/>
+                <a:ea typeface="PT Sans"/>
+                <a:cs typeface="PT Sans"/>
+              </a:rPr>
+              <a:t>окон</a:t>
+            </a:r>
+            <a:r>
+              <a:rPr lang="en-US" sz="1600" b="0" i="0" u="none" strike="noStrike" cap="none" spc="0" dirty="0">
+                <a:solidFill>
+                  <a:schemeClr val="tx1"/>
+                </a:solidFill>
+                <a:latin typeface="PT Sans"/>
+                <a:ea typeface="PT Sans"/>
+                <a:cs typeface="PT Sans"/>
+              </a:rPr>
+              <a:t>;</a:t>
+            </a:r>
+            <a:endParaRPr sz="1600" b="0" i="0" u="none" strike="noStrike" cap="none" spc="0" dirty="0">
               <a:solidFill>
                 <a:schemeClr val="tx1"/>
               </a:solidFill>
@@ -3986,17 +4598,160 @@
               <a:defRPr/>
             </a:pPr>
             <a:r>
-              <a:rPr lang="en-US" sz="1600" b="0" i="0" u="none" strike="noStrike" cap="none" spc="0">
-                <a:solidFill>
-                  <a:schemeClr val="tx1"/>
-                </a:solidFill>
-                <a:latin typeface="PT Sans"/>
-                <a:ea typeface="PT Sans"/>
-                <a:cs typeface="PT Sans"/>
-              </a:rPr>
-              <a:t>Файлы типа '*_ui.ui' - дизайны окон;</a:t>
-            </a:r>
-            <a:endParaRPr sz="1600" b="0" i="0" u="none" strike="noStrike" cap="none" spc="0">
+              <a:rPr lang="en-US" sz="1600" b="0" i="0" u="none" strike="noStrike" cap="none" spc="0" dirty="0" err="1">
+                <a:solidFill>
+                  <a:schemeClr val="tx1"/>
+                </a:solidFill>
+                <a:latin typeface="PT Sans"/>
+                <a:ea typeface="PT Sans"/>
+                <a:cs typeface="PT Sans"/>
+              </a:rPr>
+              <a:t>Файлы</a:t>
+            </a:r>
+            <a:r>
+              <a:rPr lang="en-US" sz="1600" b="0" i="0" u="none" strike="noStrike" cap="none" spc="0" dirty="0">
+                <a:solidFill>
+                  <a:schemeClr val="tx1"/>
+                </a:solidFill>
+                <a:latin typeface="PT Sans"/>
+                <a:ea typeface="PT Sans"/>
+                <a:cs typeface="PT Sans"/>
+              </a:rPr>
+              <a:t> </a:t>
+            </a:r>
+            <a:r>
+              <a:rPr lang="en-US" sz="1600" b="0" i="0" u="none" strike="noStrike" cap="none" spc="0" dirty="0" err="1">
+                <a:solidFill>
+                  <a:schemeClr val="tx1"/>
+                </a:solidFill>
+                <a:latin typeface="PT Sans"/>
+                <a:ea typeface="PT Sans"/>
+                <a:cs typeface="PT Sans"/>
+              </a:rPr>
+              <a:t>типа</a:t>
+            </a:r>
+            <a:r>
+              <a:rPr lang="en-US" sz="1600" b="0" i="0" u="none" strike="noStrike" cap="none" spc="0" dirty="0">
+                <a:solidFill>
+                  <a:schemeClr val="tx1"/>
+                </a:solidFill>
+                <a:latin typeface="PT Sans"/>
+                <a:ea typeface="PT Sans"/>
+                <a:cs typeface="PT Sans"/>
+              </a:rPr>
+              <a:t> '*_ui.py' - </a:t>
+            </a:r>
+            <a:r>
+              <a:rPr lang="en-US" sz="1600" b="0" i="0" u="none" strike="noStrike" cap="none" spc="0" dirty="0" err="1">
+                <a:solidFill>
+                  <a:schemeClr val="tx1"/>
+                </a:solidFill>
+                <a:latin typeface="PT Sans"/>
+                <a:ea typeface="PT Sans"/>
+                <a:cs typeface="PT Sans"/>
+              </a:rPr>
+              <a:t>py-файлы</a:t>
+            </a:r>
+            <a:r>
+              <a:rPr lang="en-US" sz="1600" b="0" i="0" u="none" strike="noStrike" cap="none" spc="0" dirty="0">
+                <a:solidFill>
+                  <a:schemeClr val="tx1"/>
+                </a:solidFill>
+                <a:latin typeface="PT Sans"/>
+                <a:ea typeface="PT Sans"/>
+                <a:cs typeface="PT Sans"/>
+              </a:rPr>
+              <a:t>, </a:t>
+            </a:r>
+            <a:r>
+              <a:rPr lang="en-US" sz="1600" b="0" i="0" u="none" strike="noStrike" cap="none" spc="0" dirty="0" err="1">
+                <a:solidFill>
+                  <a:schemeClr val="tx1"/>
+                </a:solidFill>
+                <a:latin typeface="PT Sans"/>
+                <a:ea typeface="PT Sans"/>
+                <a:cs typeface="PT Sans"/>
+              </a:rPr>
+              <a:t>сгенерированные</a:t>
+            </a:r>
+            <a:r>
+              <a:rPr lang="en-US" sz="1600" b="0" i="0" u="none" strike="noStrike" cap="none" spc="0" dirty="0">
+                <a:solidFill>
+                  <a:schemeClr val="tx1"/>
+                </a:solidFill>
+                <a:latin typeface="PT Sans"/>
+                <a:ea typeface="PT Sans"/>
+                <a:cs typeface="PT Sans"/>
+              </a:rPr>
+              <a:t> </a:t>
+            </a:r>
+            <a:r>
+              <a:rPr lang="en-US" sz="1600" b="0" i="0" u="none" strike="noStrike" cap="none" spc="0" dirty="0" err="1">
+                <a:solidFill>
+                  <a:schemeClr val="tx1"/>
+                </a:solidFill>
+                <a:latin typeface="PT Sans"/>
+                <a:ea typeface="PT Sans"/>
+                <a:cs typeface="PT Sans"/>
+              </a:rPr>
+              <a:t>на</a:t>
+            </a:r>
+            <a:r>
+              <a:rPr lang="en-US" sz="1600" b="0" i="0" u="none" strike="noStrike" cap="none" spc="0" dirty="0">
+                <a:solidFill>
+                  <a:schemeClr val="tx1"/>
+                </a:solidFill>
+                <a:latin typeface="PT Sans"/>
+                <a:ea typeface="PT Sans"/>
+                <a:cs typeface="PT Sans"/>
+              </a:rPr>
+              <a:t> </a:t>
+            </a:r>
+            <a:r>
+              <a:rPr lang="en-US" sz="1600" b="0" i="0" u="none" strike="noStrike" cap="none" spc="0" dirty="0" err="1">
+                <a:solidFill>
+                  <a:schemeClr val="tx1"/>
+                </a:solidFill>
+                <a:latin typeface="PT Sans"/>
+                <a:ea typeface="PT Sans"/>
+                <a:cs typeface="PT Sans"/>
+              </a:rPr>
+              <a:t>основе</a:t>
+            </a:r>
+            <a:r>
+              <a:rPr lang="en-US" sz="1600" b="0" i="0" u="none" strike="noStrike" cap="none" spc="0" dirty="0">
+                <a:solidFill>
+                  <a:schemeClr val="tx1"/>
+                </a:solidFill>
+                <a:latin typeface="PT Sans"/>
+                <a:ea typeface="PT Sans"/>
+                <a:cs typeface="PT Sans"/>
+              </a:rPr>
+              <a:t> </a:t>
+            </a:r>
+            <a:r>
+              <a:rPr lang="en-US" sz="1600" b="0" i="0" u="none" strike="noStrike" cap="none" spc="0" dirty="0" err="1">
+                <a:solidFill>
+                  <a:schemeClr val="tx1"/>
+                </a:solidFill>
+                <a:latin typeface="PT Sans"/>
+                <a:ea typeface="PT Sans"/>
+                <a:cs typeface="PT Sans"/>
+              </a:rPr>
+              <a:t>дизайнов</a:t>
+            </a:r>
+            <a:r>
+              <a:rPr lang="en-US" sz="1600" b="0" i="0" u="none" strike="noStrike" cap="none" spc="0" dirty="0">
+                <a:solidFill>
+                  <a:schemeClr val="tx1"/>
+                </a:solidFill>
+                <a:latin typeface="PT Sans"/>
+                <a:ea typeface="PT Sans"/>
+                <a:cs typeface="PT Sans"/>
+              </a:rPr>
+              <a:t>;</a:t>
+            </a:r>
+            <a:endParaRPr sz="1600" b="0" i="0" u="none" strike="noStrike" cap="none" spc="0" dirty="0">
               <a:solidFill>
                 <a:schemeClr val="tx1"/>
               </a:solidFill>
@@ -4012,17 +4767,72 @@
               <a:defRPr/>
             </a:pPr>
             <a:r>
-              <a:rPr lang="en-US" sz="1600" b="0" i="0" u="none" strike="noStrike" cap="none" spc="0">
-                <a:solidFill>
-                  <a:schemeClr val="tx1"/>
-                </a:solidFill>
-                <a:latin typeface="PT Sans"/>
-                <a:ea typeface="PT Sans"/>
-                <a:cs typeface="PT Sans"/>
-              </a:rPr>
-              <a:t>Файлы типа '*_ui.py' - py-файлы, сгенерированные на основе дизайнов;</a:t>
-            </a:r>
-            <a:endParaRPr sz="1600" b="0" i="0" u="none" strike="noStrike" cap="none" spc="0">
+              <a:rPr lang="en-US" sz="1600" b="0" i="0" u="none" strike="noStrike" cap="none" spc="0" dirty="0" err="1">
+                <a:solidFill>
+                  <a:schemeClr val="tx1"/>
+                </a:solidFill>
+                <a:latin typeface="PT Sans"/>
+                <a:ea typeface="PT Sans"/>
+                <a:cs typeface="PT Sans"/>
+              </a:rPr>
+              <a:t>sudoku.sqlite</a:t>
+            </a:r>
+            <a:r>
+              <a:rPr lang="en-US" sz="1600" b="0" i="0" u="none" strike="noStrike" cap="none" spc="0" dirty="0">
+                <a:solidFill>
+                  <a:schemeClr val="tx1"/>
+                </a:solidFill>
+                <a:latin typeface="PT Sans"/>
+                <a:ea typeface="PT Sans"/>
+                <a:cs typeface="PT Sans"/>
+              </a:rPr>
+              <a:t> - </a:t>
+            </a:r>
+            <a:r>
+              <a:rPr lang="en-US" sz="1600" b="0" i="0" u="none" strike="noStrike" cap="none" spc="0" dirty="0" err="1">
+                <a:solidFill>
+                  <a:schemeClr val="tx1"/>
+                </a:solidFill>
+                <a:latin typeface="PT Sans"/>
+                <a:ea typeface="PT Sans"/>
+                <a:cs typeface="PT Sans"/>
+              </a:rPr>
+              <a:t>база</a:t>
+            </a:r>
+            <a:r>
+              <a:rPr lang="en-US" sz="1600" b="0" i="0" u="none" strike="noStrike" cap="none" spc="0" dirty="0">
+                <a:solidFill>
+                  <a:schemeClr val="tx1"/>
+                </a:solidFill>
+                <a:latin typeface="PT Sans"/>
+                <a:ea typeface="PT Sans"/>
+                <a:cs typeface="PT Sans"/>
+              </a:rPr>
+              <a:t> </a:t>
+            </a:r>
+            <a:r>
+              <a:rPr lang="en-US" sz="1600" b="0" i="0" u="none" strike="noStrike" cap="none" spc="0" dirty="0" err="1">
+                <a:solidFill>
+                  <a:schemeClr val="tx1"/>
+                </a:solidFill>
+                <a:latin typeface="PT Sans"/>
+                <a:ea typeface="PT Sans"/>
+                <a:cs typeface="PT Sans"/>
+              </a:rPr>
+              <a:t>данных</a:t>
+            </a:r>
+            <a:r>
+              <a:rPr lang="en-US" sz="1600" b="0" i="0" u="none" strike="noStrike" cap="none" spc="0" dirty="0">
+                <a:solidFill>
+                  <a:schemeClr val="tx1"/>
+                </a:solidFill>
+                <a:latin typeface="PT Sans"/>
+                <a:ea typeface="PT Sans"/>
+                <a:cs typeface="PT Sans"/>
+              </a:rPr>
+              <a:t> проекта;</a:t>
+            </a:r>
+            <a:endParaRPr sz="1600" b="0" i="0" u="none" strike="noStrike" cap="none" spc="0" dirty="0">
               <a:solidFill>
                 <a:schemeClr val="tx1"/>
               </a:solidFill>
@@ -4038,17 +4848,28 @@
               <a:defRPr/>
             </a:pPr>
             <a:r>
-              <a:rPr lang="en-US" sz="1600" b="0" i="0" u="none" strike="noStrike" cap="none" spc="0">
-                <a:solidFill>
-                  <a:schemeClr val="tx1"/>
-                </a:solidFill>
-                <a:latin typeface="PT Sans"/>
-                <a:ea typeface="PT Sans"/>
-                <a:cs typeface="PT Sans"/>
-              </a:rPr>
-              <a:t>sudoku.sqlite - база данных проекта;</a:t>
-            </a:r>
-            <a:endParaRPr sz="1600" b="0" i="0" u="none" strike="noStrike" cap="none" spc="0">
+              <a:rPr lang="en-US" sz="1600" b="0" i="0" u="none" strike="noStrike" cap="none" spc="0" dirty="0">
+                <a:solidFill>
+                  <a:schemeClr val="tx1"/>
+                </a:solidFill>
+                <a:latin typeface="PT Sans"/>
+                <a:ea typeface="PT Sans"/>
+                <a:cs typeface="PT Sans"/>
+              </a:rPr>
+              <a:t>readme.md - </a:t>
+            </a:r>
+            <a:r>
+              <a:rPr lang="ru-RU" sz="1600" b="0" i="0" u="none" strike="noStrike" cap="none" spc="0" dirty="0">
+                <a:solidFill>
+                  <a:schemeClr val="tx1"/>
+                </a:solidFill>
+                <a:latin typeface="PT Sans"/>
+                <a:ea typeface="PT Sans"/>
+                <a:cs typeface="PT Sans"/>
+              </a:rPr>
+              <a:t>вспомогательный файл для других программистов;</a:t>
+            </a:r>
+            <a:endParaRPr sz="1600" b="0" i="0" u="none" strike="noStrike" cap="none" spc="0" dirty="0">
               <a:solidFill>
                 <a:schemeClr val="tx1"/>
               </a:solidFill>
@@ -4064,39 +4885,61 @@
               <a:defRPr/>
             </a:pPr>
             <a:r>
-              <a:rPr lang="en-US" sz="1600" b="0" i="0" u="none" strike="noStrike" cap="none" spc="0">
-                <a:solidFill>
-                  <a:schemeClr val="tx1"/>
-                </a:solidFill>
-                <a:latin typeface="PT Sans"/>
-                <a:ea typeface="PT Sans"/>
-                <a:cs typeface="PT Sans"/>
-              </a:rPr>
-              <a:t>re</a:t>
-            </a:r>
-            <a:r>
-              <a:rPr lang="en-US" sz="1600" b="0" i="0" u="none" strike="noStrike" cap="none" spc="0">
-                <a:solidFill>
-                  <a:schemeClr val="tx1"/>
-                </a:solidFill>
-                <a:latin typeface="PT Sans"/>
-                <a:ea typeface="PT Sans"/>
-                <a:cs typeface="PT Sans"/>
-              </a:rPr>
-              <a:t>adme.md - </a:t>
-            </a:r>
-            <a:r>
-              <a:rPr lang="ru-RU" sz="1600" b="0" i="0" u="none" strike="noStrike" cap="none" spc="0">
-                <a:solidFill>
-                  <a:schemeClr val="tx1"/>
-                </a:solidFill>
-                <a:latin typeface="PT Sans"/>
-                <a:ea typeface="PT Sans"/>
-                <a:cs typeface="PT Sans"/>
-              </a:rPr>
-              <a:t>вспомогательный файл для других программистов;</a:t>
-            </a:r>
-            <a:endParaRPr sz="1600" b="0" i="0" u="none" strike="noStrike" cap="none" spc="0">
+              <a:rPr lang="en-US" sz="1600" b="0" i="0" u="none" strike="noStrike" cap="none" spc="0" dirty="0">
+                <a:solidFill>
+                  <a:schemeClr val="tx1"/>
+                </a:solidFill>
+                <a:latin typeface="PT Sans"/>
+                <a:ea typeface="PT Sans"/>
+                <a:cs typeface="PT Sans"/>
+              </a:rPr>
+              <a:t>presentation.pptx - </a:t>
+            </a:r>
+            <a:r>
+              <a:rPr lang="en-US" sz="1600" b="0" i="0" u="none" strike="noStrike" cap="none" spc="0" dirty="0" err="1">
+                <a:solidFill>
+                  <a:schemeClr val="tx1"/>
+                </a:solidFill>
+                <a:latin typeface="PT Sans"/>
+                <a:ea typeface="PT Sans"/>
+                <a:cs typeface="PT Sans"/>
+              </a:rPr>
+              <a:t>презентация</a:t>
+            </a:r>
+            <a:r>
+              <a:rPr lang="en-US" sz="1600" b="0" i="0" u="none" strike="noStrike" cap="none" spc="0" dirty="0">
+                <a:solidFill>
+                  <a:schemeClr val="tx1"/>
+                </a:solidFill>
+                <a:latin typeface="PT Sans"/>
+                <a:ea typeface="PT Sans"/>
+                <a:cs typeface="PT Sans"/>
+              </a:rPr>
+              <a:t> с </a:t>
+            </a:r>
+            <a:r>
+              <a:rPr lang="en-US" sz="1600" b="0" i="0" u="none" strike="noStrike" cap="none" spc="0" dirty="0" err="1">
+                <a:solidFill>
+                  <a:schemeClr val="tx1"/>
+                </a:solidFill>
+                <a:latin typeface="PT Sans"/>
+                <a:ea typeface="PT Sans"/>
+                <a:cs typeface="PT Sans"/>
+              </a:rPr>
+              <a:t>описанием</a:t>
+            </a:r>
+            <a:r>
+              <a:rPr lang="en-US" sz="1600" b="0" i="0" u="none" strike="noStrike" cap="none" spc="0" dirty="0">
+                <a:solidFill>
+                  <a:schemeClr val="tx1"/>
+                </a:solidFill>
+                <a:latin typeface="PT Sans"/>
+                <a:ea typeface="PT Sans"/>
+                <a:cs typeface="PT Sans"/>
+              </a:rPr>
+              <a:t> проекта;</a:t>
+            </a:r>
+            <a:endParaRPr sz="1600" b="0" i="0" u="none" strike="noStrike" cap="none" spc="0" dirty="0">
               <a:solidFill>
                 <a:schemeClr val="tx1"/>
               </a:solidFill>
@@ -4112,17 +4955,105 @@
               <a:defRPr/>
             </a:pPr>
             <a:r>
-              <a:rPr lang="en-US" sz="1600" b="0" i="0" u="none" strike="noStrike" cap="none" spc="0">
-                <a:solidFill>
-                  <a:schemeClr val="tx1"/>
-                </a:solidFill>
-                <a:latin typeface="PT Sans"/>
-                <a:ea typeface="PT Sans"/>
-                <a:cs typeface="PT Sans"/>
-              </a:rPr>
-              <a:t>presentation.pptx - презентация с описанием проекта;</a:t>
-            </a:r>
-            <a:endParaRPr sz="1600" b="0" i="0" u="none" strike="noStrike" cap="none" spc="0">
+              <a:rPr lang="en-US" sz="1600" b="0" i="0" u="none" strike="noStrike" cap="none" spc="0" dirty="0">
+                <a:solidFill>
+                  <a:schemeClr val="tx1"/>
+                </a:solidFill>
+                <a:latin typeface="PT Sans"/>
+                <a:ea typeface="PT Sans"/>
+                <a:cs typeface="PT Sans"/>
+              </a:rPr>
+              <a:t>help.docx - </a:t>
+            </a:r>
+            <a:r>
+              <a:rPr lang="en-US" sz="1600" b="0" i="0" u="none" strike="noStrike" cap="none" spc="0" dirty="0" err="1">
+                <a:solidFill>
+                  <a:schemeClr val="tx1"/>
+                </a:solidFill>
+                <a:latin typeface="PT Sans"/>
+                <a:ea typeface="PT Sans"/>
+                <a:cs typeface="PT Sans"/>
+              </a:rPr>
+              <a:t>вспомогательный</a:t>
+            </a:r>
+            <a:r>
+              <a:rPr lang="en-US" sz="1600" b="0" i="0" u="none" strike="noStrike" cap="none" spc="0" dirty="0">
+                <a:solidFill>
+                  <a:schemeClr val="tx1"/>
+                </a:solidFill>
+                <a:latin typeface="PT Sans"/>
+                <a:ea typeface="PT Sans"/>
+                <a:cs typeface="PT Sans"/>
+              </a:rPr>
+              <a:t> </a:t>
+            </a:r>
+            <a:r>
+              <a:rPr lang="en-US" sz="1600" b="0" i="0" u="none" strike="noStrike" cap="none" spc="0" dirty="0" err="1">
+                <a:solidFill>
+                  <a:schemeClr val="tx1"/>
+                </a:solidFill>
+                <a:latin typeface="PT Sans"/>
+                <a:ea typeface="PT Sans"/>
+                <a:cs typeface="PT Sans"/>
+              </a:rPr>
+              <a:t>файл</a:t>
+            </a:r>
+            <a:r>
+              <a:rPr lang="en-US" sz="1600" b="0" i="0" u="none" strike="noStrike" cap="none" spc="0" dirty="0">
+                <a:solidFill>
+                  <a:schemeClr val="tx1"/>
+                </a:solidFill>
+                <a:latin typeface="PT Sans"/>
+                <a:ea typeface="PT Sans"/>
+                <a:cs typeface="PT Sans"/>
+              </a:rPr>
+              <a:t> </a:t>
+            </a:r>
+            <a:r>
+              <a:rPr lang="en-US" sz="1600" b="0" i="0" u="none" strike="noStrike" cap="none" spc="0" dirty="0" err="1">
+                <a:solidFill>
+                  <a:schemeClr val="tx1"/>
+                </a:solidFill>
+                <a:latin typeface="PT Sans"/>
+                <a:ea typeface="PT Sans"/>
+                <a:cs typeface="PT Sans"/>
+              </a:rPr>
+              <a:t>для</a:t>
+            </a:r>
+            <a:r>
+              <a:rPr lang="en-US" sz="1600" b="0" i="0" u="none" strike="noStrike" cap="none" spc="0" dirty="0">
+                <a:solidFill>
+                  <a:schemeClr val="tx1"/>
+                </a:solidFill>
+                <a:latin typeface="PT Sans"/>
+                <a:ea typeface="PT Sans"/>
+                <a:cs typeface="PT Sans"/>
+              </a:rPr>
+              <a:t> </a:t>
+            </a:r>
+            <a:r>
+              <a:rPr lang="en-US" sz="1600" b="0" i="0" u="none" strike="noStrike" cap="none" spc="0" dirty="0" err="1">
+                <a:solidFill>
+                  <a:schemeClr val="tx1"/>
+                </a:solidFill>
+                <a:latin typeface="PT Sans"/>
+                <a:ea typeface="PT Sans"/>
+                <a:cs typeface="PT Sans"/>
+              </a:rPr>
+              <a:t>пользователей</a:t>
+            </a:r>
+            <a:r>
+              <a:rPr lang="en-US" sz="1600" b="0" i="0" u="none" strike="noStrike" cap="none" spc="0" dirty="0">
+                <a:solidFill>
+                  <a:schemeClr val="tx1"/>
+                </a:solidFill>
+                <a:latin typeface="PT Sans"/>
+                <a:ea typeface="PT Sans"/>
+                <a:cs typeface="PT Sans"/>
+              </a:rPr>
+              <a:t>;</a:t>
+            </a:r>
+            <a:endParaRPr sz="1600" b="0" i="0" u="none" strike="noStrike" cap="none" spc="0" dirty="0">
               <a:solidFill>
                 <a:schemeClr val="tx1"/>
               </a:solidFill>
@@ -4138,20 +5069,962 @@
               <a:defRPr/>
             </a:pPr>
             <a:r>
-              <a:rPr lang="en-US" sz="1600" b="0" i="0" u="none" strike="noStrike" cap="none" spc="0">
-                <a:solidFill>
-                  <a:schemeClr val="tx1"/>
-                </a:solidFill>
-                <a:latin typeface="PT Sans"/>
-                <a:ea typeface="PT Sans"/>
-                <a:cs typeface="PT Sans"/>
-              </a:rPr>
-              <a:t>help.docx - вспомогательный файл для пользователей;</a:t>
-            </a:r>
-            <a:endParaRPr sz="1600" b="0" i="0" u="none" strike="noStrike" cap="none" spc="0">
-              <a:solidFill>
-                <a:schemeClr val="tx1"/>
-              </a:solidFill>
+              <a:rPr lang="en-US" sz="1600" b="0" i="0" u="none" strike="noStrike" cap="none" spc="0" dirty="0">
+                <a:solidFill>
+                  <a:schemeClr val="tx1"/>
+                </a:solidFill>
+                <a:latin typeface="PT Sans"/>
+                <a:ea typeface="PT Sans"/>
+                <a:cs typeface="PT Sans"/>
+              </a:rPr>
+              <a:t>requirements.txt - </a:t>
+            </a:r>
+            <a:r>
+              <a:rPr lang="en-US" sz="1600" b="0" i="0" u="none" strike="noStrike" cap="none" spc="0" dirty="0" err="1">
+                <a:solidFill>
+                  <a:schemeClr val="tx1"/>
+                </a:solidFill>
+                <a:latin typeface="PT Sans"/>
+                <a:ea typeface="PT Sans"/>
+                <a:cs typeface="PT Sans"/>
+              </a:rPr>
+              <a:t>список</a:t>
+            </a:r>
+            <a:r>
+              <a:rPr lang="en-US" sz="1600" b="0" i="0" u="none" strike="noStrike" cap="none" spc="0" dirty="0">
+                <a:solidFill>
+                  <a:schemeClr val="tx1"/>
+                </a:solidFill>
+                <a:latin typeface="PT Sans"/>
+                <a:ea typeface="PT Sans"/>
+                <a:cs typeface="PT Sans"/>
+              </a:rPr>
+              <a:t> </a:t>
+            </a:r>
+            <a:r>
+              <a:rPr lang="en-US" sz="1600" b="0" i="0" u="none" strike="noStrike" cap="none" spc="0" dirty="0" err="1">
+                <a:solidFill>
+                  <a:schemeClr val="tx1"/>
+                </a:solidFill>
+                <a:latin typeface="PT Sans"/>
+                <a:ea typeface="PT Sans"/>
+                <a:cs typeface="PT Sans"/>
+              </a:rPr>
+              <a:t>библиотек</a:t>
+            </a:r>
+            <a:r>
+              <a:rPr lang="en-US" sz="1600" b="0" i="0" u="none" strike="noStrike" cap="none" spc="0" dirty="0">
+                <a:solidFill>
+                  <a:schemeClr val="tx1"/>
+                </a:solidFill>
+                <a:latin typeface="PT Sans"/>
+                <a:ea typeface="PT Sans"/>
+                <a:cs typeface="PT Sans"/>
+              </a:rPr>
+              <a:t>, </a:t>
+            </a:r>
+            <a:r>
+              <a:rPr lang="en-US" sz="1600" b="0" i="0" u="none" strike="noStrike" cap="none" spc="0" dirty="0" err="1">
+                <a:solidFill>
+                  <a:schemeClr val="tx1"/>
+                </a:solidFill>
+                <a:latin typeface="PT Sans"/>
+                <a:ea typeface="PT Sans"/>
+                <a:cs typeface="PT Sans"/>
+              </a:rPr>
+              <a:t>необходимых</a:t>
+            </a:r>
+            <a:r>
+              <a:rPr lang="en-US" sz="1600" b="0" i="0" u="none" strike="noStrike" cap="none" spc="0" dirty="0">
+                <a:solidFill>
+                  <a:schemeClr val="tx1"/>
+                </a:solidFill>
+                <a:latin typeface="PT Sans"/>
+                <a:ea typeface="PT Sans"/>
+                <a:cs typeface="PT Sans"/>
+              </a:rPr>
+              <a:t> </a:t>
+            </a:r>
+            <a:r>
+              <a:rPr lang="en-US" sz="1600" b="0" i="0" u="none" strike="noStrike" cap="none" spc="0" dirty="0" err="1">
+                <a:solidFill>
+                  <a:schemeClr val="tx1"/>
+                </a:solidFill>
+                <a:latin typeface="PT Sans"/>
+                <a:ea typeface="PT Sans"/>
+                <a:cs typeface="PT Sans"/>
+              </a:rPr>
+              <a:t>для</a:t>
+            </a:r>
+            <a:r>
+              <a:rPr lang="en-US" sz="1600" b="0" i="0" u="none" strike="noStrike" cap="none" spc="0" dirty="0">
+                <a:solidFill>
+                  <a:schemeClr val="tx1"/>
+                </a:solidFill>
+                <a:latin typeface="PT Sans"/>
+                <a:ea typeface="PT Sans"/>
+                <a:cs typeface="PT Sans"/>
+              </a:rPr>
+              <a:t> </a:t>
+            </a:r>
+            <a:r>
+              <a:rPr lang="en-US" sz="1600" b="0" i="0" u="none" strike="noStrike" cap="none" spc="0" dirty="0" err="1">
+                <a:solidFill>
+                  <a:schemeClr val="tx1"/>
+                </a:solidFill>
+                <a:latin typeface="PT Sans"/>
+                <a:ea typeface="PT Sans"/>
+                <a:cs typeface="PT Sans"/>
+              </a:rPr>
+              <a:t>корректной</a:t>
+            </a:r>
+            <a:r>
+              <a:rPr lang="en-US" sz="1600" b="0" i="0" u="none" strike="noStrike" cap="none" spc="0" dirty="0">
+                <a:solidFill>
+                  <a:schemeClr val="tx1"/>
+                </a:solidFill>
+                <a:latin typeface="PT Sans"/>
+                <a:ea typeface="PT Sans"/>
+                <a:cs typeface="PT Sans"/>
+              </a:rPr>
+              <a:t> работы проекта</a:t>
+            </a:r>
+            <a:r>
+              <a:rPr lang="ru-RU" sz="1600" b="0" i="0" u="none" strike="noStrike" cap="none" spc="0" dirty="0">
+                <a:solidFill>
+                  <a:schemeClr val="tx1"/>
+                </a:solidFill>
+                <a:latin typeface="PT Sans"/>
+                <a:ea typeface="PT Sans"/>
+                <a:cs typeface="PT Sans"/>
+              </a:rPr>
+              <a:t>;</a:t>
+            </a:r>
+          </a:p>
+          <a:p>
+            <a:pPr marL="239821" indent="-239821">
+              <a:buFont typeface="PT Sans"/>
+              <a:buAutoNum type="arabicPeriod"/>
+              <a:defRPr/>
+            </a:pPr>
+            <a:r>
+              <a:rPr lang="en-US" sz="1600" b="0" i="0" u="none" strike="noStrike" cap="none" spc="0" dirty="0">
+                <a:solidFill>
+                  <a:schemeClr val="tx1"/>
+                </a:solidFill>
+                <a:latin typeface="PT Sans"/>
+                <a:ea typeface="PT Sans"/>
+                <a:cs typeface="PT Sans"/>
+              </a:rPr>
+              <a:t>easy - </a:t>
+            </a:r>
+            <a:r>
+              <a:rPr lang="en-US" sz="1600" b="0" i="0" u="none" strike="noStrike" cap="none" spc="0" dirty="0" err="1">
+                <a:solidFill>
+                  <a:schemeClr val="tx1"/>
+                </a:solidFill>
+                <a:latin typeface="PT Sans"/>
+                <a:ea typeface="PT Sans"/>
+                <a:cs typeface="PT Sans"/>
+              </a:rPr>
+              <a:t>папка</a:t>
+            </a:r>
+            <a:r>
+              <a:rPr lang="en-US" sz="1600" b="0" i="0" u="none" strike="noStrike" cap="none" spc="0" dirty="0">
+                <a:solidFill>
+                  <a:schemeClr val="tx1"/>
+                </a:solidFill>
+                <a:latin typeface="PT Sans"/>
+                <a:ea typeface="PT Sans"/>
+                <a:cs typeface="PT Sans"/>
+              </a:rPr>
+              <a:t>, </a:t>
+            </a:r>
+            <a:r>
+              <a:rPr lang="en-US" sz="1600" b="0" i="0" u="none" strike="noStrike" cap="none" spc="0" dirty="0" err="1">
+                <a:solidFill>
+                  <a:schemeClr val="tx1"/>
+                </a:solidFill>
+                <a:latin typeface="PT Sans"/>
+                <a:ea typeface="PT Sans"/>
+                <a:cs typeface="PT Sans"/>
+              </a:rPr>
+              <a:t>содержащая</a:t>
+            </a:r>
+            <a:r>
+              <a:rPr lang="en-US" sz="1600" b="0" i="0" u="none" strike="noStrike" cap="none" spc="0" dirty="0">
+                <a:solidFill>
+                  <a:schemeClr val="tx1"/>
+                </a:solidFill>
+                <a:latin typeface="PT Sans"/>
+                <a:ea typeface="PT Sans"/>
+                <a:cs typeface="PT Sans"/>
+              </a:rPr>
+              <a:t> в </a:t>
+            </a:r>
+            <a:r>
+              <a:rPr lang="en-US" sz="1600" b="0" i="0" u="none" strike="noStrike" cap="none" spc="0" dirty="0" err="1">
+                <a:solidFill>
+                  <a:schemeClr val="tx1"/>
+                </a:solidFill>
+                <a:latin typeface="PT Sans"/>
+                <a:ea typeface="PT Sans"/>
+                <a:cs typeface="PT Sans"/>
+              </a:rPr>
+              <a:t>себе</a:t>
+            </a:r>
+            <a:r>
+              <a:rPr lang="en-US" sz="1600" b="0" i="0" u="none" strike="noStrike" cap="none" spc="0" dirty="0">
+                <a:solidFill>
+                  <a:schemeClr val="tx1"/>
+                </a:solidFill>
+                <a:latin typeface="PT Sans"/>
+                <a:ea typeface="PT Sans"/>
+                <a:cs typeface="PT Sans"/>
+              </a:rPr>
+              <a:t> 20 </a:t>
+            </a:r>
+            <a:r>
+              <a:rPr lang="en-US" sz="1600" b="0" i="0" u="none" strike="noStrike" cap="none" spc="0" dirty="0" err="1">
+                <a:solidFill>
+                  <a:schemeClr val="tx1"/>
+                </a:solidFill>
+                <a:latin typeface="PT Sans"/>
+                <a:ea typeface="PT Sans"/>
+                <a:cs typeface="PT Sans"/>
+              </a:rPr>
+              <a:t>лёгких</a:t>
+            </a:r>
+            <a:r>
+              <a:rPr lang="en-US" sz="1600" b="0" i="0" u="none" strike="noStrike" cap="none" spc="0" dirty="0">
+                <a:solidFill>
+                  <a:schemeClr val="tx1"/>
+                </a:solidFill>
+                <a:latin typeface="PT Sans"/>
+                <a:ea typeface="PT Sans"/>
+                <a:cs typeface="PT Sans"/>
+              </a:rPr>
+              <a:t> судоку, </a:t>
+            </a:r>
+            <a:r>
+              <a:rPr lang="en-US" sz="1600" b="0" i="0" u="none" strike="noStrike" cap="none" spc="0" dirty="0" err="1">
+                <a:solidFill>
+                  <a:schemeClr val="tx1"/>
+                </a:solidFill>
+                <a:latin typeface="PT Sans"/>
+                <a:ea typeface="PT Sans"/>
+                <a:cs typeface="PT Sans"/>
+              </a:rPr>
+              <a:t>записанных</a:t>
+            </a:r>
+            <a:r>
+              <a:rPr lang="en-US" sz="1600" b="0" i="0" u="none" strike="noStrike" cap="none" spc="0" dirty="0">
+                <a:solidFill>
+                  <a:schemeClr val="tx1"/>
+                </a:solidFill>
+                <a:latin typeface="PT Sans"/>
+                <a:ea typeface="PT Sans"/>
+                <a:cs typeface="PT Sans"/>
+              </a:rPr>
+              <a:t> в csv-</a:t>
+            </a:r>
+            <a:r>
+              <a:rPr lang="en-US" sz="1600" b="0" i="0" u="none" strike="noStrike" cap="none" spc="0" dirty="0" err="1">
+                <a:solidFill>
+                  <a:schemeClr val="tx1"/>
+                </a:solidFill>
+                <a:latin typeface="PT Sans"/>
+                <a:ea typeface="PT Sans"/>
+                <a:cs typeface="PT Sans"/>
+              </a:rPr>
+              <a:t>файлах</a:t>
+            </a:r>
+            <a:r>
+              <a:rPr lang="en-US" sz="1600" b="0" i="0" u="none" strike="noStrike" cap="none" spc="0" dirty="0">
+                <a:solidFill>
+                  <a:schemeClr val="tx1"/>
+                </a:solidFill>
+                <a:latin typeface="PT Sans"/>
+                <a:ea typeface="PT Sans"/>
+                <a:cs typeface="PT Sans"/>
+              </a:rPr>
+              <a:t>;</a:t>
+            </a:r>
+          </a:p>
+          <a:p>
+            <a:pPr marL="239821" indent="-239821">
+              <a:buFont typeface="PT Sans"/>
+              <a:buAutoNum type="arabicPeriod"/>
+              <a:defRPr/>
+            </a:pPr>
+            <a:r>
+              <a:rPr lang="en-US" sz="1600" b="0" i="0" u="none" strike="noStrike" cap="none" spc="0" dirty="0">
+                <a:solidFill>
+                  <a:schemeClr val="tx1"/>
+                </a:solidFill>
+                <a:latin typeface="PT Sans"/>
+                <a:ea typeface="PT Sans"/>
+                <a:cs typeface="PT Sans"/>
+              </a:rPr>
+              <a:t>normal - </a:t>
+            </a:r>
+            <a:r>
+              <a:rPr lang="en-US" sz="1600" b="0" i="0" u="none" strike="noStrike" cap="none" spc="0" dirty="0" err="1">
+                <a:solidFill>
+                  <a:schemeClr val="tx1"/>
+                </a:solidFill>
+                <a:latin typeface="PT Sans"/>
+                <a:ea typeface="PT Sans"/>
+                <a:cs typeface="PT Sans"/>
+              </a:rPr>
+              <a:t>папка</a:t>
+            </a:r>
+            <a:r>
+              <a:rPr lang="en-US" sz="1600" b="0" i="0" u="none" strike="noStrike" cap="none" spc="0" dirty="0">
+                <a:solidFill>
+                  <a:schemeClr val="tx1"/>
+                </a:solidFill>
+                <a:latin typeface="PT Sans"/>
+                <a:ea typeface="PT Sans"/>
+                <a:cs typeface="PT Sans"/>
+              </a:rPr>
+              <a:t>, </a:t>
+            </a:r>
+            <a:r>
+              <a:rPr lang="en-US" sz="1600" b="0" i="0" u="none" strike="noStrike" cap="none" spc="0" dirty="0" err="1">
+                <a:solidFill>
+                  <a:schemeClr val="tx1"/>
+                </a:solidFill>
+                <a:latin typeface="PT Sans"/>
+                <a:ea typeface="PT Sans"/>
+                <a:cs typeface="PT Sans"/>
+              </a:rPr>
+              <a:t>содержащая</a:t>
+            </a:r>
+            <a:r>
+              <a:rPr lang="en-US" sz="1600" b="0" i="0" u="none" strike="noStrike" cap="none" spc="0" dirty="0">
+                <a:solidFill>
+                  <a:schemeClr val="tx1"/>
+                </a:solidFill>
+                <a:latin typeface="PT Sans"/>
+                <a:ea typeface="PT Sans"/>
+                <a:cs typeface="PT Sans"/>
+              </a:rPr>
+              <a:t> в </a:t>
+            </a:r>
+            <a:r>
+              <a:rPr lang="en-US" sz="1600" b="0" i="0" u="none" strike="noStrike" cap="none" spc="0" dirty="0" err="1">
+                <a:solidFill>
+                  <a:schemeClr val="tx1"/>
+                </a:solidFill>
+                <a:latin typeface="PT Sans"/>
+                <a:ea typeface="PT Sans"/>
+                <a:cs typeface="PT Sans"/>
+              </a:rPr>
+              <a:t>себе</a:t>
+            </a:r>
+            <a:r>
+              <a:rPr lang="en-US" sz="1600" b="0" i="0" u="none" strike="noStrike" cap="none" spc="0" dirty="0">
+                <a:solidFill>
+                  <a:schemeClr val="tx1"/>
+                </a:solidFill>
+                <a:latin typeface="PT Sans"/>
+                <a:ea typeface="PT Sans"/>
+                <a:cs typeface="PT Sans"/>
+              </a:rPr>
+              <a:t> 20 </a:t>
+            </a:r>
+            <a:r>
+              <a:rPr lang="en-US" sz="1600" b="0" i="0" u="none" strike="noStrike" cap="none" spc="0" dirty="0" err="1">
+                <a:solidFill>
+                  <a:schemeClr val="tx1"/>
+                </a:solidFill>
+                <a:latin typeface="PT Sans"/>
+                <a:ea typeface="PT Sans"/>
+                <a:cs typeface="PT Sans"/>
+              </a:rPr>
+              <a:t>обычных</a:t>
+            </a:r>
+            <a:r>
+              <a:rPr lang="en-US" sz="1600" b="0" i="0" u="none" strike="noStrike" cap="none" spc="0" dirty="0">
+                <a:solidFill>
+                  <a:schemeClr val="tx1"/>
+                </a:solidFill>
+                <a:latin typeface="PT Sans"/>
+                <a:ea typeface="PT Sans"/>
+                <a:cs typeface="PT Sans"/>
+              </a:rPr>
+              <a:t> судоку, </a:t>
+            </a:r>
+            <a:r>
+              <a:rPr lang="en-US" sz="1600" b="0" i="0" u="none" strike="noStrike" cap="none" spc="0" dirty="0" err="1">
+                <a:solidFill>
+                  <a:schemeClr val="tx1"/>
+                </a:solidFill>
+                <a:latin typeface="PT Sans"/>
+                <a:ea typeface="PT Sans"/>
+                <a:cs typeface="PT Sans"/>
+              </a:rPr>
+              <a:t>записанных</a:t>
+            </a:r>
+            <a:r>
+              <a:rPr lang="en-US" sz="1600" b="0" i="0" u="none" strike="noStrike" cap="none" spc="0" dirty="0">
+                <a:solidFill>
+                  <a:schemeClr val="tx1"/>
+                </a:solidFill>
+                <a:latin typeface="PT Sans"/>
+                <a:ea typeface="PT Sans"/>
+                <a:cs typeface="PT Sans"/>
+              </a:rPr>
+              <a:t> в csv-</a:t>
+            </a:r>
+            <a:r>
+              <a:rPr lang="en-US" sz="1600" b="0" i="0" u="none" strike="noStrike" cap="none" spc="0" dirty="0" err="1">
+                <a:solidFill>
+                  <a:schemeClr val="tx1"/>
+                </a:solidFill>
+                <a:latin typeface="PT Sans"/>
+                <a:ea typeface="PT Sans"/>
+                <a:cs typeface="PT Sans"/>
+              </a:rPr>
+              <a:t>файлах</a:t>
+            </a:r>
+            <a:r>
+              <a:rPr lang="en-US" sz="1600" b="0" i="0" u="none" strike="noStrike" cap="none" spc="0" dirty="0">
+                <a:solidFill>
+                  <a:schemeClr val="tx1"/>
+                </a:solidFill>
+                <a:latin typeface="PT Sans"/>
+                <a:ea typeface="PT Sans"/>
+                <a:cs typeface="PT Sans"/>
+              </a:rPr>
+              <a:t>;</a:t>
+            </a:r>
+          </a:p>
+          <a:p>
+            <a:pPr marL="239821" indent="-239821">
+              <a:buFont typeface="PT Sans"/>
+              <a:buAutoNum type="arabicPeriod"/>
+              <a:defRPr/>
+            </a:pPr>
+            <a:r>
+              <a:rPr lang="en-US" sz="1600" b="0" i="0" u="none" strike="noStrike" cap="none" spc="0" dirty="0">
+                <a:solidFill>
+                  <a:schemeClr val="tx1"/>
+                </a:solidFill>
+                <a:latin typeface="PT Sans"/>
+                <a:ea typeface="PT Sans"/>
+                <a:cs typeface="PT Sans"/>
+              </a:rPr>
+              <a:t>hard - </a:t>
+            </a:r>
+            <a:r>
+              <a:rPr lang="en-US" sz="1600" b="0" i="0" u="none" strike="noStrike" cap="none" spc="0" dirty="0" err="1">
+                <a:solidFill>
+                  <a:schemeClr val="tx1"/>
+                </a:solidFill>
+                <a:latin typeface="PT Sans"/>
+                <a:ea typeface="PT Sans"/>
+                <a:cs typeface="PT Sans"/>
+              </a:rPr>
+              <a:t>папка</a:t>
+            </a:r>
+            <a:r>
+              <a:rPr lang="en-US" sz="1600" b="0" i="0" u="none" strike="noStrike" cap="none" spc="0" dirty="0">
+                <a:solidFill>
+                  <a:schemeClr val="tx1"/>
+                </a:solidFill>
+                <a:latin typeface="PT Sans"/>
+                <a:ea typeface="PT Sans"/>
+                <a:cs typeface="PT Sans"/>
+              </a:rPr>
+              <a:t>, </a:t>
+            </a:r>
+            <a:r>
+              <a:rPr lang="en-US" sz="1600" b="0" i="0" u="none" strike="noStrike" cap="none" spc="0" dirty="0" err="1">
+                <a:solidFill>
+                  <a:schemeClr val="tx1"/>
+                </a:solidFill>
+                <a:latin typeface="PT Sans"/>
+                <a:ea typeface="PT Sans"/>
+                <a:cs typeface="PT Sans"/>
+              </a:rPr>
+              <a:t>содержащая</a:t>
+            </a:r>
+            <a:r>
+              <a:rPr lang="en-US" sz="1600" b="0" i="0" u="none" strike="noStrike" cap="none" spc="0" dirty="0">
+                <a:solidFill>
+                  <a:schemeClr val="tx1"/>
+                </a:solidFill>
+                <a:latin typeface="PT Sans"/>
+                <a:ea typeface="PT Sans"/>
+                <a:cs typeface="PT Sans"/>
+              </a:rPr>
+              <a:t> в </a:t>
+            </a:r>
+            <a:r>
+              <a:rPr lang="en-US" sz="1600" b="0" i="0" u="none" strike="noStrike" cap="none" spc="0" dirty="0" err="1">
+                <a:solidFill>
+                  <a:schemeClr val="tx1"/>
+                </a:solidFill>
+                <a:latin typeface="PT Sans"/>
+                <a:ea typeface="PT Sans"/>
+                <a:cs typeface="PT Sans"/>
+              </a:rPr>
+              <a:t>себе</a:t>
+            </a:r>
+            <a:r>
+              <a:rPr lang="en-US" sz="1600" b="0" i="0" u="none" strike="noStrike" cap="none" spc="0" dirty="0">
+                <a:solidFill>
+                  <a:schemeClr val="tx1"/>
+                </a:solidFill>
+                <a:latin typeface="PT Sans"/>
+                <a:ea typeface="PT Sans"/>
+                <a:cs typeface="PT Sans"/>
+              </a:rPr>
+              <a:t> 20 </a:t>
+            </a:r>
+            <a:r>
+              <a:rPr lang="en-US" sz="1600" b="0" i="0" u="none" strike="noStrike" cap="none" spc="0" dirty="0" err="1">
+                <a:solidFill>
+                  <a:schemeClr val="tx1"/>
+                </a:solidFill>
+                <a:latin typeface="PT Sans"/>
+                <a:ea typeface="PT Sans"/>
+                <a:cs typeface="PT Sans"/>
+              </a:rPr>
+              <a:t>тяжёлых</a:t>
+            </a:r>
+            <a:r>
+              <a:rPr lang="en-US" sz="1600" b="0" i="0" u="none" strike="noStrike" cap="none" spc="0" dirty="0">
+                <a:solidFill>
+                  <a:schemeClr val="tx1"/>
+                </a:solidFill>
+                <a:latin typeface="PT Sans"/>
+                <a:ea typeface="PT Sans"/>
+                <a:cs typeface="PT Sans"/>
+              </a:rPr>
+              <a:t> судоку, </a:t>
+            </a:r>
+            <a:r>
+              <a:rPr lang="en-US" sz="1600" b="0" i="0" u="none" strike="noStrike" cap="none" spc="0" dirty="0" err="1">
+                <a:solidFill>
+                  <a:schemeClr val="tx1"/>
+                </a:solidFill>
+                <a:latin typeface="PT Sans"/>
+                <a:ea typeface="PT Sans"/>
+                <a:cs typeface="PT Sans"/>
+              </a:rPr>
+              <a:t>записанных</a:t>
+            </a:r>
+            <a:r>
+              <a:rPr lang="en-US" sz="1600" b="0" i="0" u="none" strike="noStrike" cap="none" spc="0" dirty="0">
+                <a:solidFill>
+                  <a:schemeClr val="tx1"/>
+                </a:solidFill>
+                <a:latin typeface="PT Sans"/>
+                <a:ea typeface="PT Sans"/>
+                <a:cs typeface="PT Sans"/>
+              </a:rPr>
+              <a:t> в csv-</a:t>
+            </a:r>
+            <a:r>
+              <a:rPr lang="en-US" sz="1600" b="0" i="0" u="none" strike="noStrike" cap="none" spc="0" dirty="0" err="1">
+                <a:solidFill>
+                  <a:schemeClr val="tx1"/>
+                </a:solidFill>
+                <a:latin typeface="PT Sans"/>
+                <a:ea typeface="PT Sans"/>
+                <a:cs typeface="PT Sans"/>
+              </a:rPr>
+              <a:t>файлах</a:t>
+            </a:r>
+            <a:r>
+              <a:rPr lang="en-US" sz="1600" b="0" i="0" u="none" strike="noStrike" cap="none" spc="0" dirty="0">
+                <a:solidFill>
+                  <a:schemeClr val="tx1"/>
+                </a:solidFill>
+                <a:latin typeface="PT Sans"/>
+                <a:ea typeface="PT Sans"/>
+                <a:cs typeface="PT Sans"/>
+              </a:rPr>
+              <a:t>;</a:t>
+            </a:r>
+          </a:p>
+          <a:p>
+            <a:pPr marL="239821" indent="-239821">
+              <a:buFont typeface="PT Sans"/>
+              <a:buAutoNum type="arabicPeriod"/>
+              <a:defRPr/>
+            </a:pPr>
+            <a:r>
+              <a:rPr lang="en-US" sz="1600" b="0" i="0" u="none" strike="noStrike" cap="none" spc="0" dirty="0">
+                <a:solidFill>
+                  <a:schemeClr val="tx1"/>
+                </a:solidFill>
+                <a:latin typeface="PT Sans"/>
+                <a:ea typeface="PT Sans"/>
+                <a:cs typeface="PT Sans"/>
+              </a:rPr>
+              <a:t>images - </a:t>
+            </a:r>
+            <a:r>
+              <a:rPr lang="en-US" sz="1600" b="0" i="0" u="none" strike="noStrike" cap="none" spc="0" dirty="0" err="1">
+                <a:solidFill>
+                  <a:schemeClr val="tx1"/>
+                </a:solidFill>
+                <a:latin typeface="PT Sans"/>
+                <a:ea typeface="PT Sans"/>
+                <a:cs typeface="PT Sans"/>
+              </a:rPr>
+              <a:t>папка</a:t>
+            </a:r>
+            <a:r>
+              <a:rPr lang="en-US" sz="1600" b="0" i="0" u="none" strike="noStrike" cap="none" spc="0" dirty="0">
+                <a:solidFill>
+                  <a:schemeClr val="tx1"/>
+                </a:solidFill>
+                <a:latin typeface="PT Sans"/>
+                <a:ea typeface="PT Sans"/>
+                <a:cs typeface="PT Sans"/>
+              </a:rPr>
+              <a:t>, </a:t>
+            </a:r>
+            <a:r>
+              <a:rPr lang="en-US" sz="1600" b="0" i="0" u="none" strike="noStrike" cap="none" spc="0" dirty="0" err="1">
+                <a:solidFill>
+                  <a:schemeClr val="tx1"/>
+                </a:solidFill>
+                <a:latin typeface="PT Sans"/>
+                <a:ea typeface="PT Sans"/>
+                <a:cs typeface="PT Sans"/>
+              </a:rPr>
+              <a:t>содержащая</a:t>
+            </a:r>
+            <a:r>
+              <a:rPr lang="en-US" sz="1600" b="0" i="0" u="none" strike="noStrike" cap="none" spc="0" dirty="0">
+                <a:solidFill>
+                  <a:schemeClr val="tx1"/>
+                </a:solidFill>
+                <a:latin typeface="PT Sans"/>
+                <a:ea typeface="PT Sans"/>
+                <a:cs typeface="PT Sans"/>
+              </a:rPr>
+              <a:t> в </a:t>
+            </a:r>
+            <a:r>
+              <a:rPr lang="en-US" sz="1600" b="0" i="0" u="none" strike="noStrike" cap="none" spc="0" dirty="0" err="1">
+                <a:solidFill>
+                  <a:schemeClr val="tx1"/>
+                </a:solidFill>
+                <a:latin typeface="PT Sans"/>
+                <a:ea typeface="PT Sans"/>
+                <a:cs typeface="PT Sans"/>
+              </a:rPr>
+              <a:t>себе</a:t>
+            </a:r>
+            <a:r>
+              <a:rPr lang="en-US" sz="1600" b="0" i="0" u="none" strike="noStrike" cap="none" spc="0" dirty="0">
+                <a:solidFill>
+                  <a:schemeClr val="tx1"/>
+                </a:solidFill>
+                <a:latin typeface="PT Sans"/>
+                <a:ea typeface="PT Sans"/>
+                <a:cs typeface="PT Sans"/>
+              </a:rPr>
+              <a:t> </a:t>
+            </a:r>
+            <a:r>
+              <a:rPr lang="en-US" sz="1600" b="0" i="0" u="none" strike="noStrike" cap="none" spc="0" dirty="0" err="1">
+                <a:solidFill>
+                  <a:schemeClr val="tx1"/>
+                </a:solidFill>
+                <a:latin typeface="PT Sans"/>
+                <a:ea typeface="PT Sans"/>
+                <a:cs typeface="PT Sans"/>
+              </a:rPr>
+              <a:t>все</a:t>
+            </a:r>
+            <a:r>
+              <a:rPr lang="en-US" sz="1600" b="0" i="0" u="none" strike="noStrike" cap="none" spc="0" dirty="0">
+                <a:solidFill>
+                  <a:schemeClr val="tx1"/>
+                </a:solidFill>
+                <a:latin typeface="PT Sans"/>
+                <a:ea typeface="PT Sans"/>
+                <a:cs typeface="PT Sans"/>
+              </a:rPr>
+              <a:t> </a:t>
+            </a:r>
+            <a:r>
+              <a:rPr lang="en-US" sz="1600" b="0" i="0" u="none" strike="noStrike" cap="none" spc="0" dirty="0" err="1">
+                <a:solidFill>
+                  <a:schemeClr val="tx1"/>
+                </a:solidFill>
+                <a:latin typeface="PT Sans"/>
+                <a:ea typeface="PT Sans"/>
+                <a:cs typeface="PT Sans"/>
+              </a:rPr>
+              <a:t>картинки</a:t>
+            </a:r>
+            <a:r>
+              <a:rPr lang="en-US" sz="1600" b="0" i="0" u="none" strike="noStrike" cap="none" spc="0" dirty="0">
+                <a:solidFill>
+                  <a:schemeClr val="tx1"/>
+                </a:solidFill>
+                <a:latin typeface="PT Sans"/>
+                <a:ea typeface="PT Sans"/>
+                <a:cs typeface="PT Sans"/>
+              </a:rPr>
+              <a:t>, </a:t>
+            </a:r>
+            <a:r>
+              <a:rPr lang="en-US" sz="1600" b="0" i="0" u="none" strike="noStrike" cap="none" spc="0" dirty="0" err="1">
+                <a:solidFill>
+                  <a:schemeClr val="tx1"/>
+                </a:solidFill>
+                <a:latin typeface="PT Sans"/>
+                <a:ea typeface="PT Sans"/>
+                <a:cs typeface="PT Sans"/>
+              </a:rPr>
+              <a:t>используемые</a:t>
+            </a:r>
+            <a:r>
+              <a:rPr lang="en-US" sz="1600" b="0" i="0" u="none" strike="noStrike" cap="none" spc="0" dirty="0">
+                <a:solidFill>
+                  <a:schemeClr val="tx1"/>
+                </a:solidFill>
+                <a:latin typeface="PT Sans"/>
+                <a:ea typeface="PT Sans"/>
+                <a:cs typeface="PT Sans"/>
+              </a:rPr>
+              <a:t> в </a:t>
+            </a:r>
+            <a:r>
+              <a:rPr lang="en-US" sz="1600" b="0" i="0" u="none" strike="noStrike" cap="none" spc="0" dirty="0" err="1">
+                <a:solidFill>
+                  <a:schemeClr val="tx1"/>
+                </a:solidFill>
+                <a:latin typeface="PT Sans"/>
+                <a:ea typeface="PT Sans"/>
+                <a:cs typeface="PT Sans"/>
+              </a:rPr>
+              <a:t>проекте</a:t>
+            </a:r>
+            <a:r>
+              <a:rPr lang="en-US" sz="1600" b="0" i="0" u="none" strike="noStrike" cap="none" spc="0" dirty="0">
+                <a:solidFill>
+                  <a:schemeClr val="tx1"/>
+                </a:solidFill>
+                <a:latin typeface="PT Sans"/>
+                <a:ea typeface="PT Sans"/>
+                <a:cs typeface="PT Sans"/>
+              </a:rPr>
+              <a:t>;</a:t>
+            </a:r>
+          </a:p>
+          <a:p>
+            <a:pPr marL="239821" indent="-239821">
+              <a:buFont typeface="PT Sans"/>
+              <a:buAutoNum type="arabicPeriod"/>
+              <a:defRPr/>
+            </a:pPr>
+            <a:r>
+              <a:rPr lang="en-US" sz="1600" b="0" i="0" u="none" strike="noStrike" cap="none" spc="0" dirty="0" err="1">
+                <a:solidFill>
+                  <a:schemeClr val="tx1"/>
+                </a:solidFill>
+                <a:latin typeface="PT Sans"/>
+                <a:ea typeface="PT Sans"/>
+                <a:cs typeface="PT Sans"/>
+              </a:rPr>
+              <a:t>saved_games</a:t>
+            </a:r>
+            <a:r>
+              <a:rPr lang="en-US" sz="1600" b="0" i="0" u="none" strike="noStrike" cap="none" spc="0" dirty="0">
+                <a:solidFill>
+                  <a:schemeClr val="tx1"/>
+                </a:solidFill>
+                <a:latin typeface="PT Sans"/>
+                <a:ea typeface="PT Sans"/>
+                <a:cs typeface="PT Sans"/>
+              </a:rPr>
+              <a:t> - </a:t>
+            </a:r>
+            <a:r>
+              <a:rPr lang="en-US" sz="1600" b="0" i="0" u="none" strike="noStrike" cap="none" spc="0" dirty="0" err="1">
+                <a:solidFill>
+                  <a:schemeClr val="tx1"/>
+                </a:solidFill>
+                <a:latin typeface="PT Sans"/>
+                <a:ea typeface="PT Sans"/>
+                <a:cs typeface="PT Sans"/>
+              </a:rPr>
+              <a:t>папка</a:t>
+            </a:r>
+            <a:r>
+              <a:rPr lang="en-US" sz="1600" b="0" i="0" u="none" strike="noStrike" cap="none" spc="0" dirty="0">
+                <a:solidFill>
+                  <a:schemeClr val="tx1"/>
+                </a:solidFill>
+                <a:latin typeface="PT Sans"/>
+                <a:ea typeface="PT Sans"/>
+                <a:cs typeface="PT Sans"/>
+              </a:rPr>
+              <a:t>, </a:t>
+            </a:r>
+            <a:r>
+              <a:rPr lang="en-US" sz="1600" b="0" i="0" u="none" strike="noStrike" cap="none" spc="0" dirty="0" err="1">
+                <a:solidFill>
+                  <a:schemeClr val="tx1"/>
+                </a:solidFill>
+                <a:latin typeface="PT Sans"/>
+                <a:ea typeface="PT Sans"/>
+                <a:cs typeface="PT Sans"/>
+              </a:rPr>
+              <a:t>содержащая</a:t>
+            </a:r>
+            <a:r>
+              <a:rPr lang="en-US" sz="1600" b="0" i="0" u="none" strike="noStrike" cap="none" spc="0" dirty="0">
+                <a:solidFill>
+                  <a:schemeClr val="tx1"/>
+                </a:solidFill>
+                <a:latin typeface="PT Sans"/>
+                <a:ea typeface="PT Sans"/>
+                <a:cs typeface="PT Sans"/>
+              </a:rPr>
+              <a:t> в </a:t>
+            </a:r>
+            <a:r>
+              <a:rPr lang="en-US" sz="1600" b="0" i="0" u="none" strike="noStrike" cap="none" spc="0" dirty="0" err="1">
+                <a:solidFill>
+                  <a:schemeClr val="tx1"/>
+                </a:solidFill>
+                <a:latin typeface="PT Sans"/>
+                <a:ea typeface="PT Sans"/>
+                <a:cs typeface="PT Sans"/>
+              </a:rPr>
+              <a:t>себе</a:t>
+            </a:r>
+            <a:r>
+              <a:rPr lang="en-US" sz="1600" b="0" i="0" u="none" strike="noStrike" cap="none" spc="0" dirty="0">
+                <a:solidFill>
+                  <a:schemeClr val="tx1"/>
+                </a:solidFill>
+                <a:latin typeface="PT Sans"/>
+                <a:ea typeface="PT Sans"/>
+                <a:cs typeface="PT Sans"/>
+              </a:rPr>
+              <a:t> </a:t>
+            </a:r>
+            <a:r>
+              <a:rPr lang="en-US" sz="1600" b="0" i="0" u="none" strike="noStrike" cap="none" spc="0" dirty="0" err="1">
+                <a:solidFill>
+                  <a:schemeClr val="tx1"/>
+                </a:solidFill>
+                <a:latin typeface="PT Sans"/>
+                <a:ea typeface="PT Sans"/>
+                <a:cs typeface="PT Sans"/>
+              </a:rPr>
+              <a:t>сохранённые</a:t>
+            </a:r>
+            <a:r>
+              <a:rPr lang="en-US" sz="1600" b="0" i="0" u="none" strike="noStrike" cap="none" spc="0" dirty="0">
+                <a:solidFill>
+                  <a:schemeClr val="tx1"/>
+                </a:solidFill>
+                <a:latin typeface="PT Sans"/>
+                <a:ea typeface="PT Sans"/>
+                <a:cs typeface="PT Sans"/>
+              </a:rPr>
+              <a:t> </a:t>
+            </a:r>
+            <a:r>
+              <a:rPr lang="en-US" sz="1600" b="0" i="0" u="none" strike="noStrike" cap="none" spc="0" dirty="0" err="1">
+                <a:solidFill>
+                  <a:schemeClr val="tx1"/>
+                </a:solidFill>
+                <a:latin typeface="PT Sans"/>
+                <a:ea typeface="PT Sans"/>
+                <a:cs typeface="PT Sans"/>
+              </a:rPr>
+              <a:t>промежуточные</a:t>
+            </a:r>
+            <a:r>
+              <a:rPr lang="en-US" sz="1600" b="0" i="0" u="none" strike="noStrike" cap="none" spc="0" dirty="0">
+                <a:solidFill>
+                  <a:schemeClr val="tx1"/>
+                </a:solidFill>
+                <a:latin typeface="PT Sans"/>
+                <a:ea typeface="PT Sans"/>
+                <a:cs typeface="PT Sans"/>
+              </a:rPr>
+              <a:t> </a:t>
+            </a:r>
+            <a:r>
+              <a:rPr lang="en-US" sz="1600" b="0" i="0" u="none" strike="noStrike" cap="none" spc="0" dirty="0" err="1">
+                <a:solidFill>
+                  <a:schemeClr val="tx1"/>
+                </a:solidFill>
+                <a:latin typeface="PT Sans"/>
+                <a:ea typeface="PT Sans"/>
+                <a:cs typeface="PT Sans"/>
+              </a:rPr>
+              <a:t>результаты</a:t>
+            </a:r>
+            <a:r>
+              <a:rPr lang="en-US" sz="1600" b="0" i="0" u="none" strike="noStrike" cap="none" spc="0" dirty="0">
+                <a:solidFill>
+                  <a:schemeClr val="tx1"/>
+                </a:solidFill>
+                <a:latin typeface="PT Sans"/>
+                <a:ea typeface="PT Sans"/>
+                <a:cs typeface="PT Sans"/>
+              </a:rPr>
+              <a:t>, </a:t>
+            </a:r>
+            <a:r>
+              <a:rPr lang="en-US" sz="1600" b="0" i="0" u="none" strike="noStrike" cap="none" spc="0" dirty="0" err="1">
+                <a:solidFill>
+                  <a:schemeClr val="tx1"/>
+                </a:solidFill>
+                <a:latin typeface="PT Sans"/>
+                <a:ea typeface="PT Sans"/>
+                <a:cs typeface="PT Sans"/>
+              </a:rPr>
+              <a:t>записанные</a:t>
+            </a:r>
+            <a:r>
+              <a:rPr lang="en-US" sz="1600" b="0" i="0" u="none" strike="noStrike" cap="none" spc="0" dirty="0">
+                <a:solidFill>
+                  <a:schemeClr val="tx1"/>
+                </a:solidFill>
+                <a:latin typeface="PT Sans"/>
+                <a:ea typeface="PT Sans"/>
+                <a:cs typeface="PT Sans"/>
+              </a:rPr>
+              <a:t> в csv-</a:t>
+            </a:r>
+            <a:r>
+              <a:rPr lang="en-US" sz="1600" b="0" i="0" u="none" strike="noStrike" cap="none" spc="0" dirty="0" err="1">
+                <a:solidFill>
+                  <a:schemeClr val="tx1"/>
+                </a:solidFill>
+                <a:latin typeface="PT Sans"/>
+                <a:ea typeface="PT Sans"/>
+                <a:cs typeface="PT Sans"/>
+              </a:rPr>
+              <a:t>файлах</a:t>
+            </a:r>
+            <a:r>
+              <a:rPr lang="ru-RU" sz="1600" dirty="0">
+                <a:latin typeface="PT Sans"/>
+                <a:ea typeface="PT Sans"/>
+                <a:cs typeface="PT Sans"/>
+              </a:rPr>
+              <a:t>;</a:t>
+            </a:r>
+            <a:endParaRPr lang="en-US" sz="1600" dirty="0">
               <a:latin typeface="PT Sans"/>
               <a:ea typeface="PT Sans"/>
               <a:cs typeface="PT Sans"/>
@@ -4164,158 +6037,21 @@
               <a:defRPr/>
             </a:pPr>
             <a:r>
-              <a:rPr lang="en-US" sz="1600" b="0" i="0" u="none" strike="noStrike" cap="none" spc="0">
-                <a:solidFill>
-                  <a:schemeClr val="tx1"/>
-                </a:solidFill>
-                <a:latin typeface="PT Sans"/>
-                <a:ea typeface="PT Sans"/>
-                <a:cs typeface="PT Sans"/>
-              </a:rPr>
-              <a:t>requirements.txt - список библиотек, необходимых для корректной работы проекта</a:t>
-            </a:r>
-            <a:r>
-              <a:rPr lang="ru-RU" sz="1600" b="0" i="0" u="none" strike="noStrike" cap="none" spc="0">
-                <a:solidFill>
-                  <a:schemeClr val="tx1"/>
-                </a:solidFill>
-                <a:latin typeface="PT Sans"/>
-                <a:ea typeface="PT Sans"/>
-                <a:cs typeface="PT Sans"/>
-              </a:rPr>
-              <a:t>;</a:t>
-            </a:r>
-            <a:endParaRPr lang="ru-RU" sz="1600" b="0" i="0" u="none" strike="noStrike" cap="none" spc="0">
-              <a:solidFill>
-                <a:schemeClr val="tx1"/>
-              </a:solidFill>
-              <a:latin typeface="PT Sans"/>
-              <a:ea typeface="PT Sans"/>
-              <a:cs typeface="PT Sans"/>
-            </a:endParaRPr>
-          </a:p>
-          <a:p>
-            <a:pPr marL="239821" indent="-239821">
-              <a:buFont typeface="PT Sans"/>
-              <a:buAutoNum type="arabicPeriod"/>
-              <a:defRPr/>
-            </a:pPr>
-            <a:r>
-              <a:rPr lang="en-US" sz="1600" b="0" i="0" u="none" strike="noStrike" cap="none" spc="0">
-                <a:solidFill>
-                  <a:schemeClr val="tx1"/>
-                </a:solidFill>
-                <a:latin typeface="PT Sans"/>
-                <a:ea typeface="PT Sans"/>
-                <a:cs typeface="PT Sans"/>
-              </a:rPr>
-              <a:t>easy - папка, содержащая в себе 20 лёгких судоку, записанных в csv-файлах;</a:t>
-            </a:r>
-            <a:endParaRPr lang="en-US" sz="1600" b="0" i="0" u="none" strike="noStrike" cap="none" spc="0">
-              <a:solidFill>
-                <a:schemeClr val="tx1"/>
-              </a:solidFill>
-              <a:latin typeface="PT Sans"/>
-              <a:ea typeface="PT Sans"/>
-              <a:cs typeface="PT Sans"/>
-            </a:endParaRPr>
-          </a:p>
-          <a:p>
-            <a:pPr marL="239821" indent="-239821">
-              <a:buFont typeface="PT Sans"/>
-              <a:buAutoNum type="arabicPeriod"/>
-              <a:defRPr/>
-            </a:pPr>
-            <a:r>
-              <a:rPr lang="en-US" sz="1600" b="0" i="0" u="none" strike="noStrike" cap="none" spc="0">
-                <a:solidFill>
-                  <a:schemeClr val="tx1"/>
-                </a:solidFill>
-                <a:latin typeface="PT Sans"/>
-                <a:ea typeface="PT Sans"/>
-                <a:cs typeface="PT Sans"/>
-              </a:rPr>
-              <a:t>normal - папка, содержащая в себе 20 обычных судоку, записанных в csv-файлах;</a:t>
-            </a:r>
-            <a:endParaRPr lang="en-US" sz="1600" b="0" i="0" u="none" strike="noStrike" cap="none" spc="0">
-              <a:solidFill>
-                <a:schemeClr val="tx1"/>
-              </a:solidFill>
-              <a:latin typeface="PT Sans"/>
-              <a:ea typeface="PT Sans"/>
-              <a:cs typeface="PT Sans"/>
-            </a:endParaRPr>
-          </a:p>
-          <a:p>
-            <a:pPr marL="239821" indent="-239821">
-              <a:buFont typeface="PT Sans"/>
-              <a:buAutoNum type="arabicPeriod"/>
-              <a:defRPr/>
-            </a:pPr>
-            <a:r>
-              <a:rPr lang="en-US" sz="1600" b="0" i="0" u="none" strike="noStrike" cap="none" spc="0">
-                <a:solidFill>
-                  <a:schemeClr val="tx1"/>
-                </a:solidFill>
-                <a:latin typeface="PT Sans"/>
-                <a:ea typeface="PT Sans"/>
-                <a:cs typeface="PT Sans"/>
-              </a:rPr>
-              <a:t>hard - папка, содержащая в себе 20 тяжёлых судоку, записанных в csv-файлах;</a:t>
-            </a:r>
-            <a:endParaRPr lang="en-US" sz="1600" b="0" i="0" u="none" strike="noStrike" cap="none" spc="0">
-              <a:solidFill>
-                <a:schemeClr val="tx1"/>
-              </a:solidFill>
-              <a:latin typeface="PT Sans"/>
-              <a:ea typeface="PT Sans"/>
-              <a:cs typeface="PT Sans"/>
-            </a:endParaRPr>
-          </a:p>
-          <a:p>
-            <a:pPr marL="239821" indent="-239821">
-              <a:buFont typeface="PT Sans"/>
-              <a:buAutoNum type="arabicPeriod"/>
-              <a:defRPr/>
-            </a:pPr>
-            <a:r>
-              <a:rPr lang="en-US" sz="1600" b="0" i="0" u="none" strike="noStrike" cap="none" spc="0">
-                <a:solidFill>
-                  <a:schemeClr val="tx1"/>
-                </a:solidFill>
-                <a:latin typeface="PT Sans"/>
-                <a:ea typeface="PT Sans"/>
-                <a:cs typeface="PT Sans"/>
-              </a:rPr>
-              <a:t>images - папка, содержащая в себе все картинки, используемые в проекте;</a:t>
-            </a:r>
-            <a:endParaRPr lang="en-US" sz="1600" b="0" i="0" u="none" strike="noStrike" cap="none" spc="0">
-              <a:solidFill>
-                <a:schemeClr val="tx1"/>
-              </a:solidFill>
-              <a:latin typeface="PT Sans"/>
-              <a:ea typeface="PT Sans"/>
-              <a:cs typeface="PT Sans"/>
-            </a:endParaRPr>
-          </a:p>
-          <a:p>
-            <a:pPr marL="239821" indent="-239821">
-              <a:buFont typeface="PT Sans"/>
-              <a:buAutoNum type="arabicPeriod"/>
-              <a:defRPr/>
-            </a:pPr>
-            <a:r>
-              <a:rPr lang="en-US" sz="1600" b="0" i="0" u="none" strike="noStrike" cap="none" spc="0">
-                <a:solidFill>
-                  <a:schemeClr val="tx1"/>
-                </a:solidFill>
-                <a:latin typeface="PT Sans"/>
-                <a:ea typeface="PT Sans"/>
-                <a:cs typeface="PT Sans"/>
-              </a:rPr>
-              <a:t>saved_games - папка, содержащая в себе сохранённые промежуточные результаты, записанные в csv-файлах.</a:t>
-            </a:r>
-            <a:endParaRPr lang="en-US" sz="1600"/>
+              <a:rPr lang="ru-RU" sz="1600" dirty="0" err="1">
+                <a:latin typeface="PT Sans"/>
+                <a:ea typeface="PT Sans"/>
+                <a:cs typeface="PT Sans"/>
+              </a:rPr>
+              <a:t>exe</a:t>
+            </a:r>
+            <a:r>
+              <a:rPr lang="ru-RU" sz="1600" dirty="0">
+                <a:latin typeface="PT Sans"/>
+                <a:ea typeface="PT Sans"/>
+                <a:cs typeface="PT Sans"/>
+              </a:rPr>
+              <a:t> - папка, содержащая файл Main_window.exe, позволяющий открыть программу без интерпретатора Python.</a:t>
+            </a:r>
           </a:p>
         </p:txBody>
       </p:sp>
@@ -4324,25 +6060,17 @@
   <p:clrMapOvr>
     <a:masterClrMapping/>
   </p:clrMapOvr>
-  <mc:AlternateContent xmlns:mc="http://schemas.openxmlformats.org/markup-compatibility/2006">
-    <mc:Choice xmlns:p14="http://schemas.microsoft.com/office/powerpoint/2010/main" Requires="p14">
-      <p:transition p14:dur="2000" advClick="1"/>
-    </mc:Choice>
-    <mc:Fallback>
-      <p:transition advClick="1"/>
-    </mc:Fallback>
-  </mc:AlternateContent>
 </p:sld>
 </file>
 
 <file path=ppt/slides/slide6.xml><?xml version="1.0" encoding="utf-8"?>
-<p:sld xmlns:a="http://schemas.openxmlformats.org/drawingml/2006/main" xmlns:r="http://schemas.openxmlformats.org/officeDocument/2006/relationships" xmlns:p="http://schemas.openxmlformats.org/presentationml/2006/main" xmlns:m="http://schemas.openxmlformats.org/officeDocument/2006/math" xmlns:w="http://schemas.openxmlformats.org/wordprocessingml/2006/main" showMasterPhAnim="0" show="1">
-  <p:cSld name="">
+<p:sld xmlns:a="http://schemas.openxmlformats.org/drawingml/2006/main" xmlns:r="http://schemas.openxmlformats.org/officeDocument/2006/relationships" xmlns:p="http://schemas.openxmlformats.org/presentationml/2006/main" showMasterPhAnim="0">
+  <p:cSld>
     <p:spTree>
       <p:nvGrpSpPr>
-        <p:cNvPr id="1" name="" hidden="0"/>
+        <p:cNvPr id="1" name=""/>
         <p:cNvGrpSpPr/>
-        <p:nvPr isPhoto="0" userDrawn="0"/>
+        <p:nvPr/>
       </p:nvGrpSpPr>
       <p:grpSpPr bwMode="auto">
         <a:xfrm>
@@ -4354,12 +6082,12 @@
       </p:grpSpPr>
       <p:sp>
         <p:nvSpPr>
-          <p:cNvPr id="4" name="Заголовок 1" hidden="0"/>
-          <p:cNvSpPr>
-            <a:spLocks noGrp="1"/>
-          </p:cNvSpPr>
-          <p:nvPr isPhoto="0" userDrawn="0">
-            <p:ph type="title" hasCustomPrompt="0"/>
+          <p:cNvPr id="4" name="Заголовок 1"/>
+          <p:cNvSpPr>
+            <a:spLocks noGrp="1"/>
+          </p:cNvSpPr>
+          <p:nvPr>
+            <p:ph type="title"/>
           </p:nvPr>
         </p:nvSpPr>
         <p:spPr bwMode="auto"/>
@@ -4380,12 +6108,12 @@
       </p:sp>
       <p:sp>
         <p:nvSpPr>
-          <p:cNvPr id="5" name="Объект 2" hidden="0"/>
-          <p:cNvSpPr>
-            <a:spLocks noGrp="1"/>
-          </p:cNvSpPr>
-          <p:nvPr isPhoto="0" userDrawn="0">
-            <p:ph idx="1" hasCustomPrompt="0"/>
+          <p:cNvPr id="5" name="Объект 2"/>
+          <p:cNvSpPr>
+            <a:spLocks noGrp="1"/>
+          </p:cNvSpPr>
+          <p:nvPr>
+            <p:ph idx="1"/>
           </p:nvPr>
         </p:nvSpPr>
         <p:spPr bwMode="auto"/>
@@ -4399,7 +6127,6 @@
               <a:defRPr/>
             </a:pPr>
             <a:r>
-              <a:rPr/>
               <a:t>В процессе работы над проектом я научился работать с библиотекой </a:t>
             </a:r>
             <a:r>
@@ -4410,7 +6137,6 @@
               <a:rPr lang="ru-RU"/>
               <a:t>;</a:t>
             </a:r>
-            <a:endParaRPr lang="ru-RU"/>
           </a:p>
           <a:p>
             <a:pPr marL="394023" indent="-394023">
@@ -4431,25 +6157,17 @@
   <p:clrMapOvr>
     <a:masterClrMapping/>
   </p:clrMapOvr>
-  <mc:AlternateContent xmlns:mc="http://schemas.openxmlformats.org/markup-compatibility/2006">
-    <mc:Choice xmlns:p14="http://schemas.microsoft.com/office/powerpoint/2010/main" Requires="p14">
-      <p:transition p14:dur="2000" advClick="1"/>
-    </mc:Choice>
-    <mc:Fallback>
-      <p:transition advClick="1"/>
-    </mc:Fallback>
-  </mc:AlternateContent>
 </p:sld>
 </file>
 
 <file path=ppt/slides/slide7.xml><?xml version="1.0" encoding="utf-8"?>
-<p:sld xmlns:a="http://schemas.openxmlformats.org/drawingml/2006/main" xmlns:r="http://schemas.openxmlformats.org/officeDocument/2006/relationships" xmlns:p="http://schemas.openxmlformats.org/presentationml/2006/main" xmlns:m="http://schemas.openxmlformats.org/officeDocument/2006/math" xmlns:w="http://schemas.openxmlformats.org/wordprocessingml/2006/main" showMasterPhAnim="0" show="1">
-  <p:cSld name="">
+<p:sld xmlns:a="http://schemas.openxmlformats.org/drawingml/2006/main" xmlns:r="http://schemas.openxmlformats.org/officeDocument/2006/relationships" xmlns:p="http://schemas.openxmlformats.org/presentationml/2006/main" showMasterPhAnim="0">
+  <p:cSld>
     <p:spTree>
       <p:nvGrpSpPr>
-        <p:cNvPr id="1" name="" hidden="0"/>
+        <p:cNvPr id="1" name=""/>
         <p:cNvGrpSpPr/>
-        <p:nvPr isPhoto="0" userDrawn="0"/>
+        <p:nvPr/>
       </p:nvGrpSpPr>
       <p:grpSpPr bwMode="auto">
         <a:xfrm>
@@ -4461,12 +6179,12 @@
       </p:grpSpPr>
       <p:sp>
         <p:nvSpPr>
-          <p:cNvPr id="4" name="Заголовок 1" hidden="0"/>
-          <p:cNvSpPr>
-            <a:spLocks noGrp="1"/>
-          </p:cNvSpPr>
-          <p:nvPr isPhoto="0" userDrawn="0">
-            <p:ph type="ctrTitle" hasCustomPrompt="0"/>
+          <p:cNvPr id="4" name="Заголовок 1"/>
+          <p:cNvSpPr>
+            <a:spLocks noGrp="1"/>
+          </p:cNvSpPr>
+          <p:nvPr>
+            <p:ph type="ctrTitle"/>
           </p:nvPr>
         </p:nvSpPr>
         <p:spPr bwMode="auto">
@@ -4476,7 +6194,7 @@
           </a:xfrm>
         </p:spPr>
         <p:txBody>
-          <a:bodyPr vertOverflow="overflow" horzOverflow="clip" vert="horz" wrap="square" lIns="91440" tIns="45720" rIns="91440" bIns="45720" numCol="1" spcCol="0" rtlCol="0" fromWordArt="0" anchor="ctr" anchorCtr="0" forceAA="0" upright="0" compatLnSpc="0">
+          <a:bodyPr vertOverflow="overflow" horzOverflow="clip" vert="horz" wrap="square" lIns="91440" tIns="45720" rIns="91440" bIns="45720" numCol="1" spcCol="0" rtlCol="0" fromWordArt="0" anchor="ctr" anchorCtr="0" forceAA="0" compatLnSpc="0">
             <a:normAutofit/>
           </a:bodyPr>
           <a:lstStyle>
@@ -4509,19 +6227,11 @@
   <p:clrMapOvr>
     <a:masterClrMapping/>
   </p:clrMapOvr>
-  <mc:AlternateContent xmlns:mc="http://schemas.openxmlformats.org/markup-compatibility/2006">
-    <mc:Choice xmlns:p14="http://schemas.microsoft.com/office/powerpoint/2010/main" Requires="p14">
-      <p:transition p14:dur="2000" advClick="1"/>
-    </mc:Choice>
-    <mc:Fallback>
-      <p:transition advClick="1"/>
-    </mc:Fallback>
-  </mc:AlternateContent>
 </p:sld>
 </file>
 
 <file path=ppt/theme/theme1.xml><?xml version="1.0" encoding="utf-8"?>
-<a:theme xmlns:a="http://schemas.openxmlformats.org/drawingml/2006/main" xmlns:r="http://schemas.openxmlformats.org/officeDocument/2006/relationships" xmlns:p="http://schemas.openxmlformats.org/presentationml/2006/main" name="Office Theme">
+<a:theme xmlns:a="http://schemas.openxmlformats.org/drawingml/2006/main" name="Office Theme">
   <a:themeElements>
     <a:clrScheme name="Office Theme">
       <a:dk1>
@@ -4724,5 +6434,6 @@
     </a:fmtScheme>
   </a:themeElements>
   <a:objectDefaults/>
+  <a:extraClrSchemeLst/>
 </a:theme>
 </file>
</xml_diff>